<commit_message>
Modifica slide problemi Modificate le icone nella slide dei problemi e reso giallo il primo tubo
Co-Authored-By: Lukil33 <164167364+lukil33@users.noreply.github.com>
</commit_message>
<xml_diff>
--- a/pitch.pptx
+++ b/pitch.pptx
@@ -18389,423 +18389,337 @@
           </a:p>
         </p:txBody>
       </p:sp>
-      <p:grpSp>
-        <p:nvGrpSpPr>
-          <p:cNvPr id="27" name="Gruppo 26">
-            <a:extLst>
-              <a:ext uri="{FF2B5EF4-FFF2-40B4-BE49-F238E27FC236}">
-                <a16:creationId xmlns:a16="http://schemas.microsoft.com/office/drawing/2014/main" id="{78977F97-3B10-109C-5EAB-163B12BB5B11}"/>
-              </a:ext>
-            </a:extLst>
-          </p:cNvPr>
-          <p:cNvGrpSpPr/>
+      <p:sp>
+        <p:nvSpPr>
+          <p:cNvPr id="11" name="Connettore 10">
+            <a:extLst>
+              <a:ext uri="{FF2B5EF4-FFF2-40B4-BE49-F238E27FC236}">
+                <a16:creationId xmlns:a16="http://schemas.microsoft.com/office/drawing/2014/main" id="{B67C0F3A-E4CD-5F37-64D6-05031A332ED6}"/>
+              </a:ext>
+            </a:extLst>
+          </p:cNvPr>
+          <p:cNvSpPr/>
           <p:nvPr/>
-        </p:nvGrpSpPr>
-        <p:grpSpPr>
-          <a:xfrm>
-            <a:off x="-8132" y="1886835"/>
-            <a:ext cx="2445730" cy="1692000"/>
-            <a:chOff x="-8132" y="1990448"/>
-            <a:chExt cx="2445730" cy="1692000"/>
-          </a:xfrm>
-        </p:grpSpPr>
-        <p:grpSp>
-          <p:nvGrpSpPr>
-            <p:cNvPr id="17" name="Gruppo 16">
-              <a:extLst>
-                <a:ext uri="{FF2B5EF4-FFF2-40B4-BE49-F238E27FC236}">
-                  <a16:creationId xmlns:a16="http://schemas.microsoft.com/office/drawing/2014/main" id="{168657D1-2055-9635-DCCB-0D4CC7E3AD1A}"/>
-                </a:ext>
-              </a:extLst>
-            </p:cNvPr>
-            <p:cNvGrpSpPr/>
-            <p:nvPr/>
-          </p:nvGrpSpPr>
-          <p:grpSpPr>
-            <a:xfrm>
-              <a:off x="745598" y="1990448"/>
-              <a:ext cx="1692000" cy="1692000"/>
-              <a:chOff x="7100427" y="1273800"/>
-              <a:chExt cx="1692000" cy="1692000"/>
-            </a:xfrm>
+        </p:nvSpPr>
+        <p:spPr>
+          <a:xfrm>
+            <a:off x="745598" y="1886835"/>
+            <a:ext cx="1692000" cy="1692000"/>
+          </a:xfrm>
+          <a:prstGeom prst="flowChartConnector">
+            <a:avLst/>
+          </a:prstGeom>
+          <a:solidFill>
+            <a:srgbClr val="FEA919"/>
+          </a:solidFill>
+          <a:ln>
             <a:solidFill>
-              <a:srgbClr val="29B76F"/>
+              <a:srgbClr val="FEA919"/>
             </a:solidFill>
-          </p:grpSpPr>
-          <p:sp>
-            <p:nvSpPr>
-              <p:cNvPr id="11" name="Connettore 10">
-                <a:extLst>
-                  <a:ext uri="{FF2B5EF4-FFF2-40B4-BE49-F238E27FC236}">
-                    <a16:creationId xmlns:a16="http://schemas.microsoft.com/office/drawing/2014/main" id="{B67C0F3A-E4CD-5F37-64D6-05031A332ED6}"/>
-                  </a:ext>
-                </a:extLst>
-              </p:cNvPr>
-              <p:cNvSpPr/>
-              <p:nvPr/>
-            </p:nvSpPr>
-            <p:spPr>
-              <a:xfrm>
-                <a:off x="7100427" y="1273800"/>
-                <a:ext cx="1692000" cy="1692000"/>
-              </a:xfrm>
-              <a:prstGeom prst="flowChartConnector">
-                <a:avLst/>
-              </a:prstGeom>
-              <a:grpFill/>
-              <a:ln>
-                <a:solidFill>
-                  <a:srgbClr val="00AA59"/>
-                </a:solidFill>
-              </a:ln>
-            </p:spPr>
-            <p:style>
-              <a:lnRef idx="2">
-                <a:schemeClr val="accent1">
-                  <a:shade val="15000"/>
-                </a:schemeClr>
-              </a:lnRef>
-              <a:fillRef idx="1">
-                <a:schemeClr val="accent1"/>
-              </a:fillRef>
-              <a:effectRef idx="0">
-                <a:schemeClr val="accent1"/>
-              </a:effectRef>
-              <a:fontRef idx="minor">
-                <a:schemeClr val="lt1"/>
-              </a:fontRef>
-            </p:style>
-            <p:txBody>
-              <a:bodyPr rtlCol="0" anchor="ctr"/>
-              <a:lstStyle/>
-              <a:p>
-                <a:pPr algn="ctr"/>
-                <a:endParaRPr lang="it-IT" dirty="0">
-                  <a:solidFill>
-                    <a:schemeClr val="accent3"/>
-                  </a:solidFill>
-                </a:endParaRPr>
-              </a:p>
-            </p:txBody>
-          </p:sp>
-          <p:sp>
-            <p:nvSpPr>
-              <p:cNvPr id="12" name="Connettore 11">
-                <a:extLst>
-                  <a:ext uri="{FF2B5EF4-FFF2-40B4-BE49-F238E27FC236}">
-                    <a16:creationId xmlns:a16="http://schemas.microsoft.com/office/drawing/2014/main" id="{B19D2251-5362-D23A-8E56-0AA53D698658}"/>
-                  </a:ext>
-                </a:extLst>
-              </p:cNvPr>
-              <p:cNvSpPr/>
-              <p:nvPr/>
-            </p:nvSpPr>
-            <p:spPr>
-              <a:xfrm>
-                <a:off x="7334427" y="1507800"/>
-                <a:ext cx="1224000" cy="1224000"/>
-              </a:xfrm>
-              <a:prstGeom prst="flowChartConnector">
-                <a:avLst/>
-              </a:prstGeom>
+          </a:ln>
+        </p:spPr>
+        <p:style>
+          <a:lnRef idx="2">
+            <a:schemeClr val="accent1">
+              <a:shade val="15000"/>
+            </a:schemeClr>
+          </a:lnRef>
+          <a:fillRef idx="1">
+            <a:schemeClr val="accent1"/>
+          </a:fillRef>
+          <a:effectRef idx="0">
+            <a:schemeClr val="accent1"/>
+          </a:effectRef>
+          <a:fontRef idx="minor">
+            <a:schemeClr val="lt1"/>
+          </a:fontRef>
+        </p:style>
+        <p:txBody>
+          <a:bodyPr rtlCol="0" anchor="ctr"/>
+          <a:lstStyle/>
+          <a:p>
+            <a:pPr algn="ctr"/>
+            <a:endParaRPr lang="it-IT" dirty="0">
               <a:solidFill>
-                <a:srgbClr val="FDF9E2"/>
+                <a:schemeClr val="accent3"/>
               </a:solidFill>
-              <a:ln>
-                <a:solidFill>
-                  <a:srgbClr val="00AA59"/>
-                </a:solidFill>
-              </a:ln>
-            </p:spPr>
-            <p:style>
-              <a:lnRef idx="2">
-                <a:schemeClr val="accent1">
-                  <a:shade val="15000"/>
-                </a:schemeClr>
-              </a:lnRef>
-              <a:fillRef idx="1">
-                <a:schemeClr val="accent1"/>
-              </a:fillRef>
-              <a:effectRef idx="0">
-                <a:schemeClr val="accent1"/>
-              </a:effectRef>
-              <a:fontRef idx="minor">
-                <a:schemeClr val="lt1"/>
-              </a:fontRef>
-            </p:style>
-            <p:txBody>
-              <a:bodyPr rtlCol="0" anchor="ctr"/>
-              <a:lstStyle/>
-              <a:p>
-                <a:pPr algn="ctr"/>
-                <a:endParaRPr lang="it-IT" dirty="0"/>
-              </a:p>
-            </p:txBody>
-          </p:sp>
-        </p:grpSp>
-        <p:sp>
-          <p:nvSpPr>
-            <p:cNvPr id="21" name="Rettangolo 20">
-              <a:extLst>
-                <a:ext uri="{FF2B5EF4-FFF2-40B4-BE49-F238E27FC236}">
-                  <a16:creationId xmlns:a16="http://schemas.microsoft.com/office/drawing/2014/main" id="{8F1D2816-0892-3A84-2C9E-BEB7D3E77516}"/>
-                </a:ext>
-              </a:extLst>
-            </p:cNvPr>
-            <p:cNvSpPr/>
-            <p:nvPr/>
-          </p:nvSpPr>
-          <p:spPr>
-            <a:xfrm>
-              <a:off x="-8132" y="2531070"/>
-              <a:ext cx="864000" cy="576000"/>
-            </a:xfrm>
-            <a:prstGeom prst="rect">
-              <a:avLst/>
-            </a:prstGeom>
+            </a:endParaRPr>
+          </a:p>
+        </p:txBody>
+      </p:sp>
+      <p:sp>
+        <p:nvSpPr>
+          <p:cNvPr id="12" name="Connettore 11">
+            <a:extLst>
+              <a:ext uri="{FF2B5EF4-FFF2-40B4-BE49-F238E27FC236}">
+                <a16:creationId xmlns:a16="http://schemas.microsoft.com/office/drawing/2014/main" id="{B19D2251-5362-D23A-8E56-0AA53D698658}"/>
+              </a:ext>
+            </a:extLst>
+          </p:cNvPr>
+          <p:cNvSpPr/>
+          <p:nvPr/>
+        </p:nvSpPr>
+        <p:spPr>
+          <a:xfrm>
+            <a:off x="979598" y="2120835"/>
+            <a:ext cx="1224000" cy="1224000"/>
+          </a:xfrm>
+          <a:prstGeom prst="flowChartConnector">
+            <a:avLst/>
+          </a:prstGeom>
+          <a:solidFill>
+            <a:srgbClr val="FFECCC"/>
+          </a:solidFill>
+          <a:ln>
             <a:solidFill>
-              <a:srgbClr val="29B76F"/>
+              <a:srgbClr val="FEA919"/>
             </a:solidFill>
-            <a:ln>
-              <a:noFill/>
-            </a:ln>
-          </p:spPr>
-          <p:style>
-            <a:lnRef idx="2">
-              <a:schemeClr val="accent1">
-                <a:shade val="15000"/>
-              </a:schemeClr>
-            </a:lnRef>
-            <a:fillRef idx="1">
-              <a:schemeClr val="accent1"/>
-            </a:fillRef>
-            <a:effectRef idx="0">
-              <a:schemeClr val="accent1"/>
-            </a:effectRef>
-            <a:fontRef idx="minor">
-              <a:schemeClr val="lt1"/>
-            </a:fontRef>
-          </p:style>
-          <p:txBody>
-            <a:bodyPr rtlCol="0" anchor="ctr"/>
-            <a:lstStyle/>
-            <a:p>
-              <a:pPr algn="ctr"/>
-              <a:endParaRPr lang="it-IT"/>
-            </a:p>
-          </p:txBody>
-        </p:sp>
-      </p:grpSp>
-      <p:grpSp>
-        <p:nvGrpSpPr>
-          <p:cNvPr id="30" name="Gruppo 29">
-            <a:extLst>
-              <a:ext uri="{FF2B5EF4-FFF2-40B4-BE49-F238E27FC236}">
-                <a16:creationId xmlns:a16="http://schemas.microsoft.com/office/drawing/2014/main" id="{23ACD9CB-811F-E861-F239-B41EA5E9138F}"/>
-              </a:ext>
-            </a:extLst>
-          </p:cNvPr>
-          <p:cNvGrpSpPr/>
+          </a:ln>
+        </p:spPr>
+        <p:style>
+          <a:lnRef idx="2">
+            <a:schemeClr val="accent1">
+              <a:shade val="15000"/>
+            </a:schemeClr>
+          </a:lnRef>
+          <a:fillRef idx="1">
+            <a:schemeClr val="accent1"/>
+          </a:fillRef>
+          <a:effectRef idx="0">
+            <a:schemeClr val="accent1"/>
+          </a:effectRef>
+          <a:fontRef idx="minor">
+            <a:schemeClr val="lt1"/>
+          </a:fontRef>
+        </p:style>
+        <p:txBody>
+          <a:bodyPr rtlCol="0" anchor="ctr"/>
+          <a:lstStyle/>
+          <a:p>
+            <a:pPr algn="ctr"/>
+            <a:endParaRPr lang="it-IT" dirty="0"/>
+          </a:p>
+        </p:txBody>
+      </p:sp>
+      <p:sp>
+        <p:nvSpPr>
+          <p:cNvPr id="21" name="Rettangolo 20">
+            <a:extLst>
+              <a:ext uri="{FF2B5EF4-FFF2-40B4-BE49-F238E27FC236}">
+                <a16:creationId xmlns:a16="http://schemas.microsoft.com/office/drawing/2014/main" id="{8F1D2816-0892-3A84-2C9E-BEB7D3E77516}"/>
+              </a:ext>
+            </a:extLst>
+          </p:cNvPr>
+          <p:cNvSpPr/>
           <p:nvPr/>
-        </p:nvGrpSpPr>
-        <p:grpSpPr>
-          <a:xfrm>
-            <a:off x="0" y="3812835"/>
-            <a:ext cx="2437598" cy="1692000"/>
-            <a:chOff x="0" y="1990448"/>
-            <a:chExt cx="2437598" cy="1692000"/>
-          </a:xfrm>
-        </p:grpSpPr>
-        <p:grpSp>
-          <p:nvGrpSpPr>
-            <p:cNvPr id="31" name="Gruppo 30">
-              <a:extLst>
-                <a:ext uri="{FF2B5EF4-FFF2-40B4-BE49-F238E27FC236}">
-                  <a16:creationId xmlns:a16="http://schemas.microsoft.com/office/drawing/2014/main" id="{206BF7FA-204A-F274-741F-3B1BB3352430}"/>
-                </a:ext>
-              </a:extLst>
-            </p:cNvPr>
-            <p:cNvGrpSpPr/>
-            <p:nvPr/>
-          </p:nvGrpSpPr>
-          <p:grpSpPr>
-            <a:xfrm>
-              <a:off x="745598" y="1990448"/>
-              <a:ext cx="1692000" cy="1692000"/>
-              <a:chOff x="7100427" y="1273800"/>
-              <a:chExt cx="1692000" cy="1692000"/>
-            </a:xfrm>
+        </p:nvSpPr>
+        <p:spPr>
+          <a:xfrm>
+            <a:off x="-8132" y="2427457"/>
+            <a:ext cx="864000" cy="576000"/>
+          </a:xfrm>
+          <a:prstGeom prst="rect">
+            <a:avLst/>
+          </a:prstGeom>
+          <a:solidFill>
+            <a:srgbClr val="FEA919"/>
+          </a:solidFill>
+          <a:ln>
+            <a:noFill/>
+          </a:ln>
+        </p:spPr>
+        <p:style>
+          <a:lnRef idx="2">
+            <a:schemeClr val="accent1">
+              <a:shade val="15000"/>
+            </a:schemeClr>
+          </a:lnRef>
+          <a:fillRef idx="1">
+            <a:schemeClr val="accent1"/>
+          </a:fillRef>
+          <a:effectRef idx="0">
+            <a:schemeClr val="accent1"/>
+          </a:effectRef>
+          <a:fontRef idx="minor">
+            <a:schemeClr val="lt1"/>
+          </a:fontRef>
+        </p:style>
+        <p:txBody>
+          <a:bodyPr rtlCol="0" anchor="ctr"/>
+          <a:lstStyle/>
+          <a:p>
+            <a:pPr algn="ctr"/>
+            <a:endParaRPr lang="it-IT"/>
+          </a:p>
+        </p:txBody>
+      </p:sp>
+      <p:sp>
+        <p:nvSpPr>
+          <p:cNvPr id="33" name="Connettore 32">
+            <a:extLst>
+              <a:ext uri="{FF2B5EF4-FFF2-40B4-BE49-F238E27FC236}">
+                <a16:creationId xmlns:a16="http://schemas.microsoft.com/office/drawing/2014/main" id="{68D08AD9-62E1-831C-2789-0EB540DB7928}"/>
+              </a:ext>
+            </a:extLst>
+          </p:cNvPr>
+          <p:cNvSpPr/>
+          <p:nvPr/>
+        </p:nvSpPr>
+        <p:spPr>
+          <a:xfrm>
+            <a:off x="745598" y="3812835"/>
+            <a:ext cx="1692000" cy="1692000"/>
+          </a:xfrm>
+          <a:prstGeom prst="flowChartConnector">
+            <a:avLst/>
+          </a:prstGeom>
+          <a:solidFill>
+            <a:srgbClr val="29B76F"/>
+          </a:solidFill>
+          <a:ln>
             <a:solidFill>
-              <a:srgbClr val="29B76F"/>
+              <a:srgbClr val="00AA59"/>
             </a:solidFill>
-          </p:grpSpPr>
-          <p:sp>
-            <p:nvSpPr>
-              <p:cNvPr id="33" name="Connettore 32">
-                <a:extLst>
-                  <a:ext uri="{FF2B5EF4-FFF2-40B4-BE49-F238E27FC236}">
-                    <a16:creationId xmlns:a16="http://schemas.microsoft.com/office/drawing/2014/main" id="{68D08AD9-62E1-831C-2789-0EB540DB7928}"/>
-                  </a:ext>
-                </a:extLst>
-              </p:cNvPr>
-              <p:cNvSpPr/>
-              <p:nvPr/>
-            </p:nvSpPr>
-            <p:spPr>
-              <a:xfrm>
-                <a:off x="7100427" y="1273800"/>
-                <a:ext cx="1692000" cy="1692000"/>
-              </a:xfrm>
-              <a:prstGeom prst="flowChartConnector">
-                <a:avLst/>
-              </a:prstGeom>
-              <a:grpFill/>
-              <a:ln>
-                <a:solidFill>
-                  <a:srgbClr val="00AA59"/>
-                </a:solidFill>
-              </a:ln>
-            </p:spPr>
-            <p:style>
-              <a:lnRef idx="2">
-                <a:schemeClr val="accent1">
-                  <a:shade val="15000"/>
-                </a:schemeClr>
-              </a:lnRef>
-              <a:fillRef idx="1">
-                <a:schemeClr val="accent1"/>
-              </a:fillRef>
-              <a:effectRef idx="0">
-                <a:schemeClr val="accent1"/>
-              </a:effectRef>
-              <a:fontRef idx="minor">
-                <a:schemeClr val="lt1"/>
-              </a:fontRef>
-            </p:style>
-            <p:txBody>
-              <a:bodyPr rtlCol="0" anchor="ctr"/>
-              <a:lstStyle/>
-              <a:p>
-                <a:pPr algn="ctr"/>
-                <a:endParaRPr lang="it-IT" dirty="0">
-                  <a:solidFill>
-                    <a:schemeClr val="accent3"/>
-                  </a:solidFill>
-                </a:endParaRPr>
-              </a:p>
-            </p:txBody>
-          </p:sp>
-          <p:sp>
-            <p:nvSpPr>
-              <p:cNvPr id="34" name="Connettore 33">
-                <a:extLst>
-                  <a:ext uri="{FF2B5EF4-FFF2-40B4-BE49-F238E27FC236}">
-                    <a16:creationId xmlns:a16="http://schemas.microsoft.com/office/drawing/2014/main" id="{E9F3CEF6-B728-12DB-4D52-46FA36DDB086}"/>
-                  </a:ext>
-                </a:extLst>
-              </p:cNvPr>
-              <p:cNvSpPr/>
-              <p:nvPr/>
-            </p:nvSpPr>
-            <p:spPr>
-              <a:xfrm>
-                <a:off x="7334427" y="1507800"/>
-                <a:ext cx="1224000" cy="1224000"/>
-              </a:xfrm>
-              <a:prstGeom prst="flowChartConnector">
-                <a:avLst/>
-              </a:prstGeom>
+          </a:ln>
+        </p:spPr>
+        <p:style>
+          <a:lnRef idx="2">
+            <a:schemeClr val="accent1">
+              <a:shade val="15000"/>
+            </a:schemeClr>
+          </a:lnRef>
+          <a:fillRef idx="1">
+            <a:schemeClr val="accent1"/>
+          </a:fillRef>
+          <a:effectRef idx="0">
+            <a:schemeClr val="accent1"/>
+          </a:effectRef>
+          <a:fontRef idx="minor">
+            <a:schemeClr val="lt1"/>
+          </a:fontRef>
+        </p:style>
+        <p:txBody>
+          <a:bodyPr rtlCol="0" anchor="ctr"/>
+          <a:lstStyle/>
+          <a:p>
+            <a:pPr algn="ctr"/>
+            <a:endParaRPr lang="it-IT" dirty="0">
               <a:solidFill>
-                <a:srgbClr val="FDF9E2"/>
+                <a:schemeClr val="accent3"/>
               </a:solidFill>
-              <a:ln>
-                <a:solidFill>
-                  <a:srgbClr val="00AA59"/>
-                </a:solidFill>
-              </a:ln>
-            </p:spPr>
-            <p:style>
-              <a:lnRef idx="2">
-                <a:schemeClr val="accent1">
-                  <a:shade val="15000"/>
-                </a:schemeClr>
-              </a:lnRef>
-              <a:fillRef idx="1">
-                <a:schemeClr val="accent1"/>
-              </a:fillRef>
-              <a:effectRef idx="0">
-                <a:schemeClr val="accent1"/>
-              </a:effectRef>
-              <a:fontRef idx="minor">
-                <a:schemeClr val="lt1"/>
-              </a:fontRef>
-            </p:style>
-            <p:txBody>
-              <a:bodyPr rtlCol="0" anchor="ctr"/>
-              <a:lstStyle/>
-              <a:p>
-                <a:pPr algn="ctr"/>
-                <a:endParaRPr lang="it-IT" dirty="0"/>
-              </a:p>
-            </p:txBody>
-          </p:sp>
-        </p:grpSp>
-        <p:sp>
-          <p:nvSpPr>
-            <p:cNvPr id="32" name="Rettangolo 31">
-              <a:extLst>
-                <a:ext uri="{FF2B5EF4-FFF2-40B4-BE49-F238E27FC236}">
-                  <a16:creationId xmlns:a16="http://schemas.microsoft.com/office/drawing/2014/main" id="{32742B76-F70D-AEAB-188A-7993FE8F157D}"/>
-                </a:ext>
-              </a:extLst>
-            </p:cNvPr>
-            <p:cNvSpPr/>
-            <p:nvPr/>
-          </p:nvSpPr>
-          <p:spPr>
-            <a:xfrm>
-              <a:off x="0" y="2533761"/>
-              <a:ext cx="864000" cy="576000"/>
-            </a:xfrm>
-            <a:prstGeom prst="rect">
-              <a:avLst/>
-            </a:prstGeom>
+            </a:endParaRPr>
+          </a:p>
+        </p:txBody>
+      </p:sp>
+      <p:sp>
+        <p:nvSpPr>
+          <p:cNvPr id="34" name="Connettore 33">
+            <a:extLst>
+              <a:ext uri="{FF2B5EF4-FFF2-40B4-BE49-F238E27FC236}">
+                <a16:creationId xmlns:a16="http://schemas.microsoft.com/office/drawing/2014/main" id="{E9F3CEF6-B728-12DB-4D52-46FA36DDB086}"/>
+              </a:ext>
+            </a:extLst>
+          </p:cNvPr>
+          <p:cNvSpPr/>
+          <p:nvPr/>
+        </p:nvSpPr>
+        <p:spPr>
+          <a:xfrm>
+            <a:off x="979598" y="4046835"/>
+            <a:ext cx="1224000" cy="1224000"/>
+          </a:xfrm>
+          <a:prstGeom prst="flowChartConnector">
+            <a:avLst/>
+          </a:prstGeom>
+          <a:solidFill>
+            <a:srgbClr val="E5FFF2"/>
+          </a:solidFill>
+          <a:ln>
             <a:solidFill>
-              <a:srgbClr val="29B76F"/>
+              <a:srgbClr val="00AA59"/>
             </a:solidFill>
-            <a:ln>
-              <a:noFill/>
-            </a:ln>
-          </p:spPr>
-          <p:style>
-            <a:lnRef idx="2">
-              <a:schemeClr val="accent1">
-                <a:shade val="15000"/>
-              </a:schemeClr>
-            </a:lnRef>
-            <a:fillRef idx="1">
-              <a:schemeClr val="accent1"/>
-            </a:fillRef>
-            <a:effectRef idx="0">
-              <a:schemeClr val="accent1"/>
-            </a:effectRef>
-            <a:fontRef idx="minor">
-              <a:schemeClr val="lt1"/>
-            </a:fontRef>
-          </p:style>
-          <p:txBody>
-            <a:bodyPr rtlCol="0" anchor="ctr"/>
-            <a:lstStyle/>
-            <a:p>
-              <a:pPr algn="ctr"/>
-              <a:endParaRPr lang="it-IT" dirty="0"/>
-            </a:p>
-          </p:txBody>
-        </p:sp>
-      </p:grpSp>
+          </a:ln>
+        </p:spPr>
+        <p:style>
+          <a:lnRef idx="2">
+            <a:schemeClr val="accent1">
+              <a:shade val="15000"/>
+            </a:schemeClr>
+          </a:lnRef>
+          <a:fillRef idx="1">
+            <a:schemeClr val="accent1"/>
+          </a:fillRef>
+          <a:effectRef idx="0">
+            <a:schemeClr val="accent1"/>
+          </a:effectRef>
+          <a:fontRef idx="minor">
+            <a:schemeClr val="lt1"/>
+          </a:fontRef>
+        </p:style>
+        <p:txBody>
+          <a:bodyPr rtlCol="0" anchor="ctr"/>
+          <a:lstStyle/>
+          <a:p>
+            <a:pPr algn="ctr"/>
+            <a:endParaRPr lang="it-IT" dirty="0"/>
+          </a:p>
+        </p:txBody>
+      </p:sp>
+      <p:sp>
+        <p:nvSpPr>
+          <p:cNvPr id="32" name="Rettangolo 31">
+            <a:extLst>
+              <a:ext uri="{FF2B5EF4-FFF2-40B4-BE49-F238E27FC236}">
+                <a16:creationId xmlns:a16="http://schemas.microsoft.com/office/drawing/2014/main" id="{32742B76-F70D-AEAB-188A-7993FE8F157D}"/>
+              </a:ext>
+            </a:extLst>
+          </p:cNvPr>
+          <p:cNvSpPr/>
+          <p:nvPr/>
+        </p:nvSpPr>
+        <p:spPr>
+          <a:xfrm>
+            <a:off x="0" y="4356148"/>
+            <a:ext cx="864000" cy="576000"/>
+          </a:xfrm>
+          <a:prstGeom prst="rect">
+            <a:avLst/>
+          </a:prstGeom>
+          <a:solidFill>
+            <a:srgbClr val="29B76F"/>
+          </a:solidFill>
+          <a:ln>
+            <a:noFill/>
+          </a:ln>
+        </p:spPr>
+        <p:style>
+          <a:lnRef idx="2">
+            <a:schemeClr val="accent1">
+              <a:shade val="15000"/>
+            </a:schemeClr>
+          </a:lnRef>
+          <a:fillRef idx="1">
+            <a:schemeClr val="accent1"/>
+          </a:fillRef>
+          <a:effectRef idx="0">
+            <a:schemeClr val="accent1"/>
+          </a:effectRef>
+          <a:fontRef idx="minor">
+            <a:schemeClr val="lt1"/>
+          </a:fontRef>
+        </p:style>
+        <p:txBody>
+          <a:bodyPr rtlCol="0" anchor="ctr"/>
+          <a:lstStyle/>
+          <a:p>
+            <a:pPr algn="ctr"/>
+            <a:endParaRPr lang="it-IT" dirty="0"/>
+          </a:p>
+        </p:txBody>
+      </p:sp>
       <p:pic>
         <p:nvPicPr>
-          <p:cNvPr id="10" name="Immagine 9" descr="Immagine che contiene Carattere, Elementi grafici, simbolo, design&#10;&#10;Descrizione generata automaticamente">
+          <p:cNvPr id="10" name="Immagine 9">
             <a:extLst>
               <a:ext uri="{FF2B5EF4-FFF2-40B4-BE49-F238E27FC236}">
                 <a16:creationId xmlns:a16="http://schemas.microsoft.com/office/drawing/2014/main" id="{56E4F37F-152E-134D-ADEF-5A1609046051}"/>
@@ -18819,9 +18733,8 @@
         </p:nvPicPr>
         <p:blipFill>
           <a:blip r:embed="rId2"/>
-          <a:stretch>
-            <a:fillRect/>
-          </a:stretch>
+          <a:srcRect/>
+          <a:stretch/>
         </p:blipFill>
         <p:spPr>
           <a:xfrm>
@@ -18835,7 +18748,7 @@
       </p:pic>
       <p:pic>
         <p:nvPicPr>
-          <p:cNvPr id="8" name="Immagine 7" descr="Immagine che contiene pixel, design&#10;&#10;Descrizione generata automaticamente con attendibilità media">
+          <p:cNvPr id="8" name="Immagine 7">
             <a:extLst>
               <a:ext uri="{FF2B5EF4-FFF2-40B4-BE49-F238E27FC236}">
                 <a16:creationId xmlns:a16="http://schemas.microsoft.com/office/drawing/2014/main" id="{2AC12FC1-964D-5192-7678-E8D084397140}"/>
@@ -18849,9 +18762,8 @@
         </p:nvPicPr>
         <p:blipFill>
           <a:blip r:embed="rId3"/>
-          <a:stretch>
-            <a:fillRect/>
-          </a:stretch>
+          <a:srcRect/>
+          <a:stretch/>
         </p:blipFill>
         <p:spPr>
           <a:xfrm>
@@ -19694,7 +19606,7 @@
         </p:blipFill>
         <p:spPr>
           <a:solidFill>
-            <a:srgbClr val="D9FFEC"/>
+            <a:srgbClr val="E5FFF2"/>
           </a:solidFill>
         </p:spPr>
       </p:pic>
@@ -20104,7 +20016,11 @@
           <a:srcRect/>
           <a:stretch/>
         </p:blipFill>
-        <p:spPr/>
+        <p:spPr>
+          <a:solidFill>
+            <a:srgbClr val="FFECCC"/>
+          </a:solidFill>
+        </p:spPr>
       </p:pic>
       <p:pic>
         <p:nvPicPr>
@@ -21388,12 +21304,23 @@
 </file>
 
 <file path=customXml/item1.xml><?xml version="1.0" encoding="utf-8"?>
-<?mso-contentType ?>
-<FormTemplates xmlns="http://schemas.microsoft.com/sharepoint/v3/contenttype/forms">
-  <Display>DocumentLibraryForm</Display>
-  <Edit>DocumentLibraryForm</Edit>
-  <New>DocumentLibraryForm</New>
-</FormTemplates>
+<p:properties xmlns:p="http://schemas.microsoft.com/office/2006/metadata/properties" xmlns:xsi="http://www.w3.org/2001/XMLSchema-instance" xmlns:pc="http://schemas.microsoft.com/office/infopath/2007/PartnerControls">
+  <documentManagement>
+    <_ip_UnifiedCompliancePolicyUIAction xmlns="http://schemas.microsoft.com/sharepoint/v3" xsi:nil="true"/>
+    <Image xmlns="71af3243-3dd4-4a8d-8c0d-dd76da1f02a5">
+      <Url xsi:nil="true"/>
+      <Description xsi:nil="true"/>
+    </Image>
+    <Status xmlns="71af3243-3dd4-4a8d-8c0d-dd76da1f02a5">Not started</Status>
+    <Background xmlns="71af3243-3dd4-4a8d-8c0d-dd76da1f02a5">false</Background>
+    <_ip_UnifiedCompliancePolicyProperties xmlns="http://schemas.microsoft.com/sharepoint/v3" xsi:nil="true"/>
+    <ImageTagsTaxHTField xmlns="71af3243-3dd4-4a8d-8c0d-dd76da1f02a5">
+      <Terms xmlns="http://schemas.microsoft.com/office/infopath/2007/PartnerControls"/>
+    </ImageTagsTaxHTField>
+    <TaxCatchAll xmlns="230e9df3-be65-4c73-a93b-d1236ebd677e" xsi:nil="true"/>
+    <MediaServiceKeyPoints xmlns="71af3243-3dd4-4a8d-8c0d-dd76da1f02a5" xsi:nil="true"/>
+  </documentManagement>
+</p:properties>
 </file>
 
 <file path=customXml/item2.xml><?xml version="1.0" encoding="utf-8"?>
@@ -21691,29 +21618,22 @@
 </file>
 
 <file path=customXml/item3.xml><?xml version="1.0" encoding="utf-8"?>
-<p:properties xmlns:p="http://schemas.microsoft.com/office/2006/metadata/properties" xmlns:xsi="http://www.w3.org/2001/XMLSchema-instance" xmlns:pc="http://schemas.microsoft.com/office/infopath/2007/PartnerControls">
-  <documentManagement>
-    <_ip_UnifiedCompliancePolicyUIAction xmlns="http://schemas.microsoft.com/sharepoint/v3" xsi:nil="true"/>
-    <Image xmlns="71af3243-3dd4-4a8d-8c0d-dd76da1f02a5">
-      <Url xsi:nil="true"/>
-      <Description xsi:nil="true"/>
-    </Image>
-    <Status xmlns="71af3243-3dd4-4a8d-8c0d-dd76da1f02a5">Not started</Status>
-    <Background xmlns="71af3243-3dd4-4a8d-8c0d-dd76da1f02a5">false</Background>
-    <_ip_UnifiedCompliancePolicyProperties xmlns="http://schemas.microsoft.com/sharepoint/v3" xsi:nil="true"/>
-    <ImageTagsTaxHTField xmlns="71af3243-3dd4-4a8d-8c0d-dd76da1f02a5">
-      <Terms xmlns="http://schemas.microsoft.com/office/infopath/2007/PartnerControls"/>
-    </ImageTagsTaxHTField>
-    <TaxCatchAll xmlns="230e9df3-be65-4c73-a93b-d1236ebd677e" xsi:nil="true"/>
-    <MediaServiceKeyPoints xmlns="71af3243-3dd4-4a8d-8c0d-dd76da1f02a5" xsi:nil="true"/>
-  </documentManagement>
-</p:properties>
+<?mso-contentType ?>
+<FormTemplates xmlns="http://schemas.microsoft.com/sharepoint/v3/contenttype/forms">
+  <Display>DocumentLibraryForm</Display>
+  <Edit>DocumentLibraryForm</Edit>
+  <New>DocumentLibraryForm</New>
+</FormTemplates>
 </file>
 
 <file path=customXml/itemProps1.xml><?xml version="1.0" encoding="utf-8"?>
-<ds:datastoreItem xmlns:ds="http://schemas.openxmlformats.org/officeDocument/2006/customXml" ds:itemID="{83441F37-C10B-49C7-9131-D813AD6E9480}">
+<ds:datastoreItem xmlns:ds="http://schemas.openxmlformats.org/officeDocument/2006/customXml" ds:itemID="{3065A588-1D2A-427C-AA32-A236D95C8F89}">
   <ds:schemaRefs>
-    <ds:schemaRef ds:uri="http://schemas.microsoft.com/sharepoint/v3/contenttype/forms"/>
+    <ds:schemaRef ds:uri="http://schemas.microsoft.com/office/2006/metadata/properties"/>
+    <ds:schemaRef ds:uri="http://schemas.microsoft.com/office/infopath/2007/PartnerControls"/>
+    <ds:schemaRef ds:uri="http://schemas.microsoft.com/sharepoint/v3"/>
+    <ds:schemaRef ds:uri="71af3243-3dd4-4a8d-8c0d-dd76da1f02a5"/>
+    <ds:schemaRef ds:uri="230e9df3-be65-4c73-a93b-d1236ebd677e"/>
   </ds:schemaRefs>
 </ds:datastoreItem>
 </file>
@@ -21740,13 +21660,9 @@
 </file>
 
 <file path=customXml/itemProps3.xml><?xml version="1.0" encoding="utf-8"?>
-<ds:datastoreItem xmlns:ds="http://schemas.openxmlformats.org/officeDocument/2006/customXml" ds:itemID="{3065A588-1D2A-427C-AA32-A236D95C8F89}">
+<ds:datastoreItem xmlns:ds="http://schemas.openxmlformats.org/officeDocument/2006/customXml" ds:itemID="{83441F37-C10B-49C7-9131-D813AD6E9480}">
   <ds:schemaRefs>
-    <ds:schemaRef ds:uri="http://schemas.microsoft.com/office/2006/metadata/properties"/>
-    <ds:schemaRef ds:uri="http://schemas.microsoft.com/office/infopath/2007/PartnerControls"/>
-    <ds:schemaRef ds:uri="http://schemas.microsoft.com/sharepoint/v3"/>
-    <ds:schemaRef ds:uri="71af3243-3dd4-4a8d-8c0d-dd76da1f02a5"/>
-    <ds:schemaRef ds:uri="230e9df3-be65-4c73-a93b-d1236ebd677e"/>
+    <ds:schemaRef ds:uri="http://schemas.microsoft.com/sharepoint/v3/contenttype/forms"/>
   </ds:schemaRefs>
 </ds:datastoreItem>
 </file>

</xml_diff>

<commit_message>
Modifiche parziali slide 3
Co-Authored-By: Enrico Faa <172625272+boss314@users.noreply.github.com>

Co-Authored-By: Luca Facchini <45771235+lucafano04@users.noreply.github.com>
</commit_message>
<xml_diff>
--- a/pitch.pptx
+++ b/pitch.pptx
@@ -5,17 +5,18 @@
     <p:sldMasterId id="2147483648" r:id="rId4"/>
   </p:sldMasterIdLst>
   <p:notesMasterIdLst>
-    <p:notesMasterId r:id="rId10"/>
+    <p:notesMasterId r:id="rId11"/>
   </p:notesMasterIdLst>
   <p:handoutMasterIdLst>
-    <p:handoutMasterId r:id="rId11"/>
+    <p:handoutMasterId r:id="rId12"/>
   </p:handoutMasterIdLst>
   <p:sldIdLst>
     <p:sldId id="258" r:id="rId5"/>
     <p:sldId id="261" r:id="rId6"/>
     <p:sldId id="262" r:id="rId7"/>
-    <p:sldId id="263" r:id="rId8"/>
-    <p:sldId id="260" r:id="rId9"/>
+    <p:sldId id="264" r:id="rId8"/>
+    <p:sldId id="263" r:id="rId9"/>
+    <p:sldId id="260" r:id="rId10"/>
   </p:sldIdLst>
   <p:sldSz cx="12192000" cy="6858000"/>
   <p:notesSz cx="6858000" cy="9144000"/>
@@ -879,7 +880,7 @@
             <a:pPr rtl="0"/>
             <a:fld id="{339D21CC-DD94-204E-93C8-E1AAF3084C8D}" type="slidenum">
               <a:rPr lang="it-IT" noProof="0" smtClean="0"/>
-              <a:t>4</a:t>
+              <a:t>5</a:t>
             </a:fld>
             <a:endParaRPr lang="it-IT" noProof="0"/>
           </a:p>
@@ -18953,7 +18954,9 @@
             <p:ph type="title"/>
           </p:nvPr>
         </p:nvSpPr>
-        <p:spPr/>
+        <p:spPr>
+          <a:noFill/>
+        </p:spPr>
         <p:txBody>
           <a:bodyPr/>
           <a:lstStyle/>
@@ -18962,42 +18965,6 @@
               <a:rPr lang="it-IT" dirty="0"/>
               <a:t>La nostra idea</a:t>
             </a:r>
-          </a:p>
-        </p:txBody>
-      </p:sp>
-      <p:sp>
-        <p:nvSpPr>
-          <p:cNvPr id="7" name="Segnaposto contenuto 6">
-            <a:extLst>
-              <a:ext uri="{FF2B5EF4-FFF2-40B4-BE49-F238E27FC236}">
-                <a16:creationId xmlns:a16="http://schemas.microsoft.com/office/drawing/2014/main" id="{6A059769-01F7-05F6-A999-9F4F5731B43E}"/>
-              </a:ext>
-            </a:extLst>
-          </p:cNvPr>
-          <p:cNvSpPr>
-            <a:spLocks noGrp="1"/>
-          </p:cNvSpPr>
-          <p:nvPr>
-            <p:ph idx="1"/>
-          </p:nvPr>
-        </p:nvSpPr>
-        <p:spPr>
-          <a:xfrm>
-            <a:off x="4949198" y="2252277"/>
-            <a:ext cx="6510528" cy="2353445"/>
-          </a:xfrm>
-        </p:spPr>
-        <p:txBody>
-          <a:bodyPr/>
-          <a:lstStyle/>
-          <a:p>
-            <a:r>
-              <a:rPr lang="it-IT" dirty="0"/>
-              <a:t>Una web app che permette di visualizzare in modo intuitivo e accessibile i dati necessari a prendere decisioni sui servizi pubblici (Un po’ di esempi non tutti di dati…)</a:t>
-            </a:r>
-          </a:p>
-          <a:p>
-            <a:endParaRPr lang="it-IT" dirty="0"/>
           </a:p>
         </p:txBody>
       </p:sp>
@@ -19070,7 +19037,7 @@
         </p:nvGrpSpPr>
         <p:grpSpPr>
           <a:xfrm>
-            <a:off x="732274" y="2528198"/>
+            <a:off x="732358" y="2528198"/>
             <a:ext cx="3485813" cy="2077524"/>
             <a:chOff x="848243" y="2528198"/>
             <a:chExt cx="3485813" cy="2077524"/>
@@ -19662,6 +19629,842 @@
       </p:grpSpPr>
       <p:sp>
         <p:nvSpPr>
+          <p:cNvPr id="20" name="Rettangolo 19">
+            <a:extLst>
+              <a:ext uri="{FF2B5EF4-FFF2-40B4-BE49-F238E27FC236}">
+                <a16:creationId xmlns:a16="http://schemas.microsoft.com/office/drawing/2014/main" id="{866E4E3A-A119-DB4C-9154-1FACCC46103C}"/>
+              </a:ext>
+            </a:extLst>
+          </p:cNvPr>
+          <p:cNvSpPr/>
+          <p:nvPr/>
+        </p:nvSpPr>
+        <p:spPr>
+          <a:xfrm>
+            <a:off x="10658969" y="1510336"/>
+            <a:ext cx="504000" cy="5364000"/>
+          </a:xfrm>
+          <a:prstGeom prst="rect">
+            <a:avLst/>
+          </a:prstGeom>
+          <a:solidFill>
+            <a:srgbClr val="FC2834"/>
+          </a:solidFill>
+          <a:ln>
+            <a:noFill/>
+          </a:ln>
+        </p:spPr>
+        <p:style>
+          <a:lnRef idx="2">
+            <a:schemeClr val="accent1">
+              <a:shade val="15000"/>
+            </a:schemeClr>
+          </a:lnRef>
+          <a:fillRef idx="1">
+            <a:schemeClr val="accent1"/>
+          </a:fillRef>
+          <a:effectRef idx="0">
+            <a:schemeClr val="accent1"/>
+          </a:effectRef>
+          <a:fontRef idx="minor">
+            <a:schemeClr val="lt1"/>
+          </a:fontRef>
+        </p:style>
+        <p:txBody>
+          <a:bodyPr rtlCol="0" anchor="ctr"/>
+          <a:lstStyle/>
+          <a:p>
+            <a:pPr algn="ctr"/>
+            <a:endParaRPr lang="it-IT" dirty="0"/>
+          </a:p>
+        </p:txBody>
+      </p:sp>
+      <p:sp>
+        <p:nvSpPr>
+          <p:cNvPr id="2" name="Titolo 1">
+            <a:extLst>
+              <a:ext uri="{FF2B5EF4-FFF2-40B4-BE49-F238E27FC236}">
+                <a16:creationId xmlns:a16="http://schemas.microsoft.com/office/drawing/2014/main" id="{63D93754-CD32-CAF7-E6B0-9C3A61D02B5D}"/>
+              </a:ext>
+            </a:extLst>
+          </p:cNvPr>
+          <p:cNvSpPr>
+            <a:spLocks noGrp="1"/>
+          </p:cNvSpPr>
+          <p:nvPr>
+            <p:ph type="title"/>
+          </p:nvPr>
+        </p:nvSpPr>
+        <p:spPr/>
+        <p:txBody>
+          <a:bodyPr/>
+          <a:lstStyle/>
+          <a:p>
+            <a:endParaRPr lang="it-IT" dirty="0"/>
+          </a:p>
+        </p:txBody>
+      </p:sp>
+      <p:sp>
+        <p:nvSpPr>
+          <p:cNvPr id="4" name="Segnaposto testo 3">
+            <a:extLst>
+              <a:ext uri="{FF2B5EF4-FFF2-40B4-BE49-F238E27FC236}">
+                <a16:creationId xmlns:a16="http://schemas.microsoft.com/office/drawing/2014/main" id="{60448CFD-BB69-6235-989B-D0F34CFED985}"/>
+              </a:ext>
+            </a:extLst>
+          </p:cNvPr>
+          <p:cNvSpPr>
+            <a:spLocks noGrp="1"/>
+          </p:cNvSpPr>
+          <p:nvPr>
+            <p:ph type="body" sz="quarter" idx="13"/>
+          </p:nvPr>
+        </p:nvSpPr>
+        <p:spPr/>
+        <p:txBody>
+          <a:bodyPr/>
+          <a:lstStyle/>
+          <a:p>
+            <a:endParaRPr lang="it-IT"/>
+          </a:p>
+        </p:txBody>
+      </p:sp>
+      <p:sp>
+        <p:nvSpPr>
+          <p:cNvPr id="5" name="Segnaposto numero diapositiva 4">
+            <a:extLst>
+              <a:ext uri="{FF2B5EF4-FFF2-40B4-BE49-F238E27FC236}">
+                <a16:creationId xmlns:a16="http://schemas.microsoft.com/office/drawing/2014/main" id="{770EBA85-A387-DD8C-0A68-C55447838ECA}"/>
+              </a:ext>
+            </a:extLst>
+          </p:cNvPr>
+          <p:cNvSpPr>
+            <a:spLocks noGrp="1"/>
+          </p:cNvSpPr>
+          <p:nvPr>
+            <p:ph type="sldNum" sz="quarter" idx="15"/>
+          </p:nvPr>
+        </p:nvSpPr>
+        <p:spPr/>
+        <p:txBody>
+          <a:bodyPr/>
+          <a:lstStyle/>
+          <a:p>
+            <a:pPr rtl="0"/>
+            <a:fld id="{CC43B8D3-9A08-F84C-9DD4-44948BA52D4B}" type="slidenum">
+              <a:rPr lang="it-IT" noProof="0" smtClean="0"/>
+              <a:pPr rtl="0"/>
+              <a:t>4</a:t>
+            </a:fld>
+            <a:endParaRPr lang="it-IT" noProof="0" dirty="0"/>
+          </a:p>
+        </p:txBody>
+      </p:sp>
+      <p:grpSp>
+        <p:nvGrpSpPr>
+          <p:cNvPr id="6" name="Gruppo 5">
+            <a:extLst>
+              <a:ext uri="{FF2B5EF4-FFF2-40B4-BE49-F238E27FC236}">
+                <a16:creationId xmlns:a16="http://schemas.microsoft.com/office/drawing/2014/main" id="{346F55CE-AA00-8403-5636-F61DB890C0D8}"/>
+              </a:ext>
+            </a:extLst>
+          </p:cNvPr>
+          <p:cNvGrpSpPr/>
+          <p:nvPr/>
+        </p:nvGrpSpPr>
+        <p:grpSpPr>
+          <a:xfrm>
+            <a:off x="694691" y="2960817"/>
+            <a:ext cx="3485813" cy="2077524"/>
+            <a:chOff x="848243" y="2528198"/>
+            <a:chExt cx="3485813" cy="2077524"/>
+          </a:xfrm>
+        </p:grpSpPr>
+        <p:pic>
+          <p:nvPicPr>
+            <p:cNvPr id="7" name="Immagine 6" descr="Immagine che contiene verde, linea, design">
+              <a:extLst>
+                <a:ext uri="{FF2B5EF4-FFF2-40B4-BE49-F238E27FC236}">
+                  <a16:creationId xmlns:a16="http://schemas.microsoft.com/office/drawing/2014/main" id="{92D7E29D-04F9-D3AE-C2CF-51C400055D39}"/>
+                </a:ext>
+              </a:extLst>
+            </p:cNvPr>
+            <p:cNvPicPr>
+              <a:picLocks noChangeAspect="1"/>
+            </p:cNvPicPr>
+            <p:nvPr/>
+          </p:nvPicPr>
+          <p:blipFill>
+            <a:blip r:embed="rId2"/>
+            <a:stretch>
+              <a:fillRect/>
+            </a:stretch>
+          </p:blipFill>
+          <p:spPr>
+            <a:xfrm>
+              <a:off x="848243" y="2540757"/>
+              <a:ext cx="3485813" cy="2064965"/>
+            </a:xfrm>
+            <a:prstGeom prst="rect">
+              <a:avLst/>
+            </a:prstGeom>
+            <a:ln>
+              <a:noFill/>
+            </a:ln>
+          </p:spPr>
+        </p:pic>
+        <p:grpSp>
+          <p:nvGrpSpPr>
+            <p:cNvPr id="8" name="Gruppo 7">
+              <a:extLst>
+                <a:ext uri="{FF2B5EF4-FFF2-40B4-BE49-F238E27FC236}">
+                  <a16:creationId xmlns:a16="http://schemas.microsoft.com/office/drawing/2014/main" id="{BC15FFC2-6563-1A8E-42C7-6304704F3A92}"/>
+                </a:ext>
+              </a:extLst>
+            </p:cNvPr>
+            <p:cNvGrpSpPr/>
+            <p:nvPr/>
+          </p:nvGrpSpPr>
+          <p:grpSpPr>
+            <a:xfrm>
+              <a:off x="2644340" y="2528198"/>
+              <a:ext cx="258577" cy="257550"/>
+              <a:chOff x="3043962" y="1728000"/>
+              <a:chExt cx="258577" cy="257550"/>
+            </a:xfrm>
+          </p:grpSpPr>
+          <p:sp>
+            <p:nvSpPr>
+              <p:cNvPr id="18" name="Goccia 17">
+                <a:extLst>
+                  <a:ext uri="{FF2B5EF4-FFF2-40B4-BE49-F238E27FC236}">
+                    <a16:creationId xmlns:a16="http://schemas.microsoft.com/office/drawing/2014/main" id="{54517DF7-0402-A92B-E243-ECD30B6C72AB}"/>
+                  </a:ext>
+                </a:extLst>
+              </p:cNvPr>
+              <p:cNvSpPr>
+                <a:spLocks/>
+              </p:cNvSpPr>
+              <p:nvPr/>
+            </p:nvSpPr>
+            <p:spPr>
+              <a:xfrm rot="8093158">
+                <a:off x="3044476" y="1727486"/>
+                <a:ext cx="257550" cy="258577"/>
+              </a:xfrm>
+              <a:prstGeom prst="teardrop">
+                <a:avLst>
+                  <a:gd name="adj" fmla="val 106043"/>
+                </a:avLst>
+              </a:prstGeom>
+              <a:solidFill>
+                <a:srgbClr val="FEAF26"/>
+              </a:solidFill>
+              <a:ln>
+                <a:solidFill>
+                  <a:schemeClr val="tx1"/>
+                </a:solidFill>
+              </a:ln>
+            </p:spPr>
+            <p:style>
+              <a:lnRef idx="2">
+                <a:schemeClr val="accent1">
+                  <a:shade val="15000"/>
+                </a:schemeClr>
+              </a:lnRef>
+              <a:fillRef idx="1">
+                <a:schemeClr val="accent1"/>
+              </a:fillRef>
+              <a:effectRef idx="0">
+                <a:schemeClr val="accent1"/>
+              </a:effectRef>
+              <a:fontRef idx="minor">
+                <a:schemeClr val="lt1"/>
+              </a:fontRef>
+            </p:style>
+            <p:txBody>
+              <a:bodyPr rtlCol="0" anchor="ctr"/>
+              <a:lstStyle/>
+              <a:p>
+                <a:pPr algn="ctr"/>
+                <a:endParaRPr lang="it-IT"/>
+              </a:p>
+            </p:txBody>
+          </p:sp>
+          <p:sp>
+            <p:nvSpPr>
+              <p:cNvPr id="19" name="Connettore 18">
+                <a:extLst>
+                  <a:ext uri="{FF2B5EF4-FFF2-40B4-BE49-F238E27FC236}">
+                    <a16:creationId xmlns:a16="http://schemas.microsoft.com/office/drawing/2014/main" id="{42B0C225-019E-0EF3-91EF-4FC6A6578363}"/>
+                  </a:ext>
+                </a:extLst>
+              </p:cNvPr>
+              <p:cNvSpPr>
+                <a:spLocks/>
+              </p:cNvSpPr>
+              <p:nvPr/>
+            </p:nvSpPr>
+            <p:spPr>
+              <a:xfrm flipH="1">
+                <a:off x="3100419" y="1793774"/>
+                <a:ext cx="126000" cy="126000"/>
+              </a:xfrm>
+              <a:prstGeom prst="flowChartConnector">
+                <a:avLst/>
+              </a:prstGeom>
+              <a:solidFill>
+                <a:srgbClr val="FDF9E2"/>
+              </a:solidFill>
+            </p:spPr>
+            <p:style>
+              <a:lnRef idx="2">
+                <a:schemeClr val="accent1">
+                  <a:shade val="15000"/>
+                </a:schemeClr>
+              </a:lnRef>
+              <a:fillRef idx="1">
+                <a:schemeClr val="accent1"/>
+              </a:fillRef>
+              <a:effectRef idx="0">
+                <a:schemeClr val="accent1"/>
+              </a:effectRef>
+              <a:fontRef idx="minor">
+                <a:schemeClr val="lt1"/>
+              </a:fontRef>
+            </p:style>
+            <p:txBody>
+              <a:bodyPr rtlCol="0" anchor="ctr"/>
+              <a:lstStyle/>
+              <a:p>
+                <a:pPr algn="ctr"/>
+                <a:endParaRPr lang="it-IT" dirty="0"/>
+              </a:p>
+            </p:txBody>
+          </p:sp>
+        </p:grpSp>
+        <p:grpSp>
+          <p:nvGrpSpPr>
+            <p:cNvPr id="9" name="Gruppo 8">
+              <a:extLst>
+                <a:ext uri="{FF2B5EF4-FFF2-40B4-BE49-F238E27FC236}">
+                  <a16:creationId xmlns:a16="http://schemas.microsoft.com/office/drawing/2014/main" id="{1CF3C0BB-9E44-30E8-AED3-2AF261809F90}"/>
+                </a:ext>
+              </a:extLst>
+            </p:cNvPr>
+            <p:cNvGrpSpPr/>
+            <p:nvPr/>
+          </p:nvGrpSpPr>
+          <p:grpSpPr>
+            <a:xfrm>
+              <a:off x="3201647" y="3047466"/>
+              <a:ext cx="258577" cy="257550"/>
+              <a:chOff x="3043962" y="1728000"/>
+              <a:chExt cx="258577" cy="257550"/>
+            </a:xfrm>
+          </p:grpSpPr>
+          <p:sp>
+            <p:nvSpPr>
+              <p:cNvPr id="16" name="Goccia 15">
+                <a:extLst>
+                  <a:ext uri="{FF2B5EF4-FFF2-40B4-BE49-F238E27FC236}">
+                    <a16:creationId xmlns:a16="http://schemas.microsoft.com/office/drawing/2014/main" id="{1815318D-44D0-5E8D-4FBF-2906FD355BC2}"/>
+                  </a:ext>
+                </a:extLst>
+              </p:cNvPr>
+              <p:cNvSpPr>
+                <a:spLocks/>
+              </p:cNvSpPr>
+              <p:nvPr/>
+            </p:nvSpPr>
+            <p:spPr>
+              <a:xfrm rot="8093158">
+                <a:off x="3044476" y="1727486"/>
+                <a:ext cx="257550" cy="258577"/>
+              </a:xfrm>
+              <a:prstGeom prst="teardrop">
+                <a:avLst>
+                  <a:gd name="adj" fmla="val 106043"/>
+                </a:avLst>
+              </a:prstGeom>
+              <a:solidFill>
+                <a:srgbClr val="29B76F"/>
+              </a:solidFill>
+              <a:ln>
+                <a:solidFill>
+                  <a:schemeClr val="tx1"/>
+                </a:solidFill>
+              </a:ln>
+            </p:spPr>
+            <p:style>
+              <a:lnRef idx="2">
+                <a:schemeClr val="accent1">
+                  <a:shade val="15000"/>
+                </a:schemeClr>
+              </a:lnRef>
+              <a:fillRef idx="1">
+                <a:schemeClr val="accent1"/>
+              </a:fillRef>
+              <a:effectRef idx="0">
+                <a:schemeClr val="accent1"/>
+              </a:effectRef>
+              <a:fontRef idx="minor">
+                <a:schemeClr val="lt1"/>
+              </a:fontRef>
+            </p:style>
+            <p:txBody>
+              <a:bodyPr rtlCol="0" anchor="ctr"/>
+              <a:lstStyle/>
+              <a:p>
+                <a:pPr algn="ctr"/>
+                <a:endParaRPr lang="it-IT"/>
+              </a:p>
+            </p:txBody>
+          </p:sp>
+          <p:sp>
+            <p:nvSpPr>
+              <p:cNvPr id="17" name="Connettore 16">
+                <a:extLst>
+                  <a:ext uri="{FF2B5EF4-FFF2-40B4-BE49-F238E27FC236}">
+                    <a16:creationId xmlns:a16="http://schemas.microsoft.com/office/drawing/2014/main" id="{FAF35D03-287D-CC83-D659-B4832F451EA1}"/>
+                  </a:ext>
+                </a:extLst>
+              </p:cNvPr>
+              <p:cNvSpPr>
+                <a:spLocks/>
+              </p:cNvSpPr>
+              <p:nvPr/>
+            </p:nvSpPr>
+            <p:spPr>
+              <a:xfrm flipH="1">
+                <a:off x="3111083" y="1784774"/>
+                <a:ext cx="126000" cy="126000"/>
+              </a:xfrm>
+              <a:prstGeom prst="flowChartConnector">
+                <a:avLst/>
+              </a:prstGeom>
+              <a:solidFill>
+                <a:srgbClr val="FDF9E2"/>
+              </a:solidFill>
+            </p:spPr>
+            <p:style>
+              <a:lnRef idx="2">
+                <a:schemeClr val="accent1">
+                  <a:shade val="15000"/>
+                </a:schemeClr>
+              </a:lnRef>
+              <a:fillRef idx="1">
+                <a:schemeClr val="accent1"/>
+              </a:fillRef>
+              <a:effectRef idx="0">
+                <a:schemeClr val="accent1"/>
+              </a:effectRef>
+              <a:fontRef idx="minor">
+                <a:schemeClr val="lt1"/>
+              </a:fontRef>
+            </p:style>
+            <p:txBody>
+              <a:bodyPr rtlCol="0" anchor="ctr"/>
+              <a:lstStyle/>
+              <a:p>
+                <a:pPr algn="ctr"/>
+                <a:endParaRPr lang="it-IT" dirty="0"/>
+              </a:p>
+            </p:txBody>
+          </p:sp>
+        </p:grpSp>
+        <p:grpSp>
+          <p:nvGrpSpPr>
+            <p:cNvPr id="10" name="Gruppo 9">
+              <a:extLst>
+                <a:ext uri="{FF2B5EF4-FFF2-40B4-BE49-F238E27FC236}">
+                  <a16:creationId xmlns:a16="http://schemas.microsoft.com/office/drawing/2014/main" id="{65653FAC-1599-370F-0CCD-8A503E301E24}"/>
+                </a:ext>
+              </a:extLst>
+            </p:cNvPr>
+            <p:cNvGrpSpPr/>
+            <p:nvPr/>
+          </p:nvGrpSpPr>
+          <p:grpSpPr>
+            <a:xfrm>
+              <a:off x="2308309" y="3529695"/>
+              <a:ext cx="258577" cy="257550"/>
+              <a:chOff x="3043962" y="1728000"/>
+              <a:chExt cx="258577" cy="257550"/>
+            </a:xfrm>
+          </p:grpSpPr>
+          <p:sp>
+            <p:nvSpPr>
+              <p:cNvPr id="14" name="Goccia 13">
+                <a:extLst>
+                  <a:ext uri="{FF2B5EF4-FFF2-40B4-BE49-F238E27FC236}">
+                    <a16:creationId xmlns:a16="http://schemas.microsoft.com/office/drawing/2014/main" id="{BAABFEF9-49C7-1B1E-ECCE-D4728084E86F}"/>
+                  </a:ext>
+                </a:extLst>
+              </p:cNvPr>
+              <p:cNvSpPr>
+                <a:spLocks/>
+              </p:cNvSpPr>
+              <p:nvPr/>
+            </p:nvSpPr>
+            <p:spPr>
+              <a:xfrm rot="8093158">
+                <a:off x="3044476" y="1727486"/>
+                <a:ext cx="257550" cy="258577"/>
+              </a:xfrm>
+              <a:prstGeom prst="teardrop">
+                <a:avLst>
+                  <a:gd name="adj" fmla="val 106043"/>
+                </a:avLst>
+              </a:prstGeom>
+              <a:solidFill>
+                <a:schemeClr val="accent1"/>
+              </a:solidFill>
+              <a:ln>
+                <a:solidFill>
+                  <a:schemeClr val="tx1"/>
+                </a:solidFill>
+              </a:ln>
+            </p:spPr>
+            <p:style>
+              <a:lnRef idx="2">
+                <a:schemeClr val="accent1">
+                  <a:shade val="15000"/>
+                </a:schemeClr>
+              </a:lnRef>
+              <a:fillRef idx="1">
+                <a:schemeClr val="accent1"/>
+              </a:fillRef>
+              <a:effectRef idx="0">
+                <a:schemeClr val="accent1"/>
+              </a:effectRef>
+              <a:fontRef idx="minor">
+                <a:schemeClr val="lt1"/>
+              </a:fontRef>
+            </p:style>
+            <p:txBody>
+              <a:bodyPr rtlCol="0" anchor="ctr"/>
+              <a:lstStyle/>
+              <a:p>
+                <a:pPr algn="ctr"/>
+                <a:endParaRPr lang="it-IT"/>
+              </a:p>
+            </p:txBody>
+          </p:sp>
+          <p:sp>
+            <p:nvSpPr>
+              <p:cNvPr id="15" name="Connettore 14">
+                <a:extLst>
+                  <a:ext uri="{FF2B5EF4-FFF2-40B4-BE49-F238E27FC236}">
+                    <a16:creationId xmlns:a16="http://schemas.microsoft.com/office/drawing/2014/main" id="{C864A71D-4CED-726F-0550-268B3E8C7192}"/>
+                  </a:ext>
+                </a:extLst>
+              </p:cNvPr>
+              <p:cNvSpPr>
+                <a:spLocks/>
+              </p:cNvSpPr>
+              <p:nvPr/>
+            </p:nvSpPr>
+            <p:spPr>
+              <a:xfrm flipH="1">
+                <a:off x="3101251" y="1784774"/>
+                <a:ext cx="126000" cy="126000"/>
+              </a:xfrm>
+              <a:prstGeom prst="flowChartConnector">
+                <a:avLst/>
+              </a:prstGeom>
+              <a:solidFill>
+                <a:srgbClr val="FDF9E2"/>
+              </a:solidFill>
+            </p:spPr>
+            <p:style>
+              <a:lnRef idx="2">
+                <a:schemeClr val="accent1">
+                  <a:shade val="15000"/>
+                </a:schemeClr>
+              </a:lnRef>
+              <a:fillRef idx="1">
+                <a:schemeClr val="accent1"/>
+              </a:fillRef>
+              <a:effectRef idx="0">
+                <a:schemeClr val="accent1"/>
+              </a:effectRef>
+              <a:fontRef idx="minor">
+                <a:schemeClr val="lt1"/>
+              </a:fontRef>
+            </p:style>
+            <p:txBody>
+              <a:bodyPr rtlCol="0" anchor="ctr"/>
+              <a:lstStyle/>
+              <a:p>
+                <a:pPr algn="ctr"/>
+                <a:endParaRPr lang="it-IT" dirty="0"/>
+              </a:p>
+            </p:txBody>
+          </p:sp>
+        </p:grpSp>
+        <p:grpSp>
+          <p:nvGrpSpPr>
+            <p:cNvPr id="11" name="Gruppo 10">
+              <a:extLst>
+                <a:ext uri="{FF2B5EF4-FFF2-40B4-BE49-F238E27FC236}">
+                  <a16:creationId xmlns:a16="http://schemas.microsoft.com/office/drawing/2014/main" id="{880F093F-4D42-0B39-1E93-87F2C53A9591}"/>
+                </a:ext>
+              </a:extLst>
+            </p:cNvPr>
+            <p:cNvGrpSpPr/>
+            <p:nvPr/>
+          </p:nvGrpSpPr>
+          <p:grpSpPr>
+            <a:xfrm>
+              <a:off x="1739773" y="2975465"/>
+              <a:ext cx="258577" cy="257550"/>
+              <a:chOff x="3043962" y="1728000"/>
+              <a:chExt cx="258577" cy="257550"/>
+            </a:xfrm>
+          </p:grpSpPr>
+          <p:sp>
+            <p:nvSpPr>
+              <p:cNvPr id="12" name="Goccia 11">
+                <a:extLst>
+                  <a:ext uri="{FF2B5EF4-FFF2-40B4-BE49-F238E27FC236}">
+                    <a16:creationId xmlns:a16="http://schemas.microsoft.com/office/drawing/2014/main" id="{FBE28257-92A1-2D8F-A5BA-C46CD5B32491}"/>
+                  </a:ext>
+                </a:extLst>
+              </p:cNvPr>
+              <p:cNvSpPr>
+                <a:spLocks/>
+              </p:cNvSpPr>
+              <p:nvPr/>
+            </p:nvSpPr>
+            <p:spPr>
+              <a:xfrm rot="8093158">
+                <a:off x="3044476" y="1727486"/>
+                <a:ext cx="257550" cy="258577"/>
+              </a:xfrm>
+              <a:prstGeom prst="teardrop">
+                <a:avLst>
+                  <a:gd name="adj" fmla="val 106043"/>
+                </a:avLst>
+              </a:prstGeom>
+              <a:solidFill>
+                <a:srgbClr val="29B76F"/>
+              </a:solidFill>
+              <a:ln>
+                <a:solidFill>
+                  <a:schemeClr val="tx1"/>
+                </a:solidFill>
+              </a:ln>
+            </p:spPr>
+            <p:style>
+              <a:lnRef idx="2">
+                <a:schemeClr val="accent1">
+                  <a:shade val="15000"/>
+                </a:schemeClr>
+              </a:lnRef>
+              <a:fillRef idx="1">
+                <a:schemeClr val="accent1"/>
+              </a:fillRef>
+              <a:effectRef idx="0">
+                <a:schemeClr val="accent1"/>
+              </a:effectRef>
+              <a:fontRef idx="minor">
+                <a:schemeClr val="lt1"/>
+              </a:fontRef>
+            </p:style>
+            <p:txBody>
+              <a:bodyPr rtlCol="0" anchor="ctr"/>
+              <a:lstStyle/>
+              <a:p>
+                <a:pPr algn="ctr"/>
+                <a:endParaRPr lang="it-IT"/>
+              </a:p>
+            </p:txBody>
+          </p:sp>
+          <p:sp>
+            <p:nvSpPr>
+              <p:cNvPr id="13" name="Connettore 12">
+                <a:extLst>
+                  <a:ext uri="{FF2B5EF4-FFF2-40B4-BE49-F238E27FC236}">
+                    <a16:creationId xmlns:a16="http://schemas.microsoft.com/office/drawing/2014/main" id="{085AED26-A11C-8ECC-C90E-74DCA10B4CCA}"/>
+                  </a:ext>
+                </a:extLst>
+              </p:cNvPr>
+              <p:cNvSpPr>
+                <a:spLocks/>
+              </p:cNvSpPr>
+              <p:nvPr/>
+            </p:nvSpPr>
+            <p:spPr>
+              <a:xfrm flipH="1">
+                <a:off x="3101251" y="1784774"/>
+                <a:ext cx="126000" cy="126000"/>
+              </a:xfrm>
+              <a:prstGeom prst="flowChartConnector">
+                <a:avLst/>
+              </a:prstGeom>
+              <a:solidFill>
+                <a:srgbClr val="FDF9E2"/>
+              </a:solidFill>
+            </p:spPr>
+            <p:style>
+              <a:lnRef idx="2">
+                <a:schemeClr val="accent1">
+                  <a:shade val="15000"/>
+                </a:schemeClr>
+              </a:lnRef>
+              <a:fillRef idx="1">
+                <a:schemeClr val="accent1"/>
+              </a:fillRef>
+              <a:effectRef idx="0">
+                <a:schemeClr val="accent1"/>
+              </a:effectRef>
+              <a:fontRef idx="minor">
+                <a:schemeClr val="lt1"/>
+              </a:fontRef>
+            </p:style>
+            <p:txBody>
+              <a:bodyPr rtlCol="0" anchor="ctr"/>
+              <a:lstStyle/>
+              <a:p>
+                <a:pPr algn="ctr"/>
+                <a:endParaRPr lang="it-IT" dirty="0"/>
+              </a:p>
+            </p:txBody>
+          </p:sp>
+        </p:grpSp>
+      </p:grpSp>
+      <p:sp>
+        <p:nvSpPr>
+          <p:cNvPr id="23" name="CasellaDiTesto 22">
+            <a:extLst>
+              <a:ext uri="{FF2B5EF4-FFF2-40B4-BE49-F238E27FC236}">
+                <a16:creationId xmlns:a16="http://schemas.microsoft.com/office/drawing/2014/main" id="{F3514DCC-7B24-E97F-3393-9A14306BD68F}"/>
+              </a:ext>
+            </a:extLst>
+          </p:cNvPr>
+          <p:cNvSpPr txBox="1"/>
+          <p:nvPr/>
+        </p:nvSpPr>
+        <p:spPr>
+          <a:xfrm>
+            <a:off x="5830529" y="2615381"/>
+            <a:ext cx="2644877" cy="923330"/>
+          </a:xfrm>
+          <a:prstGeom prst="rect">
+            <a:avLst/>
+          </a:prstGeom>
+          <a:noFill/>
+        </p:spPr>
+        <p:txBody>
+          <a:bodyPr wrap="square" rtlCol="0">
+            <a:spAutoFit/>
+          </a:bodyPr>
+          <a:lstStyle/>
+          <a:p>
+            <a:r>
+              <a:rPr lang="it-IT" dirty="0"/>
+              <a:t>Raccolta dati</a:t>
+            </a:r>
+            <a:br>
+              <a:rPr lang="it-IT" dirty="0"/>
+            </a:br>
+            <a:r>
+              <a:rPr lang="it-IT" dirty="0"/>
+              <a:t>Decisioni</a:t>
+            </a:r>
+            <a:br>
+              <a:rPr lang="it-IT" dirty="0"/>
+            </a:br>
+            <a:r>
+              <a:rPr lang="it-IT" dirty="0" err="1"/>
+              <a:t>Riscrontro</a:t>
+            </a:r>
+            <a:endParaRPr lang="it-IT" dirty="0"/>
+          </a:p>
+        </p:txBody>
+      </p:sp>
+      <p:sp>
+        <p:nvSpPr>
+          <p:cNvPr id="28" name="Rettangolo 27">
+            <a:extLst>
+              <a:ext uri="{FF2B5EF4-FFF2-40B4-BE49-F238E27FC236}">
+                <a16:creationId xmlns:a16="http://schemas.microsoft.com/office/drawing/2014/main" id="{EA9179F1-ABB7-813B-4B93-384673C4CEE4}"/>
+              </a:ext>
+            </a:extLst>
+          </p:cNvPr>
+          <p:cNvSpPr/>
+          <p:nvPr/>
+        </p:nvSpPr>
+        <p:spPr>
+          <a:xfrm>
+            <a:off x="10658969" y="-9833"/>
+            <a:ext cx="504000" cy="403123"/>
+          </a:xfrm>
+          <a:prstGeom prst="rect">
+            <a:avLst/>
+          </a:prstGeom>
+          <a:ln>
+            <a:noFill/>
+          </a:ln>
+        </p:spPr>
+        <p:style>
+          <a:lnRef idx="2">
+            <a:schemeClr val="accent1">
+              <a:shade val="15000"/>
+            </a:schemeClr>
+          </a:lnRef>
+          <a:fillRef idx="1">
+            <a:schemeClr val="accent1"/>
+          </a:fillRef>
+          <a:effectRef idx="0">
+            <a:schemeClr val="accent1"/>
+          </a:effectRef>
+          <a:fontRef idx="minor">
+            <a:schemeClr val="lt1"/>
+          </a:fontRef>
+        </p:style>
+        <p:txBody>
+          <a:bodyPr rtlCol="0" anchor="ctr"/>
+          <a:lstStyle/>
+          <a:p>
+            <a:pPr algn="ctr"/>
+            <a:endParaRPr lang="it-IT"/>
+          </a:p>
+        </p:txBody>
+      </p:sp>
+    </p:spTree>
+    <p:extLst>
+      <p:ext uri="{BB962C8B-B14F-4D97-AF65-F5344CB8AC3E}">
+        <p14:creationId xmlns:p14="http://schemas.microsoft.com/office/powerpoint/2010/main" val="1734087158"/>
+      </p:ext>
+    </p:extLst>
+  </p:cSld>
+  <p:clrMapOvr>
+    <a:masterClrMapping/>
+  </p:clrMapOvr>
+</p:sld>
+</file>
+
+<file path=ppt/slides/slide5.xml><?xml version="1.0" encoding="utf-8"?>
+<p:sld xmlns:a="http://schemas.openxmlformats.org/drawingml/2006/main" xmlns:r="http://schemas.openxmlformats.org/officeDocument/2006/relationships" xmlns:p="http://schemas.openxmlformats.org/presentationml/2006/main">
+  <p:cSld>
+    <p:spTree>
+      <p:nvGrpSpPr>
+        <p:cNvPr id="1" name=""/>
+        <p:cNvGrpSpPr/>
+        <p:nvPr/>
+      </p:nvGrpSpPr>
+      <p:grpSpPr>
+        <a:xfrm>
+          <a:off x="0" y="0"/>
+          <a:ext cx="0" cy="0"/>
+          <a:chOff x="0" y="0"/>
+          <a:chExt cx="0" cy="0"/>
+        </a:xfrm>
+      </p:grpSpPr>
+      <p:sp>
+        <p:nvSpPr>
           <p:cNvPr id="2" name="Titolo 1">
             <a:extLst>
               <a:ext uri="{FF2B5EF4-FFF2-40B4-BE49-F238E27FC236}">
@@ -20192,7 +20995,7 @@
 </p:sld>
 </file>
 
-<file path=ppt/slides/slide5.xml><?xml version="1.0" encoding="utf-8"?>
+<file path=ppt/slides/slide6.xml><?xml version="1.0" encoding="utf-8"?>
 <p:sld xmlns:a="http://schemas.openxmlformats.org/drawingml/2006/main" xmlns:r="http://schemas.openxmlformats.org/officeDocument/2006/relationships" xmlns:p="http://schemas.openxmlformats.org/presentationml/2006/main">
   <p:cSld>
     <p:spTree>

</xml_diff>

<commit_message>
Modifiche finali slide 2 e 3
Co-Authored-By: Enrico Faa <172625272+boss314@users.noreply.github.com>
</commit_message>
<xml_diff>
--- a/pitch.pptx
+++ b/pitch.pptx
@@ -258,7 +258,7 @@
             <a:pPr rtl="0"/>
             <a:fld id="{F89E88F4-14A3-4F0D-ACEB-E3513661AA41}" type="datetime1">
               <a:rPr lang="it-IT" smtClean="0"/>
-              <a:t>23/09/2024</a:t>
+              <a:t>25/09/2024</a:t>
             </a:fld>
             <a:endParaRPr lang="it-IT" dirty="0"/>
           </a:p>
@@ -440,7 +440,7 @@
             <a:fld id="{72556EB7-85BF-4576-875A-5B0CD80C40E6}" type="datetime1">
               <a:rPr lang="it-IT" smtClean="0"/>
               <a:pPr/>
-              <a:t>23/09/2024</a:t>
+              <a:t>25/09/2024</a:t>
             </a:fld>
             <a:endParaRPr lang="it-IT" dirty="0"/>
           </a:p>
@@ -19099,7 +19099,7 @@
           <a:bodyPr/>
           <a:lstStyle/>
           <a:p>
-            <a:endParaRPr lang="it-IT"/>
+            <a:endParaRPr lang="it-IT" dirty="0"/>
           </a:p>
         </p:txBody>
       </p:sp>
@@ -20319,7 +20319,7 @@
             </a:pPr>
             <a:r>
               <a:rPr lang="it-IT" sz="2000" dirty="0"/>
-              <a:t>Riscontro</a:t>
+              <a:t>Feedback</a:t>
             </a:r>
           </a:p>
         </p:txBody>
@@ -20617,8 +20617,8 @@
         </p:nvSpPr>
         <p:spPr>
           <a:xfrm rot="10800000">
-            <a:off x="11454848" y="345440"/>
-            <a:ext cx="737150" cy="432000"/>
+            <a:off x="11468398" y="345440"/>
+            <a:ext cx="723600" cy="432000"/>
           </a:xfrm>
           <a:prstGeom prst="triangle">
             <a:avLst>
@@ -20668,8 +20668,8 @@
         </p:nvSpPr>
         <p:spPr>
           <a:xfrm>
-            <a:off x="11078930" y="-26361"/>
-            <a:ext cx="737150" cy="432000"/>
+            <a:off x="11078930" y="-29013"/>
+            <a:ext cx="737150" cy="432001"/>
           </a:xfrm>
           <a:prstGeom prst="triangle">
             <a:avLst>
@@ -21077,8 +21077,8 @@
         </p:nvSpPr>
         <p:spPr>
           <a:xfrm>
-            <a:off x="7540626" y="3259145"/>
-            <a:ext cx="5431437" cy="923330"/>
+            <a:off x="7657040" y="3301551"/>
+            <a:ext cx="4210054" cy="738664"/>
           </a:xfrm>
           <a:prstGeom prst="rect">
             <a:avLst/>
@@ -21092,21 +21092,8 @@
           <a:lstStyle/>
           <a:p>
             <a:r>
-              <a:rPr lang="it-IT" dirty="0"/>
-              <a:t>Testo molto importante</a:t>
-            </a:r>
-            <a:br>
-              <a:rPr lang="it-IT" dirty="0"/>
-            </a:br>
-            <a:r>
-              <a:rPr lang="it-IT" dirty="0"/>
-              <a:t>descrizione più accurata di tutto </a:t>
-            </a:r>
-          </a:p>
-          <a:p>
-            <a:r>
-              <a:rPr lang="it-IT" dirty="0"/>
-              <a:t>ciò che succede</a:t>
+              <a:rPr lang="it-IT" sz="1400" dirty="0"/>
+              <a:t>Attraverso dei sondaggi verranno raccolti i dati riguardanti la soddisfazione dei cittadini</a:t>
             </a:r>
           </a:p>
         </p:txBody>
@@ -21125,8 +21112,8 @@
         </p:nvSpPr>
         <p:spPr>
           <a:xfrm>
-            <a:off x="5660896" y="4427009"/>
-            <a:ext cx="5431437" cy="923330"/>
+            <a:off x="5681199" y="4446417"/>
+            <a:ext cx="4210054" cy="738664"/>
           </a:xfrm>
           <a:prstGeom prst="rect">
             <a:avLst/>
@@ -21140,21 +21127,8 @@
           <a:lstStyle/>
           <a:p>
             <a:r>
-              <a:rPr lang="it-IT" dirty="0"/>
-              <a:t>Testo molto importante</a:t>
-            </a:r>
-            <a:br>
-              <a:rPr lang="it-IT" dirty="0"/>
-            </a:br>
-            <a:r>
-              <a:rPr lang="it-IT" dirty="0"/>
-              <a:t>descrizione più accurata di tutto ciò</a:t>
-            </a:r>
-          </a:p>
-          <a:p>
-            <a:r>
-              <a:rPr lang="it-IT" dirty="0"/>
-              <a:t>che succede</a:t>
+              <a:rPr lang="it-IT" sz="1400" dirty="0"/>
+              <a:t>Utilizzando i dati raccolti verranno prese decisioni mirate alle necessità della città</a:t>
             </a:r>
           </a:p>
         </p:txBody>
@@ -21692,8 +21666,8 @@
         </p:nvSpPr>
         <p:spPr>
           <a:xfrm>
-            <a:off x="3458725" y="5751222"/>
-            <a:ext cx="5431437" cy="923330"/>
+            <a:off x="3464312" y="5729485"/>
+            <a:ext cx="4210054" cy="738664"/>
           </a:xfrm>
           <a:prstGeom prst="rect">
             <a:avLst/>
@@ -21707,343 +21681,411 @@
           <a:lstStyle/>
           <a:p>
             <a:r>
-              <a:rPr lang="it-IT" dirty="0"/>
-              <a:t>Testo molto importante</a:t>
+              <a:rPr lang="it-IT" sz="1400" dirty="0"/>
+              <a:t>In seguito alle scelte prese si potrà studiare l’impatto che queste hanno avuto sugli abitanti</a:t>
             </a:r>
-            <a:br>
-              <a:rPr lang="it-IT" dirty="0"/>
-            </a:br>
-            <a:r>
-              <a:rPr lang="it-IT" dirty="0"/>
-              <a:t>descrizione più accurata di tutto ciò</a:t>
-            </a:r>
-          </a:p>
-          <a:p>
-            <a:r>
-              <a:rPr lang="it-IT" dirty="0"/>
-              <a:t>che succede</a:t>
-            </a:r>
-          </a:p>
-        </p:txBody>
-      </p:sp>
-      <p:sp>
-        <p:nvSpPr>
-          <p:cNvPr id="77" name="Rettangolo 76">
-            <a:extLst>
-              <a:ext uri="{FF2B5EF4-FFF2-40B4-BE49-F238E27FC236}">
-                <a16:creationId xmlns:a16="http://schemas.microsoft.com/office/drawing/2014/main" id="{6E66B88A-25AC-C9B7-E342-5B5C817622AC}"/>
-              </a:ext>
-            </a:extLst>
-          </p:cNvPr>
-          <p:cNvSpPr/>
+          </a:p>
+        </p:txBody>
+      </p:sp>
+      <p:grpSp>
+        <p:nvGrpSpPr>
+          <p:cNvPr id="3" name="Gruppo 2">
+            <a:extLst>
+              <a:ext uri="{FF2B5EF4-FFF2-40B4-BE49-F238E27FC236}">
+                <a16:creationId xmlns:a16="http://schemas.microsoft.com/office/drawing/2014/main" id="{A0734084-F526-0B5A-AC15-386256B46DE1}"/>
+              </a:ext>
+            </a:extLst>
+          </p:cNvPr>
+          <p:cNvGrpSpPr/>
           <p:nvPr/>
-        </p:nvSpPr>
-        <p:spPr>
-          <a:xfrm>
-            <a:off x="426720" y="-10160"/>
-            <a:ext cx="504000" cy="406800"/>
-          </a:xfrm>
-          <a:prstGeom prst="rect">
-            <a:avLst/>
-          </a:prstGeom>
-          <a:ln>
-            <a:noFill/>
-          </a:ln>
-        </p:spPr>
-        <p:style>
-          <a:lnRef idx="2">
-            <a:schemeClr val="accent1">
-              <a:shade val="15000"/>
-            </a:schemeClr>
-          </a:lnRef>
-          <a:fillRef idx="1">
-            <a:schemeClr val="accent1"/>
-          </a:fillRef>
-          <a:effectRef idx="0">
-            <a:schemeClr val="accent1"/>
-          </a:effectRef>
-          <a:fontRef idx="minor">
-            <a:schemeClr val="lt1"/>
-          </a:fontRef>
-        </p:style>
-        <p:txBody>
-          <a:bodyPr rtlCol="0" anchor="ctr"/>
-          <a:lstStyle/>
-          <a:p>
-            <a:pPr algn="ctr"/>
-            <a:endParaRPr lang="it-IT"/>
-          </a:p>
-        </p:txBody>
-      </p:sp>
-      <p:sp>
-        <p:nvSpPr>
-          <p:cNvPr id="78" name="Rettangolo 77">
-            <a:extLst>
-              <a:ext uri="{FF2B5EF4-FFF2-40B4-BE49-F238E27FC236}">
-                <a16:creationId xmlns:a16="http://schemas.microsoft.com/office/drawing/2014/main" id="{C381184C-DF0D-7C92-27D8-683B4B98A69B}"/>
-              </a:ext>
-            </a:extLst>
-          </p:cNvPr>
-          <p:cNvSpPr/>
-          <p:nvPr/>
-        </p:nvSpPr>
-        <p:spPr>
-          <a:xfrm>
-            <a:off x="426929" y="396114"/>
-            <a:ext cx="298800" cy="1122171"/>
-          </a:xfrm>
-          <a:prstGeom prst="rect">
-            <a:avLst/>
-          </a:prstGeom>
-          <a:ln>
-            <a:noFill/>
-          </a:ln>
-        </p:spPr>
-        <p:style>
-          <a:lnRef idx="2">
-            <a:schemeClr val="accent1">
-              <a:shade val="15000"/>
-            </a:schemeClr>
-          </a:lnRef>
-          <a:fillRef idx="1">
-            <a:schemeClr val="accent1"/>
-          </a:fillRef>
-          <a:effectRef idx="0">
-            <a:schemeClr val="accent1"/>
-          </a:effectRef>
-          <a:fontRef idx="minor">
-            <a:schemeClr val="lt1"/>
-          </a:fontRef>
-        </p:style>
-        <p:txBody>
-          <a:bodyPr rtlCol="0" anchor="ctr"/>
-          <a:lstStyle/>
-          <a:p>
-            <a:pPr algn="ctr"/>
-            <a:endParaRPr lang="it-IT"/>
-          </a:p>
-        </p:txBody>
-      </p:sp>
-      <p:sp>
-        <p:nvSpPr>
-          <p:cNvPr id="80" name="Arco a tutto sesto 79">
-            <a:extLst>
-              <a:ext uri="{FF2B5EF4-FFF2-40B4-BE49-F238E27FC236}">
-                <a16:creationId xmlns:a16="http://schemas.microsoft.com/office/drawing/2014/main" id="{587052C3-C3BB-44D2-C08C-91DB1A5D9BCC}"/>
-              </a:ext>
-            </a:extLst>
-          </p:cNvPr>
-          <p:cNvSpPr/>
-          <p:nvPr/>
-        </p:nvSpPr>
-        <p:spPr>
-          <a:xfrm rot="5400000">
-            <a:off x="-36130" y="1540552"/>
-            <a:ext cx="1000412" cy="935774"/>
-          </a:xfrm>
-          <a:custGeom>
-            <a:avLst/>
-            <a:gdLst>
-              <a:gd name="connsiteX0" fmla="*/ 1011761 w 2016000"/>
-              <a:gd name="connsiteY0" fmla="*/ 7 h 2016000"/>
-              <a:gd name="connsiteX1" fmla="*/ 2016000 w 2016000"/>
-              <a:gd name="connsiteY1" fmla="*/ 1008000 h 2016000"/>
-              <a:gd name="connsiteX2" fmla="*/ 1512000 w 2016000"/>
-              <a:gd name="connsiteY2" fmla="*/ 1008000 h 2016000"/>
-              <a:gd name="connsiteX3" fmla="*/ 1009881 w 2016000"/>
-              <a:gd name="connsiteY3" fmla="*/ 504004 h 2016000"/>
-              <a:gd name="connsiteX4" fmla="*/ 1011761 w 2016000"/>
-              <a:gd name="connsiteY4" fmla="*/ 7 h 2016000"/>
-              <a:gd name="connsiteX0" fmla="*/ 1880 w 1006119"/>
-              <a:gd name="connsiteY0" fmla="*/ 0 h 1007993"/>
-              <a:gd name="connsiteX1" fmla="*/ 1006119 w 1006119"/>
-              <a:gd name="connsiteY1" fmla="*/ 1007993 h 1007993"/>
-              <a:gd name="connsiteX2" fmla="*/ 494499 w 1006119"/>
-              <a:gd name="connsiteY2" fmla="*/ 935603 h 1007993"/>
-              <a:gd name="connsiteX3" fmla="*/ 0 w 1006119"/>
-              <a:gd name="connsiteY3" fmla="*/ 503997 h 1007993"/>
-              <a:gd name="connsiteX4" fmla="*/ 1880 w 1006119"/>
-              <a:gd name="connsiteY4" fmla="*/ 0 h 1007993"/>
-              <a:gd name="connsiteX0" fmla="*/ 1880 w 1002309"/>
-              <a:gd name="connsiteY0" fmla="*/ 0 h 937508"/>
-              <a:gd name="connsiteX1" fmla="*/ 1002309 w 1002309"/>
-              <a:gd name="connsiteY1" fmla="*/ 937508 h 937508"/>
-              <a:gd name="connsiteX2" fmla="*/ 494499 w 1002309"/>
-              <a:gd name="connsiteY2" fmla="*/ 935603 h 937508"/>
-              <a:gd name="connsiteX3" fmla="*/ 0 w 1002309"/>
-              <a:gd name="connsiteY3" fmla="*/ 503997 h 937508"/>
-              <a:gd name="connsiteX4" fmla="*/ 1880 w 1002309"/>
-              <a:gd name="connsiteY4" fmla="*/ 0 h 937508"/>
-              <a:gd name="connsiteX0" fmla="*/ 1880 w 1002309"/>
-              <a:gd name="connsiteY0" fmla="*/ 0 h 937519"/>
-              <a:gd name="connsiteX1" fmla="*/ 1002309 w 1002309"/>
-              <a:gd name="connsiteY1" fmla="*/ 937508 h 937519"/>
-              <a:gd name="connsiteX2" fmla="*/ 494499 w 1002309"/>
-              <a:gd name="connsiteY2" fmla="*/ 937519 h 937519"/>
-              <a:gd name="connsiteX3" fmla="*/ 0 w 1002309"/>
-              <a:gd name="connsiteY3" fmla="*/ 503997 h 937519"/>
-              <a:gd name="connsiteX4" fmla="*/ 1880 w 1002309"/>
-              <a:gd name="connsiteY4" fmla="*/ 0 h 937519"/>
-              <a:gd name="connsiteX0" fmla="*/ 1880 w 1002309"/>
-              <a:gd name="connsiteY0" fmla="*/ 0 h 943271"/>
-              <a:gd name="connsiteX1" fmla="*/ 1002309 w 1002309"/>
-              <a:gd name="connsiteY1" fmla="*/ 937508 h 943271"/>
-              <a:gd name="connsiteX2" fmla="*/ 494502 w 1002309"/>
-              <a:gd name="connsiteY2" fmla="*/ 943271 h 943271"/>
-              <a:gd name="connsiteX3" fmla="*/ 0 w 1002309"/>
-              <a:gd name="connsiteY3" fmla="*/ 503997 h 943271"/>
-              <a:gd name="connsiteX4" fmla="*/ 1880 w 1002309"/>
-              <a:gd name="connsiteY4" fmla="*/ 0 h 943271"/>
-              <a:gd name="connsiteX0" fmla="*/ 1880 w 1002312"/>
-              <a:gd name="connsiteY0" fmla="*/ 0 h 943271"/>
-              <a:gd name="connsiteX1" fmla="*/ 1002312 w 1002312"/>
-              <a:gd name="connsiteY1" fmla="*/ 943256 h 943271"/>
-              <a:gd name="connsiteX2" fmla="*/ 494502 w 1002312"/>
-              <a:gd name="connsiteY2" fmla="*/ 943271 h 943271"/>
-              <a:gd name="connsiteX3" fmla="*/ 0 w 1002312"/>
-              <a:gd name="connsiteY3" fmla="*/ 503997 h 943271"/>
-              <a:gd name="connsiteX4" fmla="*/ 1880 w 1002312"/>
-              <a:gd name="connsiteY4" fmla="*/ 0 h 943271"/>
-              <a:gd name="connsiteX0" fmla="*/ 1880 w 1002312"/>
-              <a:gd name="connsiteY0" fmla="*/ 0 h 945187"/>
-              <a:gd name="connsiteX1" fmla="*/ 1002312 w 1002312"/>
-              <a:gd name="connsiteY1" fmla="*/ 943256 h 945187"/>
-              <a:gd name="connsiteX2" fmla="*/ 490692 w 1002312"/>
-              <a:gd name="connsiteY2" fmla="*/ 945187 h 945187"/>
-              <a:gd name="connsiteX3" fmla="*/ 0 w 1002312"/>
-              <a:gd name="connsiteY3" fmla="*/ 503997 h 945187"/>
-              <a:gd name="connsiteX4" fmla="*/ 1880 w 1002312"/>
-              <a:gd name="connsiteY4" fmla="*/ 0 h 945187"/>
-              <a:gd name="connsiteX0" fmla="*/ 1879 w 1002311"/>
-              <a:gd name="connsiteY0" fmla="*/ 0 h 945187"/>
-              <a:gd name="connsiteX1" fmla="*/ 1002311 w 1002311"/>
-              <a:gd name="connsiteY1" fmla="*/ 943256 h 945187"/>
-              <a:gd name="connsiteX2" fmla="*/ 490691 w 1002311"/>
-              <a:gd name="connsiteY2" fmla="*/ 945187 h 945187"/>
-              <a:gd name="connsiteX3" fmla="*/ 0 w 1002311"/>
-              <a:gd name="connsiteY3" fmla="*/ 509745 h 945187"/>
-              <a:gd name="connsiteX4" fmla="*/ 1879 w 1002311"/>
-              <a:gd name="connsiteY4" fmla="*/ 0 h 945187"/>
-              <a:gd name="connsiteX0" fmla="*/ 3784 w 1004216"/>
-              <a:gd name="connsiteY0" fmla="*/ 0 h 945187"/>
-              <a:gd name="connsiteX1" fmla="*/ 1004216 w 1004216"/>
-              <a:gd name="connsiteY1" fmla="*/ 943256 h 945187"/>
-              <a:gd name="connsiteX2" fmla="*/ 492596 w 1004216"/>
-              <a:gd name="connsiteY2" fmla="*/ 945187 h 945187"/>
-              <a:gd name="connsiteX3" fmla="*/ 0 w 1004216"/>
-              <a:gd name="connsiteY3" fmla="*/ 505912 h 945187"/>
-              <a:gd name="connsiteX4" fmla="*/ 3784 w 1004216"/>
-              <a:gd name="connsiteY4" fmla="*/ 0 h 945187"/>
-              <a:gd name="connsiteX0" fmla="*/ 3784 w 1004216"/>
-              <a:gd name="connsiteY0" fmla="*/ 0 h 943256"/>
-              <a:gd name="connsiteX1" fmla="*/ 1004216 w 1004216"/>
-              <a:gd name="connsiteY1" fmla="*/ 943256 h 943256"/>
-              <a:gd name="connsiteX2" fmla="*/ 490694 w 1004216"/>
-              <a:gd name="connsiteY2" fmla="*/ 939441 h 943256"/>
-              <a:gd name="connsiteX3" fmla="*/ 0 w 1004216"/>
-              <a:gd name="connsiteY3" fmla="*/ 505912 h 943256"/>
-              <a:gd name="connsiteX4" fmla="*/ 3784 w 1004216"/>
-              <a:gd name="connsiteY4" fmla="*/ 0 h 943256"/>
-              <a:gd name="connsiteX0" fmla="*/ 3784 w 1002314"/>
-              <a:gd name="connsiteY0" fmla="*/ 0 h 939441"/>
-              <a:gd name="connsiteX1" fmla="*/ 1002314 w 1002314"/>
-              <a:gd name="connsiteY1" fmla="*/ 937507 h 939441"/>
-              <a:gd name="connsiteX2" fmla="*/ 490694 w 1002314"/>
-              <a:gd name="connsiteY2" fmla="*/ 939441 h 939441"/>
-              <a:gd name="connsiteX3" fmla="*/ 0 w 1002314"/>
-              <a:gd name="connsiteY3" fmla="*/ 505912 h 939441"/>
-              <a:gd name="connsiteX4" fmla="*/ 3784 w 1002314"/>
-              <a:gd name="connsiteY4" fmla="*/ 0 h 939441"/>
-              <a:gd name="connsiteX0" fmla="*/ 3784 w 1000412"/>
-              <a:gd name="connsiteY0" fmla="*/ 0 h 941339"/>
-              <a:gd name="connsiteX1" fmla="*/ 1000412 w 1000412"/>
-              <a:gd name="connsiteY1" fmla="*/ 941339 h 941339"/>
-              <a:gd name="connsiteX2" fmla="*/ 490694 w 1000412"/>
-              <a:gd name="connsiteY2" fmla="*/ 939441 h 941339"/>
-              <a:gd name="connsiteX3" fmla="*/ 0 w 1000412"/>
-              <a:gd name="connsiteY3" fmla="*/ 505912 h 941339"/>
-              <a:gd name="connsiteX4" fmla="*/ 3784 w 1000412"/>
-              <a:gd name="connsiteY4" fmla="*/ 0 h 941339"/>
-            </a:gdLst>
-            <a:ahLst/>
-            <a:cxnLst>
-              <a:cxn ang="0">
-                <a:pos x="connsiteX0" y="connsiteY0"/>
-              </a:cxn>
-              <a:cxn ang="0">
-                <a:pos x="connsiteX1" y="connsiteY1"/>
-              </a:cxn>
-              <a:cxn ang="0">
-                <a:pos x="connsiteX2" y="connsiteY2"/>
-              </a:cxn>
-              <a:cxn ang="0">
-                <a:pos x="connsiteX3" y="connsiteY3"/>
-              </a:cxn>
-              <a:cxn ang="0">
-                <a:pos x="connsiteX4" y="connsiteY4"/>
-              </a:cxn>
-            </a:cxnLst>
-            <a:rect l="l" t="t" r="r" b="b"/>
-            <a:pathLst>
-              <a:path w="1000412" h="941339">
-                <a:moveTo>
-                  <a:pt x="3784" y="0"/>
-                </a:moveTo>
-                <a:cubicBezTo>
-                  <a:pt x="559015" y="2072"/>
-                  <a:pt x="1000412" y="386104"/>
-                  <a:pt x="1000412" y="941339"/>
-                </a:cubicBezTo>
-                <a:lnTo>
-                  <a:pt x="490694" y="939441"/>
-                </a:lnTo>
-                <a:cubicBezTo>
-                  <a:pt x="490694" y="661824"/>
-                  <a:pt x="277615" y="506947"/>
-                  <a:pt x="0" y="505912"/>
-                </a:cubicBezTo>
-                <a:cubicBezTo>
-                  <a:pt x="627" y="337913"/>
-                  <a:pt x="3157" y="167999"/>
-                  <a:pt x="3784" y="0"/>
-                </a:cubicBezTo>
-                <a:close/>
-              </a:path>
-            </a:pathLst>
-          </a:custGeom>
-          <a:ln>
-            <a:noFill/>
-          </a:ln>
-        </p:spPr>
-        <p:style>
-          <a:lnRef idx="2">
-            <a:schemeClr val="accent1">
-              <a:shade val="15000"/>
-            </a:schemeClr>
-          </a:lnRef>
-          <a:fillRef idx="1">
-            <a:schemeClr val="accent1"/>
-          </a:fillRef>
-          <a:effectRef idx="0">
-            <a:schemeClr val="accent1"/>
-          </a:effectRef>
-          <a:fontRef idx="minor">
-            <a:schemeClr val="lt1"/>
-          </a:fontRef>
-        </p:style>
-        <p:txBody>
-          <a:bodyPr rtlCol="0" anchor="ctr"/>
-          <a:lstStyle/>
-          <a:p>
-            <a:pPr algn="ctr"/>
-            <a:endParaRPr lang="it-IT">
-              <a:solidFill>
-                <a:schemeClr val="tx1"/>
-              </a:solidFill>
-            </a:endParaRPr>
-          </a:p>
-        </p:txBody>
-      </p:sp>
+        </p:nvGrpSpPr>
+        <p:grpSpPr>
+          <a:xfrm>
+            <a:off x="-4466" y="-10160"/>
+            <a:ext cx="935186" cy="2520713"/>
+            <a:chOff x="-4466" y="-10160"/>
+            <a:chExt cx="935186" cy="2520713"/>
+          </a:xfrm>
+        </p:grpSpPr>
+        <p:sp>
+          <p:nvSpPr>
+            <p:cNvPr id="77" name="Rettangolo 76">
+              <a:extLst>
+                <a:ext uri="{FF2B5EF4-FFF2-40B4-BE49-F238E27FC236}">
+                  <a16:creationId xmlns:a16="http://schemas.microsoft.com/office/drawing/2014/main" id="{6E66B88A-25AC-C9B7-E342-5B5C817622AC}"/>
+                </a:ext>
+              </a:extLst>
+            </p:cNvPr>
+            <p:cNvSpPr/>
+            <p:nvPr/>
+          </p:nvSpPr>
+          <p:spPr>
+            <a:xfrm>
+              <a:off x="426720" y="-10160"/>
+              <a:ext cx="504000" cy="406800"/>
+            </a:xfrm>
+            <a:prstGeom prst="rect">
+              <a:avLst/>
+            </a:prstGeom>
+            <a:ln>
+              <a:noFill/>
+            </a:ln>
+          </p:spPr>
+          <p:style>
+            <a:lnRef idx="2">
+              <a:schemeClr val="accent1">
+                <a:shade val="15000"/>
+              </a:schemeClr>
+            </a:lnRef>
+            <a:fillRef idx="1">
+              <a:schemeClr val="accent1"/>
+            </a:fillRef>
+            <a:effectRef idx="0">
+              <a:schemeClr val="accent1"/>
+            </a:effectRef>
+            <a:fontRef idx="minor">
+              <a:schemeClr val="lt1"/>
+            </a:fontRef>
+          </p:style>
+          <p:txBody>
+            <a:bodyPr rtlCol="0" anchor="ctr"/>
+            <a:lstStyle/>
+            <a:p>
+              <a:pPr algn="ctr"/>
+              <a:endParaRPr lang="it-IT"/>
+            </a:p>
+          </p:txBody>
+        </p:sp>
+        <p:sp>
+          <p:nvSpPr>
+            <p:cNvPr id="78" name="Rettangolo 77">
+              <a:extLst>
+                <a:ext uri="{FF2B5EF4-FFF2-40B4-BE49-F238E27FC236}">
+                  <a16:creationId xmlns:a16="http://schemas.microsoft.com/office/drawing/2014/main" id="{C381184C-DF0D-7C92-27D8-683B4B98A69B}"/>
+                </a:ext>
+              </a:extLst>
+            </p:cNvPr>
+            <p:cNvSpPr/>
+            <p:nvPr/>
+          </p:nvSpPr>
+          <p:spPr>
+            <a:xfrm>
+              <a:off x="426929" y="396114"/>
+              <a:ext cx="298800" cy="1122171"/>
+            </a:xfrm>
+            <a:prstGeom prst="rect">
+              <a:avLst/>
+            </a:prstGeom>
+            <a:ln>
+              <a:noFill/>
+            </a:ln>
+          </p:spPr>
+          <p:style>
+            <a:lnRef idx="2">
+              <a:schemeClr val="accent1">
+                <a:shade val="15000"/>
+              </a:schemeClr>
+            </a:lnRef>
+            <a:fillRef idx="1">
+              <a:schemeClr val="accent1"/>
+            </a:fillRef>
+            <a:effectRef idx="0">
+              <a:schemeClr val="accent1"/>
+            </a:effectRef>
+            <a:fontRef idx="minor">
+              <a:schemeClr val="lt1"/>
+            </a:fontRef>
+          </p:style>
+          <p:txBody>
+            <a:bodyPr rtlCol="0" anchor="ctr"/>
+            <a:lstStyle/>
+            <a:p>
+              <a:pPr algn="ctr"/>
+              <a:endParaRPr lang="it-IT"/>
+            </a:p>
+          </p:txBody>
+        </p:sp>
+        <p:sp>
+          <p:nvSpPr>
+            <p:cNvPr id="80" name="Arco a tutto sesto 79">
+              <a:extLst>
+                <a:ext uri="{FF2B5EF4-FFF2-40B4-BE49-F238E27FC236}">
+                  <a16:creationId xmlns:a16="http://schemas.microsoft.com/office/drawing/2014/main" id="{587052C3-C3BB-44D2-C08C-91DB1A5D9BCC}"/>
+                </a:ext>
+              </a:extLst>
+            </p:cNvPr>
+            <p:cNvSpPr/>
+            <p:nvPr/>
+          </p:nvSpPr>
+          <p:spPr>
+            <a:xfrm rot="5400000">
+              <a:off x="-38681" y="1542448"/>
+              <a:ext cx="1002320" cy="933889"/>
+            </a:xfrm>
+            <a:custGeom>
+              <a:avLst/>
+              <a:gdLst>
+                <a:gd name="connsiteX0" fmla="*/ 1011761 w 2016000"/>
+                <a:gd name="connsiteY0" fmla="*/ 7 h 2016000"/>
+                <a:gd name="connsiteX1" fmla="*/ 2016000 w 2016000"/>
+                <a:gd name="connsiteY1" fmla="*/ 1008000 h 2016000"/>
+                <a:gd name="connsiteX2" fmla="*/ 1512000 w 2016000"/>
+                <a:gd name="connsiteY2" fmla="*/ 1008000 h 2016000"/>
+                <a:gd name="connsiteX3" fmla="*/ 1009881 w 2016000"/>
+                <a:gd name="connsiteY3" fmla="*/ 504004 h 2016000"/>
+                <a:gd name="connsiteX4" fmla="*/ 1011761 w 2016000"/>
+                <a:gd name="connsiteY4" fmla="*/ 7 h 2016000"/>
+                <a:gd name="connsiteX0" fmla="*/ 1880 w 1006119"/>
+                <a:gd name="connsiteY0" fmla="*/ 0 h 1007993"/>
+                <a:gd name="connsiteX1" fmla="*/ 1006119 w 1006119"/>
+                <a:gd name="connsiteY1" fmla="*/ 1007993 h 1007993"/>
+                <a:gd name="connsiteX2" fmla="*/ 494499 w 1006119"/>
+                <a:gd name="connsiteY2" fmla="*/ 935603 h 1007993"/>
+                <a:gd name="connsiteX3" fmla="*/ 0 w 1006119"/>
+                <a:gd name="connsiteY3" fmla="*/ 503997 h 1007993"/>
+                <a:gd name="connsiteX4" fmla="*/ 1880 w 1006119"/>
+                <a:gd name="connsiteY4" fmla="*/ 0 h 1007993"/>
+                <a:gd name="connsiteX0" fmla="*/ 1880 w 1002309"/>
+                <a:gd name="connsiteY0" fmla="*/ 0 h 937508"/>
+                <a:gd name="connsiteX1" fmla="*/ 1002309 w 1002309"/>
+                <a:gd name="connsiteY1" fmla="*/ 937508 h 937508"/>
+                <a:gd name="connsiteX2" fmla="*/ 494499 w 1002309"/>
+                <a:gd name="connsiteY2" fmla="*/ 935603 h 937508"/>
+                <a:gd name="connsiteX3" fmla="*/ 0 w 1002309"/>
+                <a:gd name="connsiteY3" fmla="*/ 503997 h 937508"/>
+                <a:gd name="connsiteX4" fmla="*/ 1880 w 1002309"/>
+                <a:gd name="connsiteY4" fmla="*/ 0 h 937508"/>
+                <a:gd name="connsiteX0" fmla="*/ 1880 w 1002309"/>
+                <a:gd name="connsiteY0" fmla="*/ 0 h 937519"/>
+                <a:gd name="connsiteX1" fmla="*/ 1002309 w 1002309"/>
+                <a:gd name="connsiteY1" fmla="*/ 937508 h 937519"/>
+                <a:gd name="connsiteX2" fmla="*/ 494499 w 1002309"/>
+                <a:gd name="connsiteY2" fmla="*/ 937519 h 937519"/>
+                <a:gd name="connsiteX3" fmla="*/ 0 w 1002309"/>
+                <a:gd name="connsiteY3" fmla="*/ 503997 h 937519"/>
+                <a:gd name="connsiteX4" fmla="*/ 1880 w 1002309"/>
+                <a:gd name="connsiteY4" fmla="*/ 0 h 937519"/>
+                <a:gd name="connsiteX0" fmla="*/ 1880 w 1002309"/>
+                <a:gd name="connsiteY0" fmla="*/ 0 h 943271"/>
+                <a:gd name="connsiteX1" fmla="*/ 1002309 w 1002309"/>
+                <a:gd name="connsiteY1" fmla="*/ 937508 h 943271"/>
+                <a:gd name="connsiteX2" fmla="*/ 494502 w 1002309"/>
+                <a:gd name="connsiteY2" fmla="*/ 943271 h 943271"/>
+                <a:gd name="connsiteX3" fmla="*/ 0 w 1002309"/>
+                <a:gd name="connsiteY3" fmla="*/ 503997 h 943271"/>
+                <a:gd name="connsiteX4" fmla="*/ 1880 w 1002309"/>
+                <a:gd name="connsiteY4" fmla="*/ 0 h 943271"/>
+                <a:gd name="connsiteX0" fmla="*/ 1880 w 1002312"/>
+                <a:gd name="connsiteY0" fmla="*/ 0 h 943271"/>
+                <a:gd name="connsiteX1" fmla="*/ 1002312 w 1002312"/>
+                <a:gd name="connsiteY1" fmla="*/ 943256 h 943271"/>
+                <a:gd name="connsiteX2" fmla="*/ 494502 w 1002312"/>
+                <a:gd name="connsiteY2" fmla="*/ 943271 h 943271"/>
+                <a:gd name="connsiteX3" fmla="*/ 0 w 1002312"/>
+                <a:gd name="connsiteY3" fmla="*/ 503997 h 943271"/>
+                <a:gd name="connsiteX4" fmla="*/ 1880 w 1002312"/>
+                <a:gd name="connsiteY4" fmla="*/ 0 h 943271"/>
+                <a:gd name="connsiteX0" fmla="*/ 1880 w 1002312"/>
+                <a:gd name="connsiteY0" fmla="*/ 0 h 945187"/>
+                <a:gd name="connsiteX1" fmla="*/ 1002312 w 1002312"/>
+                <a:gd name="connsiteY1" fmla="*/ 943256 h 945187"/>
+                <a:gd name="connsiteX2" fmla="*/ 490692 w 1002312"/>
+                <a:gd name="connsiteY2" fmla="*/ 945187 h 945187"/>
+                <a:gd name="connsiteX3" fmla="*/ 0 w 1002312"/>
+                <a:gd name="connsiteY3" fmla="*/ 503997 h 945187"/>
+                <a:gd name="connsiteX4" fmla="*/ 1880 w 1002312"/>
+                <a:gd name="connsiteY4" fmla="*/ 0 h 945187"/>
+                <a:gd name="connsiteX0" fmla="*/ 1879 w 1002311"/>
+                <a:gd name="connsiteY0" fmla="*/ 0 h 945187"/>
+                <a:gd name="connsiteX1" fmla="*/ 1002311 w 1002311"/>
+                <a:gd name="connsiteY1" fmla="*/ 943256 h 945187"/>
+                <a:gd name="connsiteX2" fmla="*/ 490691 w 1002311"/>
+                <a:gd name="connsiteY2" fmla="*/ 945187 h 945187"/>
+                <a:gd name="connsiteX3" fmla="*/ 0 w 1002311"/>
+                <a:gd name="connsiteY3" fmla="*/ 509745 h 945187"/>
+                <a:gd name="connsiteX4" fmla="*/ 1879 w 1002311"/>
+                <a:gd name="connsiteY4" fmla="*/ 0 h 945187"/>
+                <a:gd name="connsiteX0" fmla="*/ 3784 w 1004216"/>
+                <a:gd name="connsiteY0" fmla="*/ 0 h 945187"/>
+                <a:gd name="connsiteX1" fmla="*/ 1004216 w 1004216"/>
+                <a:gd name="connsiteY1" fmla="*/ 943256 h 945187"/>
+                <a:gd name="connsiteX2" fmla="*/ 492596 w 1004216"/>
+                <a:gd name="connsiteY2" fmla="*/ 945187 h 945187"/>
+                <a:gd name="connsiteX3" fmla="*/ 0 w 1004216"/>
+                <a:gd name="connsiteY3" fmla="*/ 505912 h 945187"/>
+                <a:gd name="connsiteX4" fmla="*/ 3784 w 1004216"/>
+                <a:gd name="connsiteY4" fmla="*/ 0 h 945187"/>
+                <a:gd name="connsiteX0" fmla="*/ 3784 w 1004216"/>
+                <a:gd name="connsiteY0" fmla="*/ 0 h 943256"/>
+                <a:gd name="connsiteX1" fmla="*/ 1004216 w 1004216"/>
+                <a:gd name="connsiteY1" fmla="*/ 943256 h 943256"/>
+                <a:gd name="connsiteX2" fmla="*/ 490694 w 1004216"/>
+                <a:gd name="connsiteY2" fmla="*/ 939441 h 943256"/>
+                <a:gd name="connsiteX3" fmla="*/ 0 w 1004216"/>
+                <a:gd name="connsiteY3" fmla="*/ 505912 h 943256"/>
+                <a:gd name="connsiteX4" fmla="*/ 3784 w 1004216"/>
+                <a:gd name="connsiteY4" fmla="*/ 0 h 943256"/>
+                <a:gd name="connsiteX0" fmla="*/ 3784 w 1002314"/>
+                <a:gd name="connsiteY0" fmla="*/ 0 h 939441"/>
+                <a:gd name="connsiteX1" fmla="*/ 1002314 w 1002314"/>
+                <a:gd name="connsiteY1" fmla="*/ 937507 h 939441"/>
+                <a:gd name="connsiteX2" fmla="*/ 490694 w 1002314"/>
+                <a:gd name="connsiteY2" fmla="*/ 939441 h 939441"/>
+                <a:gd name="connsiteX3" fmla="*/ 0 w 1002314"/>
+                <a:gd name="connsiteY3" fmla="*/ 505912 h 939441"/>
+                <a:gd name="connsiteX4" fmla="*/ 3784 w 1002314"/>
+                <a:gd name="connsiteY4" fmla="*/ 0 h 939441"/>
+                <a:gd name="connsiteX0" fmla="*/ 3784 w 1000412"/>
+                <a:gd name="connsiteY0" fmla="*/ 0 h 941339"/>
+                <a:gd name="connsiteX1" fmla="*/ 1000412 w 1000412"/>
+                <a:gd name="connsiteY1" fmla="*/ 941339 h 941339"/>
+                <a:gd name="connsiteX2" fmla="*/ 490694 w 1000412"/>
+                <a:gd name="connsiteY2" fmla="*/ 939441 h 941339"/>
+                <a:gd name="connsiteX3" fmla="*/ 0 w 1000412"/>
+                <a:gd name="connsiteY3" fmla="*/ 505912 h 941339"/>
+                <a:gd name="connsiteX4" fmla="*/ 3784 w 1000412"/>
+                <a:gd name="connsiteY4" fmla="*/ 0 h 941339"/>
+                <a:gd name="connsiteX0" fmla="*/ 3784 w 1000412"/>
+                <a:gd name="connsiteY0" fmla="*/ 0 h 941357"/>
+                <a:gd name="connsiteX1" fmla="*/ 1000412 w 1000412"/>
+                <a:gd name="connsiteY1" fmla="*/ 941339 h 941357"/>
+                <a:gd name="connsiteX2" fmla="*/ 490694 w 1000412"/>
+                <a:gd name="connsiteY2" fmla="*/ 941357 h 941357"/>
+                <a:gd name="connsiteX3" fmla="*/ 0 w 1000412"/>
+                <a:gd name="connsiteY3" fmla="*/ 505912 h 941357"/>
+                <a:gd name="connsiteX4" fmla="*/ 3784 w 1000412"/>
+                <a:gd name="connsiteY4" fmla="*/ 0 h 941357"/>
+                <a:gd name="connsiteX0" fmla="*/ 3784 w 1000412"/>
+                <a:gd name="connsiteY0" fmla="*/ 0 h 941357"/>
+                <a:gd name="connsiteX1" fmla="*/ 1000412 w 1000412"/>
+                <a:gd name="connsiteY1" fmla="*/ 941339 h 941357"/>
+                <a:gd name="connsiteX2" fmla="*/ 490694 w 1000412"/>
+                <a:gd name="connsiteY2" fmla="*/ 941357 h 941357"/>
+                <a:gd name="connsiteX3" fmla="*/ 0 w 1000412"/>
+                <a:gd name="connsiteY3" fmla="*/ 505912 h 941357"/>
+                <a:gd name="connsiteX4" fmla="*/ 3784 w 1000412"/>
+                <a:gd name="connsiteY4" fmla="*/ 0 h 941357"/>
+                <a:gd name="connsiteX0" fmla="*/ 3784 w 1000412"/>
+                <a:gd name="connsiteY0" fmla="*/ 0 h 941357"/>
+                <a:gd name="connsiteX1" fmla="*/ 1000412 w 1000412"/>
+                <a:gd name="connsiteY1" fmla="*/ 939423 h 941357"/>
+                <a:gd name="connsiteX2" fmla="*/ 490694 w 1000412"/>
+                <a:gd name="connsiteY2" fmla="*/ 941357 h 941357"/>
+                <a:gd name="connsiteX3" fmla="*/ 0 w 1000412"/>
+                <a:gd name="connsiteY3" fmla="*/ 505912 h 941357"/>
+                <a:gd name="connsiteX4" fmla="*/ 3784 w 1000412"/>
+                <a:gd name="connsiteY4" fmla="*/ 0 h 941357"/>
+                <a:gd name="connsiteX0" fmla="*/ 3784 w 1000412"/>
+                <a:gd name="connsiteY0" fmla="*/ 0 h 939423"/>
+                <a:gd name="connsiteX1" fmla="*/ 1000412 w 1000412"/>
+                <a:gd name="connsiteY1" fmla="*/ 939423 h 939423"/>
+                <a:gd name="connsiteX2" fmla="*/ 494504 w 1000412"/>
+                <a:gd name="connsiteY2" fmla="*/ 935608 h 939423"/>
+                <a:gd name="connsiteX3" fmla="*/ 0 w 1000412"/>
+                <a:gd name="connsiteY3" fmla="*/ 505912 h 939423"/>
+                <a:gd name="connsiteX4" fmla="*/ 3784 w 1000412"/>
+                <a:gd name="connsiteY4" fmla="*/ 0 h 939423"/>
+                <a:gd name="connsiteX0" fmla="*/ 3784 w 1002320"/>
+                <a:gd name="connsiteY0" fmla="*/ 0 h 937506"/>
+                <a:gd name="connsiteX1" fmla="*/ 1002320 w 1002320"/>
+                <a:gd name="connsiteY1" fmla="*/ 937506 h 937506"/>
+                <a:gd name="connsiteX2" fmla="*/ 494504 w 1002320"/>
+                <a:gd name="connsiteY2" fmla="*/ 935608 h 937506"/>
+                <a:gd name="connsiteX3" fmla="*/ 0 w 1002320"/>
+                <a:gd name="connsiteY3" fmla="*/ 505912 h 937506"/>
+                <a:gd name="connsiteX4" fmla="*/ 3784 w 1002320"/>
+                <a:gd name="connsiteY4" fmla="*/ 0 h 937506"/>
+                <a:gd name="connsiteX0" fmla="*/ 3784 w 1002320"/>
+                <a:gd name="connsiteY0" fmla="*/ 0 h 939443"/>
+                <a:gd name="connsiteX1" fmla="*/ 1002320 w 1002320"/>
+                <a:gd name="connsiteY1" fmla="*/ 937506 h 939443"/>
+                <a:gd name="connsiteX2" fmla="*/ 498317 w 1002320"/>
+                <a:gd name="connsiteY2" fmla="*/ 939443 h 939443"/>
+                <a:gd name="connsiteX3" fmla="*/ 0 w 1002320"/>
+                <a:gd name="connsiteY3" fmla="*/ 505912 h 939443"/>
+                <a:gd name="connsiteX4" fmla="*/ 3784 w 1002320"/>
+                <a:gd name="connsiteY4" fmla="*/ 0 h 939443"/>
+              </a:gdLst>
+              <a:ahLst/>
+              <a:cxnLst>
+                <a:cxn ang="0">
+                  <a:pos x="connsiteX0" y="connsiteY0"/>
+                </a:cxn>
+                <a:cxn ang="0">
+                  <a:pos x="connsiteX1" y="connsiteY1"/>
+                </a:cxn>
+                <a:cxn ang="0">
+                  <a:pos x="connsiteX2" y="connsiteY2"/>
+                </a:cxn>
+                <a:cxn ang="0">
+                  <a:pos x="connsiteX3" y="connsiteY3"/>
+                </a:cxn>
+                <a:cxn ang="0">
+                  <a:pos x="connsiteX4" y="connsiteY4"/>
+                </a:cxn>
+              </a:cxnLst>
+              <a:rect l="l" t="t" r="r" b="b"/>
+              <a:pathLst>
+                <a:path w="1002320" h="939443">
+                  <a:moveTo>
+                    <a:pt x="3784" y="0"/>
+                  </a:moveTo>
+                  <a:cubicBezTo>
+                    <a:pt x="559015" y="2072"/>
+                    <a:pt x="1002320" y="382271"/>
+                    <a:pt x="1002320" y="937506"/>
+                  </a:cubicBezTo>
+                  <a:lnTo>
+                    <a:pt x="498317" y="939443"/>
+                  </a:lnTo>
+                  <a:cubicBezTo>
+                    <a:pt x="498317" y="661826"/>
+                    <a:pt x="277615" y="506947"/>
+                    <a:pt x="0" y="505912"/>
+                  </a:cubicBezTo>
+                  <a:cubicBezTo>
+                    <a:pt x="627" y="337913"/>
+                    <a:pt x="3157" y="167999"/>
+                    <a:pt x="3784" y="0"/>
+                  </a:cubicBezTo>
+                  <a:close/>
+                </a:path>
+              </a:pathLst>
+            </a:custGeom>
+            <a:ln>
+              <a:noFill/>
+            </a:ln>
+          </p:spPr>
+          <p:style>
+            <a:lnRef idx="2">
+              <a:schemeClr val="accent1">
+                <a:shade val="15000"/>
+              </a:schemeClr>
+            </a:lnRef>
+            <a:fillRef idx="1">
+              <a:schemeClr val="accent1"/>
+            </a:fillRef>
+            <a:effectRef idx="0">
+              <a:schemeClr val="accent1"/>
+            </a:effectRef>
+            <a:fontRef idx="minor">
+              <a:schemeClr val="lt1"/>
+            </a:fontRef>
+          </p:style>
+          <p:txBody>
+            <a:bodyPr rtlCol="0" anchor="ctr"/>
+            <a:lstStyle/>
+            <a:p>
+              <a:pPr algn="ctr"/>
+              <a:endParaRPr lang="it-IT">
+                <a:solidFill>
+                  <a:schemeClr val="tx1"/>
+                </a:solidFill>
+              </a:endParaRPr>
+            </a:p>
+          </p:txBody>
+        </p:sp>
+      </p:grpSp>
     </p:spTree>
     <p:extLst>
       <p:ext uri="{BB962C8B-B14F-4D97-AF65-F5344CB8AC3E}">
@@ -22174,27 +22216,24 @@
         </p:nvSpPr>
         <p:spPr>
           <a:xfrm>
-            <a:off x="1126514" y="4996676"/>
+            <a:off x="1167154" y="4996676"/>
             <a:ext cx="2788920" cy="365760"/>
           </a:xfrm>
         </p:spPr>
         <p:txBody>
-          <a:bodyPr/>
+          <a:bodyPr>
+            <a:normAutofit/>
+          </a:bodyPr>
           <a:lstStyle/>
           <a:p>
             <a:r>
-              <a:rPr lang="it-IT" dirty="0">
+              <a:rPr lang="it-IT" sz="1700" dirty="0">
                 <a:solidFill>
-                  <a:schemeClr val="bg1"/>
+                  <a:srgbClr val="FDF9E2"/>
                 </a:solidFill>
               </a:rPr>
-              <a:t>Modularità</a:t>
+              <a:t>Relazione tra i dati</a:t>
             </a:r>
-            <a:endParaRPr lang="it-IT" dirty="0">
-              <a:solidFill>
-                <a:srgbClr val="FDF9E2"/>
-              </a:solidFill>
-            </a:endParaRPr>
           </a:p>
         </p:txBody>
       </p:sp>
@@ -22216,7 +22255,7 @@
         </p:nvSpPr>
         <p:spPr>
           <a:xfrm>
-            <a:off x="8271823" y="4963943"/>
+            <a:off x="8231183" y="4963943"/>
             <a:ext cx="2788920" cy="365760"/>
           </a:xfrm>
         </p:spPr>
@@ -22227,7 +22266,7 @@
           <a:lstStyle/>
           <a:p>
             <a:r>
-              <a:rPr lang="it-IT" dirty="0">
+              <a:rPr lang="it-IT" sz="1700" dirty="0">
                 <a:solidFill>
                   <a:srgbClr val="FDF9E2"/>
                 </a:solidFill>
@@ -22262,8 +22301,8 @@
         </p:nvSpPr>
         <p:spPr>
           <a:xfrm>
-            <a:off x="1126515" y="2727273"/>
-            <a:ext cx="2788920" cy="365760"/>
+            <a:off x="1056640" y="2727273"/>
+            <a:ext cx="2899435" cy="365760"/>
           </a:xfrm>
         </p:spPr>
         <p:txBody>
@@ -22273,12 +22312,12 @@
           <a:lstStyle/>
           <a:p>
             <a:r>
-              <a:rPr lang="it-IT" dirty="0">
+              <a:rPr lang="it-IT" sz="1700" dirty="0">
                 <a:solidFill>
                   <a:schemeClr val="bg1"/>
                 </a:solidFill>
               </a:rPr>
-              <a:t>Benessere Locale</a:t>
+              <a:t>Legame con i cittadini </a:t>
             </a:r>
           </a:p>
         </p:txBody>
@@ -22301,7 +22340,7 @@
         </p:nvSpPr>
         <p:spPr>
           <a:xfrm>
-            <a:off x="8271823" y="2727273"/>
+            <a:off x="8231183" y="2727273"/>
             <a:ext cx="2788920" cy="365760"/>
           </a:xfrm>
         </p:spPr>
@@ -22310,7 +22349,7 @@
           <a:lstStyle/>
           <a:p>
             <a:r>
-              <a:rPr lang="it-IT" dirty="0">
+              <a:rPr lang="it-IT" sz="1700" dirty="0">
                 <a:solidFill>
                   <a:srgbClr val="FDF9E2"/>
                 </a:solidFill>
@@ -22345,7 +22384,7 @@
         </p:nvSpPr>
         <p:spPr>
           <a:xfrm>
-            <a:off x="1098143" y="3007225"/>
+            <a:off x="1138783" y="3007225"/>
             <a:ext cx="2816352" cy="452026"/>
           </a:xfrm>
           <a:ln>
@@ -22356,17 +22395,17 @@
         </p:spPr>
         <p:txBody>
           <a:bodyPr>
-            <a:normAutofit fontScale="92500" lnSpcReduction="10000"/>
+            <a:noAutofit/>
           </a:bodyPr>
           <a:lstStyle/>
           <a:p>
             <a:r>
-              <a:rPr lang="it-IT" dirty="0">
+              <a:rPr lang="it-IT" sz="1300" dirty="0">
                 <a:solidFill>
                   <a:srgbClr val="FDF9E2"/>
                 </a:solidFill>
               </a:rPr>
-              <a:t>Mostra il grado di soddisfazione da parte dei cittadini</a:t>
+              <a:t>Fornisce un contatto più diretto con i cittadini</a:t>
             </a:r>
           </a:p>
         </p:txBody>
@@ -22389,18 +22428,18 @@
         </p:nvSpPr>
         <p:spPr>
           <a:xfrm>
-            <a:off x="8280067" y="3047443"/>
+            <a:off x="8239427" y="3006803"/>
             <a:ext cx="2816352" cy="410924"/>
           </a:xfrm>
         </p:spPr>
         <p:txBody>
           <a:bodyPr>
-            <a:normAutofit fontScale="92500" lnSpcReduction="20000"/>
+            <a:noAutofit/>
           </a:bodyPr>
           <a:lstStyle/>
           <a:p>
             <a:r>
-              <a:rPr lang="it-IT" dirty="0">
+              <a:rPr lang="it-IT" sz="1300" dirty="0">
                 <a:solidFill>
                   <a:srgbClr val="FDF9E2"/>
                 </a:solidFill>
@@ -22427,7 +22466,22 @@
           </p:nvPr>
         </p:nvPicPr>
         <p:blipFill>
-          <a:blip r:embed="rId4"/>
+          <a:blip r:embed="rId4">
+            <a:extLst>
+              <a:ext uri="{BEBA8EAE-BF5A-486C-A8C5-ECC9F3942E4B}">
+                <a14:imgProps xmlns:a14="http://schemas.microsoft.com/office/drawing/2010/main">
+                  <a14:imgLayer r:embed="rId5">
+                    <a14:imgEffect>
+                      <a14:sharpenSoften amount="100000"/>
+                    </a14:imgEffect>
+                    <a14:imgEffect>
+                      <a14:saturation sat="0"/>
+                    </a14:imgEffect>
+                  </a14:imgLayer>
+                </a14:imgProps>
+              </a:ext>
+            </a:extLst>
+          </a:blip>
           <a:srcRect/>
           <a:stretch/>
         </p:blipFill>
@@ -22455,23 +22509,23 @@
         </p:nvSpPr>
         <p:spPr>
           <a:xfrm>
-            <a:off x="8284732" y="5269793"/>
+            <a:off x="8244092" y="5239313"/>
             <a:ext cx="2658885" cy="420470"/>
           </a:xfrm>
         </p:spPr>
         <p:txBody>
           <a:bodyPr>
-            <a:normAutofit fontScale="92500" lnSpcReduction="20000"/>
+            <a:noAutofit/>
           </a:bodyPr>
           <a:lstStyle/>
           <a:p>
             <a:r>
-              <a:rPr lang="it-IT" dirty="0">
+              <a:rPr lang="it-IT" sz="1300" dirty="0">
                 <a:solidFill>
                   <a:srgbClr val="FDF9E2"/>
                 </a:solidFill>
               </a:rPr>
-              <a:t>Risulta semplice e intuitiva fin dal primo utilizzo</a:t>
+              <a:t>Interfaccia utilizzabile anche con poca conoscenza informatica</a:t>
             </a:r>
           </a:p>
         </p:txBody>
@@ -22494,23 +22548,23 @@
         </p:nvSpPr>
         <p:spPr>
           <a:xfrm>
-            <a:off x="1107814" y="5277565"/>
+            <a:off x="1148454" y="5277565"/>
             <a:ext cx="2816352" cy="452026"/>
           </a:xfrm>
         </p:spPr>
         <p:txBody>
           <a:bodyPr>
-            <a:normAutofit fontScale="92500" lnSpcReduction="10000"/>
+            <a:noAutofit/>
           </a:bodyPr>
           <a:lstStyle/>
           <a:p>
             <a:r>
-              <a:rPr lang="it-IT" dirty="0">
+              <a:rPr lang="it-IT" sz="1300" dirty="0">
                 <a:solidFill>
                   <a:srgbClr val="FDF9E2"/>
                 </a:solidFill>
               </a:rPr>
-              <a:t>Facilita l’accesso ai dati nonostante la grande quantità di aggiornamenti</a:t>
+              <a:t>Facilita lo studio combinato di dati provenienti da diverse fonti</a:t>
             </a:r>
           </a:p>
         </p:txBody>
@@ -22562,7 +22616,7 @@
           </p:nvPr>
         </p:nvPicPr>
         <p:blipFill>
-          <a:blip r:embed="rId5"/>
+          <a:blip r:embed="rId6"/>
           <a:srcRect/>
           <a:stretch/>
         </p:blipFill>
@@ -22574,7 +22628,7 @@
       </p:pic>
       <p:pic>
         <p:nvPicPr>
-          <p:cNvPr id="49" name="Segnaposto immagine 48" descr="Immagine che contiene nero, oscurità&#10;&#10;Descrizione generata automaticamente">
+          <p:cNvPr id="49" name="Segnaposto immagine 48">
             <a:extLst>
               <a:ext uri="{FF2B5EF4-FFF2-40B4-BE49-F238E27FC236}">
                 <a16:creationId xmlns:a16="http://schemas.microsoft.com/office/drawing/2014/main" id="{39C83DC2-1430-790F-2E40-B693C1747C7A}"/>
@@ -22589,11 +22643,9 @@
           </p:nvPr>
         </p:nvPicPr>
         <p:blipFill>
-          <a:blip r:embed="rId6"/>
-          <a:srcRect l="57" r="57"/>
-          <a:stretch>
-            <a:fillRect/>
-          </a:stretch>
+          <a:blip r:embed="rId7"/>
+          <a:srcRect/>
+          <a:stretch/>
         </p:blipFill>
         <p:spPr/>
       </p:pic>
@@ -23846,6 +23898,35 @@
 </file>
 
 <file path=customXml/item1.xml><?xml version="1.0" encoding="utf-8"?>
+<?mso-contentType ?>
+<FormTemplates xmlns="http://schemas.microsoft.com/sharepoint/v3/contenttype/forms">
+  <Display>DocumentLibraryForm</Display>
+  <Edit>DocumentLibraryForm</Edit>
+  <New>DocumentLibraryForm</New>
+</FormTemplates>
+</file>
+
+<file path=customXml/item2.xml><?xml version="1.0" encoding="utf-8"?>
+<p:properties xmlns:p="http://schemas.microsoft.com/office/2006/metadata/properties" xmlns:xsi="http://www.w3.org/2001/XMLSchema-instance" xmlns:pc="http://schemas.microsoft.com/office/infopath/2007/PartnerControls">
+  <documentManagement>
+    <_ip_UnifiedCompliancePolicyUIAction xmlns="http://schemas.microsoft.com/sharepoint/v3" xsi:nil="true"/>
+    <Image xmlns="71af3243-3dd4-4a8d-8c0d-dd76da1f02a5">
+      <Url xsi:nil="true"/>
+      <Description xsi:nil="true"/>
+    </Image>
+    <Status xmlns="71af3243-3dd4-4a8d-8c0d-dd76da1f02a5">Not started</Status>
+    <Background xmlns="71af3243-3dd4-4a8d-8c0d-dd76da1f02a5">false</Background>
+    <_ip_UnifiedCompliancePolicyProperties xmlns="http://schemas.microsoft.com/sharepoint/v3" xsi:nil="true"/>
+    <ImageTagsTaxHTField xmlns="71af3243-3dd4-4a8d-8c0d-dd76da1f02a5">
+      <Terms xmlns="http://schemas.microsoft.com/office/infopath/2007/PartnerControls"/>
+    </ImageTagsTaxHTField>
+    <TaxCatchAll xmlns="230e9df3-be65-4c73-a93b-d1236ebd677e" xsi:nil="true"/>
+    <MediaServiceKeyPoints xmlns="71af3243-3dd4-4a8d-8c0d-dd76da1f02a5" xsi:nil="true"/>
+  </documentManagement>
+</p:properties>
+</file>
+
+<file path=customXml/item3.xml><?xml version="1.0" encoding="utf-8"?>
 <ct:contentTypeSchema xmlns:ct="http://schemas.microsoft.com/office/2006/metadata/contentType" xmlns:ma="http://schemas.microsoft.com/office/2006/metadata/properties/metaAttributes" ct:_="" ma:_="" ma:contentTypeName="Document" ma:contentTypeID="0x01010079F111ED35F8CC479449609E8A0923A6" ma:contentTypeVersion="25" ma:contentTypeDescription="Create a new document." ma:contentTypeScope="" ma:versionID="e02306daf00165b375dc6a58966960be">
   <xsd:schema xmlns:xsd="http://www.w3.org/2001/XMLSchema" xmlns:xs="http://www.w3.org/2001/XMLSchema" xmlns:p="http://schemas.microsoft.com/office/2006/metadata/properties" xmlns:ns1="http://schemas.microsoft.com/sharepoint/v3" xmlns:ns2="71af3243-3dd4-4a8d-8c0d-dd76da1f02a5" xmlns:ns3="16c05727-aa75-4e4a-9b5f-8a80a1165891" xmlns:ns4="230e9df3-be65-4c73-a93b-d1236ebd677e" targetNamespace="http://schemas.microsoft.com/office/2006/metadata/properties" ma:root="true" ma:fieldsID="df88fb76bf5f555224557953949c1ec9" ns1:_="" ns2:_="" ns3:_="" ns4:_="">
     <xsd:import namespace="http://schemas.microsoft.com/sharepoint/v3"/>
@@ -24139,36 +24220,27 @@
 </ct:contentTypeSchema>
 </file>
 
-<file path=customXml/item2.xml><?xml version="1.0" encoding="utf-8"?>
-<p:properties xmlns:p="http://schemas.microsoft.com/office/2006/metadata/properties" xmlns:xsi="http://www.w3.org/2001/XMLSchema-instance" xmlns:pc="http://schemas.microsoft.com/office/infopath/2007/PartnerControls">
-  <documentManagement>
-    <_ip_UnifiedCompliancePolicyUIAction xmlns="http://schemas.microsoft.com/sharepoint/v3" xsi:nil="true"/>
-    <Image xmlns="71af3243-3dd4-4a8d-8c0d-dd76da1f02a5">
-      <Url xsi:nil="true"/>
-      <Description xsi:nil="true"/>
-    </Image>
-    <Status xmlns="71af3243-3dd4-4a8d-8c0d-dd76da1f02a5">Not started</Status>
-    <Background xmlns="71af3243-3dd4-4a8d-8c0d-dd76da1f02a5">false</Background>
-    <_ip_UnifiedCompliancePolicyProperties xmlns="http://schemas.microsoft.com/sharepoint/v3" xsi:nil="true"/>
-    <ImageTagsTaxHTField xmlns="71af3243-3dd4-4a8d-8c0d-dd76da1f02a5">
-      <Terms xmlns="http://schemas.microsoft.com/office/infopath/2007/PartnerControls"/>
-    </ImageTagsTaxHTField>
-    <TaxCatchAll xmlns="230e9df3-be65-4c73-a93b-d1236ebd677e" xsi:nil="true"/>
-    <MediaServiceKeyPoints xmlns="71af3243-3dd4-4a8d-8c0d-dd76da1f02a5" xsi:nil="true"/>
-  </documentManagement>
-</p:properties>
+<file path=customXml/itemProps1.xml><?xml version="1.0" encoding="utf-8"?>
+<ds:datastoreItem xmlns:ds="http://schemas.openxmlformats.org/officeDocument/2006/customXml" ds:itemID="{83441F37-C10B-49C7-9131-D813AD6E9480}">
+  <ds:schemaRefs>
+    <ds:schemaRef ds:uri="http://schemas.microsoft.com/sharepoint/v3/contenttype/forms"/>
+  </ds:schemaRefs>
+</ds:datastoreItem>
 </file>
 
-<file path=customXml/item3.xml><?xml version="1.0" encoding="utf-8"?>
-<?mso-contentType ?>
-<FormTemplates xmlns="http://schemas.microsoft.com/sharepoint/v3/contenttype/forms">
-  <Display>DocumentLibraryForm</Display>
-  <Edit>DocumentLibraryForm</Edit>
-  <New>DocumentLibraryForm</New>
-</FormTemplates>
+<file path=customXml/itemProps2.xml><?xml version="1.0" encoding="utf-8"?>
+<ds:datastoreItem xmlns:ds="http://schemas.openxmlformats.org/officeDocument/2006/customXml" ds:itemID="{3065A588-1D2A-427C-AA32-A236D95C8F89}">
+  <ds:schemaRefs>
+    <ds:schemaRef ds:uri="http://schemas.microsoft.com/office/2006/metadata/properties"/>
+    <ds:schemaRef ds:uri="http://schemas.microsoft.com/office/infopath/2007/PartnerControls"/>
+    <ds:schemaRef ds:uri="http://schemas.microsoft.com/sharepoint/v3"/>
+    <ds:schemaRef ds:uri="71af3243-3dd4-4a8d-8c0d-dd76da1f02a5"/>
+    <ds:schemaRef ds:uri="230e9df3-be65-4c73-a93b-d1236ebd677e"/>
+  </ds:schemaRefs>
+</ds:datastoreItem>
 </file>
 
-<file path=customXml/itemProps1.xml><?xml version="1.0" encoding="utf-8"?>
+<file path=customXml/itemProps3.xml><?xml version="1.0" encoding="utf-8"?>
 <ds:datastoreItem xmlns:ds="http://schemas.openxmlformats.org/officeDocument/2006/customXml" ds:itemID="{4FB0F111-FD6B-4279-A9B8-A9ADF2774655}">
   <ds:schemaRefs>
     <ds:schemaRef ds:uri="http://schemas.microsoft.com/office/2006/metadata/contentType"/>
@@ -24189,26 +24261,6 @@
 </ds:datastoreItem>
 </file>
 
-<file path=customXml/itemProps2.xml><?xml version="1.0" encoding="utf-8"?>
-<ds:datastoreItem xmlns:ds="http://schemas.openxmlformats.org/officeDocument/2006/customXml" ds:itemID="{3065A588-1D2A-427C-AA32-A236D95C8F89}">
-  <ds:schemaRefs>
-    <ds:schemaRef ds:uri="http://schemas.microsoft.com/office/2006/metadata/properties"/>
-    <ds:schemaRef ds:uri="http://schemas.microsoft.com/office/infopath/2007/PartnerControls"/>
-    <ds:schemaRef ds:uri="http://schemas.microsoft.com/sharepoint/v3"/>
-    <ds:schemaRef ds:uri="71af3243-3dd4-4a8d-8c0d-dd76da1f02a5"/>
-    <ds:schemaRef ds:uri="230e9df3-be65-4c73-a93b-d1236ebd677e"/>
-  </ds:schemaRefs>
-</ds:datastoreItem>
-</file>
-
-<file path=customXml/itemProps3.xml><?xml version="1.0" encoding="utf-8"?>
-<ds:datastoreItem xmlns:ds="http://schemas.openxmlformats.org/officeDocument/2006/customXml" ds:itemID="{83441F37-C10B-49C7-9131-D813AD6E9480}">
-  <ds:schemaRefs>
-    <ds:schemaRef ds:uri="http://schemas.microsoft.com/sharepoint/v3/contenttype/forms"/>
-  </ds:schemaRefs>
-</ds:datastoreItem>
-</file>
-
 <file path=docMetadata/LabelInfo.xml><?xml version="1.0" encoding="utf-8"?>
 <clbl:labelList xmlns:clbl="http://schemas.microsoft.com/office/2020/mipLabelMetadata"/>
 </file>
</xml_diff>

<commit_message>
Ultima versione slide pitch e aggiornamento leggero parte grafica
</commit_message>
<xml_diff>
--- a/pitch.pptx
+++ b/pitch.pptx
@@ -258,7 +258,7 @@
             <a:pPr rtl="0"/>
             <a:fld id="{F89E88F4-14A3-4F0D-ACEB-E3513661AA41}" type="datetime1">
               <a:rPr lang="it-IT" smtClean="0"/>
-              <a:t>23/09/2024</a:t>
+              <a:t>28/09/2024</a:t>
             </a:fld>
             <a:endParaRPr lang="it-IT" dirty="0"/>
           </a:p>
@@ -440,7 +440,7 @@
             <a:fld id="{72556EB7-85BF-4576-875A-5B0CD80C40E6}" type="datetime1">
               <a:rPr lang="it-IT" smtClean="0"/>
               <a:pPr/>
-              <a:t>23/09/2024</a:t>
+              <a:t>28/09/2024</a:t>
             </a:fld>
             <a:endParaRPr lang="it-IT" dirty="0"/>
           </a:p>
@@ -17925,8 +17925,8 @@
         </p:nvSpPr>
         <p:spPr>
           <a:xfrm>
-            <a:off x="2831592" y="2458065"/>
-            <a:ext cx="6528816" cy="816077"/>
+            <a:off x="2620246" y="2458065"/>
+            <a:ext cx="6951508" cy="816077"/>
           </a:xfrm>
         </p:spPr>
         <p:txBody>
@@ -17943,117 +17943,138 @@
               </a:lnSpc>
             </a:pPr>
             <a:r>
-              <a:rPr lang="it-IT" sz="7200" dirty="0"/>
+              <a:rPr lang="it-IT" sz="8000" dirty="0"/>
               <a:t>SatisTrento</a:t>
             </a:r>
           </a:p>
         </p:txBody>
       </p:sp>
-      <p:pic>
-        <p:nvPicPr>
-          <p:cNvPr id="4" name="Immagine 3">
-            <a:extLst>
-              <a:ext uri="{FF2B5EF4-FFF2-40B4-BE49-F238E27FC236}">
-                <a16:creationId xmlns:a16="http://schemas.microsoft.com/office/drawing/2014/main" id="{C4E0C2B3-D484-14A6-C24B-CCC933BB751E}"/>
-              </a:ext>
-            </a:extLst>
-          </p:cNvPr>
-          <p:cNvPicPr>
-            <a:picLocks noChangeAspect="1"/>
-          </p:cNvPicPr>
+      <p:grpSp>
+        <p:nvGrpSpPr>
+          <p:cNvPr id="6" name="Gruppo 5">
+            <a:extLst>
+              <a:ext uri="{FF2B5EF4-FFF2-40B4-BE49-F238E27FC236}">
+                <a16:creationId xmlns:a16="http://schemas.microsoft.com/office/drawing/2014/main" id="{9279CA4D-F227-8D16-24D8-E2A5EA1B9729}"/>
+              </a:ext>
+            </a:extLst>
+          </p:cNvPr>
+          <p:cNvGrpSpPr/>
           <p:nvPr/>
-        </p:nvPicPr>
-        <p:blipFill>
-          <a:blip r:embed="rId3"/>
-          <a:srcRect/>
-          <a:stretch/>
-        </p:blipFill>
-        <p:spPr>
+        </p:nvGrpSpPr>
+        <p:grpSpPr>
           <a:xfrm>
             <a:off x="0" y="-1"/>
-            <a:ext cx="4255276" cy="1474840"/>
-          </a:xfrm>
-          <a:prstGeom prst="rect">
-            <a:avLst/>
-          </a:prstGeom>
-          <a:solidFill>
-            <a:srgbClr val="FDF9E2"/>
-          </a:solidFill>
-        </p:spPr>
-      </p:pic>
-      <p:pic>
-        <p:nvPicPr>
-          <p:cNvPr id="10" name="Immagine 9" descr="Immagine che contiene testo, Carattere, Elementi grafici, tipografia">
-            <a:extLst>
-              <a:ext uri="{FF2B5EF4-FFF2-40B4-BE49-F238E27FC236}">
-                <a16:creationId xmlns:a16="http://schemas.microsoft.com/office/drawing/2014/main" id="{514A0A3C-097B-E349-1A44-4959F79C3755}"/>
-              </a:ext>
-            </a:extLst>
-          </p:cNvPr>
-          <p:cNvPicPr>
-            <a:picLocks noChangeAspect="1"/>
-          </p:cNvPicPr>
-          <p:nvPr/>
-        </p:nvPicPr>
-        <p:blipFill>
-          <a:blip r:embed="rId4"/>
-          <a:stretch>
-            <a:fillRect/>
-          </a:stretch>
-        </p:blipFill>
-        <p:spPr>
-          <a:xfrm>
-            <a:off x="4272549" y="46309"/>
-            <a:ext cx="3217238" cy="1382220"/>
-          </a:xfrm>
-          <a:prstGeom prst="rect">
-            <a:avLst/>
-          </a:prstGeom>
-        </p:spPr>
-      </p:pic>
-      <p:cxnSp>
-        <p:nvCxnSpPr>
-          <p:cNvPr id="12" name="Connettore diritto 11">
-            <a:extLst>
-              <a:ext uri="{FF2B5EF4-FFF2-40B4-BE49-F238E27FC236}">
-                <a16:creationId xmlns:a16="http://schemas.microsoft.com/office/drawing/2014/main" id="{2A55F428-77A5-21A6-61B2-4EA64A228095}"/>
-              </a:ext>
-            </a:extLst>
-          </p:cNvPr>
-          <p:cNvCxnSpPr>
-            <a:cxnSpLocks/>
-          </p:cNvCxnSpPr>
-          <p:nvPr/>
-        </p:nvCxnSpPr>
-        <p:spPr>
-          <a:xfrm>
-            <a:off x="4255276" y="88490"/>
-            <a:ext cx="0" cy="1297858"/>
-          </a:xfrm>
-          <a:prstGeom prst="line">
-            <a:avLst/>
-          </a:prstGeom>
-          <a:ln>
+            <a:ext cx="7489787" cy="1474840"/>
+            <a:chOff x="0" y="-1"/>
+            <a:chExt cx="7489787" cy="1474840"/>
+          </a:xfrm>
+        </p:grpSpPr>
+        <p:pic>
+          <p:nvPicPr>
+            <p:cNvPr id="4" name="Immagine 3">
+              <a:extLst>
+                <a:ext uri="{FF2B5EF4-FFF2-40B4-BE49-F238E27FC236}">
+                  <a16:creationId xmlns:a16="http://schemas.microsoft.com/office/drawing/2014/main" id="{C4E0C2B3-D484-14A6-C24B-CCC933BB751E}"/>
+                </a:ext>
+              </a:extLst>
+            </p:cNvPr>
+            <p:cNvPicPr>
+              <a:picLocks noChangeAspect="1"/>
+            </p:cNvPicPr>
+            <p:nvPr/>
+          </p:nvPicPr>
+          <p:blipFill>
+            <a:blip r:embed="rId3"/>
+            <a:srcRect/>
+            <a:stretch/>
+          </p:blipFill>
+          <p:spPr>
+            <a:xfrm>
+              <a:off x="0" y="-1"/>
+              <a:ext cx="4255276" cy="1474840"/>
+            </a:xfrm>
+            <a:prstGeom prst="rect">
+              <a:avLst/>
+            </a:prstGeom>
             <a:solidFill>
-              <a:srgbClr val="B6B3A2"/>
+              <a:srgbClr val="FDF9E2"/>
             </a:solidFill>
-          </a:ln>
-        </p:spPr>
-        <p:style>
-          <a:lnRef idx="3">
-            <a:schemeClr val="dk1"/>
-          </a:lnRef>
-          <a:fillRef idx="0">
-            <a:schemeClr val="dk1"/>
-          </a:fillRef>
-          <a:effectRef idx="2">
-            <a:schemeClr val="dk1"/>
-          </a:effectRef>
-          <a:fontRef idx="minor">
-            <a:schemeClr val="tx1"/>
-          </a:fontRef>
-        </p:style>
-      </p:cxnSp>
+          </p:spPr>
+        </p:pic>
+        <p:pic>
+          <p:nvPicPr>
+            <p:cNvPr id="10" name="Immagine 9" descr="Immagine che contiene testo, Carattere, Elementi grafici, tipografia">
+              <a:extLst>
+                <a:ext uri="{FF2B5EF4-FFF2-40B4-BE49-F238E27FC236}">
+                  <a16:creationId xmlns:a16="http://schemas.microsoft.com/office/drawing/2014/main" id="{514A0A3C-097B-E349-1A44-4959F79C3755}"/>
+                </a:ext>
+              </a:extLst>
+            </p:cNvPr>
+            <p:cNvPicPr>
+              <a:picLocks noChangeAspect="1"/>
+            </p:cNvPicPr>
+            <p:nvPr/>
+          </p:nvPicPr>
+          <p:blipFill>
+            <a:blip r:embed="rId4"/>
+            <a:stretch>
+              <a:fillRect/>
+            </a:stretch>
+          </p:blipFill>
+          <p:spPr>
+            <a:xfrm>
+              <a:off x="4272549" y="46309"/>
+              <a:ext cx="3217238" cy="1382220"/>
+            </a:xfrm>
+            <a:prstGeom prst="rect">
+              <a:avLst/>
+            </a:prstGeom>
+          </p:spPr>
+        </p:pic>
+        <p:cxnSp>
+          <p:nvCxnSpPr>
+            <p:cNvPr id="12" name="Connettore diritto 11">
+              <a:extLst>
+                <a:ext uri="{FF2B5EF4-FFF2-40B4-BE49-F238E27FC236}">
+                  <a16:creationId xmlns:a16="http://schemas.microsoft.com/office/drawing/2014/main" id="{2A55F428-77A5-21A6-61B2-4EA64A228095}"/>
+                </a:ext>
+              </a:extLst>
+            </p:cNvPr>
+            <p:cNvCxnSpPr>
+              <a:cxnSpLocks/>
+            </p:cNvCxnSpPr>
+            <p:nvPr/>
+          </p:nvCxnSpPr>
+          <p:spPr>
+            <a:xfrm>
+              <a:off x="4255276" y="88490"/>
+              <a:ext cx="0" cy="1297858"/>
+            </a:xfrm>
+            <a:prstGeom prst="line">
+              <a:avLst/>
+            </a:prstGeom>
+            <a:ln>
+              <a:solidFill>
+                <a:srgbClr val="B6B3A2"/>
+              </a:solidFill>
+            </a:ln>
+          </p:spPr>
+          <p:style>
+            <a:lnRef idx="3">
+              <a:schemeClr val="dk1"/>
+            </a:lnRef>
+            <a:fillRef idx="0">
+              <a:schemeClr val="dk1"/>
+            </a:fillRef>
+            <a:effectRef idx="2">
+              <a:schemeClr val="dk1"/>
+            </a:effectRef>
+            <a:fontRef idx="minor">
+              <a:schemeClr val="tx1"/>
+            </a:fontRef>
+          </p:style>
+        </p:cxnSp>
+      </p:grpSp>
     </p:spTree>
     <p:extLst>
       <p:ext uri="{BB962C8B-B14F-4D97-AF65-F5344CB8AC3E}">
@@ -23846,6 +23867,26 @@
 </file>
 
 <file path=customXml/item1.xml><?xml version="1.0" encoding="utf-8"?>
+<p:properties xmlns:p="http://schemas.microsoft.com/office/2006/metadata/properties" xmlns:xsi="http://www.w3.org/2001/XMLSchema-instance" xmlns:pc="http://schemas.microsoft.com/office/infopath/2007/PartnerControls">
+  <documentManagement>
+    <_ip_UnifiedCompliancePolicyUIAction xmlns="http://schemas.microsoft.com/sharepoint/v3" xsi:nil="true"/>
+    <Image xmlns="71af3243-3dd4-4a8d-8c0d-dd76da1f02a5">
+      <Url xsi:nil="true"/>
+      <Description xsi:nil="true"/>
+    </Image>
+    <Status xmlns="71af3243-3dd4-4a8d-8c0d-dd76da1f02a5">Not started</Status>
+    <Background xmlns="71af3243-3dd4-4a8d-8c0d-dd76da1f02a5">false</Background>
+    <_ip_UnifiedCompliancePolicyProperties xmlns="http://schemas.microsoft.com/sharepoint/v3" xsi:nil="true"/>
+    <ImageTagsTaxHTField xmlns="71af3243-3dd4-4a8d-8c0d-dd76da1f02a5">
+      <Terms xmlns="http://schemas.microsoft.com/office/infopath/2007/PartnerControls"/>
+    </ImageTagsTaxHTField>
+    <TaxCatchAll xmlns="230e9df3-be65-4c73-a93b-d1236ebd677e" xsi:nil="true"/>
+    <MediaServiceKeyPoints xmlns="71af3243-3dd4-4a8d-8c0d-dd76da1f02a5" xsi:nil="true"/>
+  </documentManagement>
+</p:properties>
+</file>
+
+<file path=customXml/item2.xml><?xml version="1.0" encoding="utf-8"?>
 <ct:contentTypeSchema xmlns:ct="http://schemas.microsoft.com/office/2006/metadata/contentType" xmlns:ma="http://schemas.microsoft.com/office/2006/metadata/properties/metaAttributes" ct:_="" ma:_="" ma:contentTypeName="Document" ma:contentTypeID="0x01010079F111ED35F8CC479449609E8A0923A6" ma:contentTypeVersion="25" ma:contentTypeDescription="Create a new document." ma:contentTypeScope="" ma:versionID="e02306daf00165b375dc6a58966960be">
   <xsd:schema xmlns:xsd="http://www.w3.org/2001/XMLSchema" xmlns:xs="http://www.w3.org/2001/XMLSchema" xmlns:p="http://schemas.microsoft.com/office/2006/metadata/properties" xmlns:ns1="http://schemas.microsoft.com/sharepoint/v3" xmlns:ns2="71af3243-3dd4-4a8d-8c0d-dd76da1f02a5" xmlns:ns3="16c05727-aa75-4e4a-9b5f-8a80a1165891" xmlns:ns4="230e9df3-be65-4c73-a93b-d1236ebd677e" targetNamespace="http://schemas.microsoft.com/office/2006/metadata/properties" ma:root="true" ma:fieldsID="df88fb76bf5f555224557953949c1ec9" ns1:_="" ns2:_="" ns3:_="" ns4:_="">
     <xsd:import namespace="http://schemas.microsoft.com/sharepoint/v3"/>
@@ -24139,26 +24180,6 @@
 </ct:contentTypeSchema>
 </file>
 
-<file path=customXml/item2.xml><?xml version="1.0" encoding="utf-8"?>
-<p:properties xmlns:p="http://schemas.microsoft.com/office/2006/metadata/properties" xmlns:xsi="http://www.w3.org/2001/XMLSchema-instance" xmlns:pc="http://schemas.microsoft.com/office/infopath/2007/PartnerControls">
-  <documentManagement>
-    <_ip_UnifiedCompliancePolicyUIAction xmlns="http://schemas.microsoft.com/sharepoint/v3" xsi:nil="true"/>
-    <Image xmlns="71af3243-3dd4-4a8d-8c0d-dd76da1f02a5">
-      <Url xsi:nil="true"/>
-      <Description xsi:nil="true"/>
-    </Image>
-    <Status xmlns="71af3243-3dd4-4a8d-8c0d-dd76da1f02a5">Not started</Status>
-    <Background xmlns="71af3243-3dd4-4a8d-8c0d-dd76da1f02a5">false</Background>
-    <_ip_UnifiedCompliancePolicyProperties xmlns="http://schemas.microsoft.com/sharepoint/v3" xsi:nil="true"/>
-    <ImageTagsTaxHTField xmlns="71af3243-3dd4-4a8d-8c0d-dd76da1f02a5">
-      <Terms xmlns="http://schemas.microsoft.com/office/infopath/2007/PartnerControls"/>
-    </ImageTagsTaxHTField>
-    <TaxCatchAll xmlns="230e9df3-be65-4c73-a93b-d1236ebd677e" xsi:nil="true"/>
-    <MediaServiceKeyPoints xmlns="71af3243-3dd4-4a8d-8c0d-dd76da1f02a5" xsi:nil="true"/>
-  </documentManagement>
-</p:properties>
-</file>
-
 <file path=customXml/item3.xml><?xml version="1.0" encoding="utf-8"?>
 <?mso-contentType ?>
 <FormTemplates xmlns="http://schemas.microsoft.com/sharepoint/v3/contenttype/forms">
@@ -24169,6 +24190,18 @@
 </file>
 
 <file path=customXml/itemProps1.xml><?xml version="1.0" encoding="utf-8"?>
+<ds:datastoreItem xmlns:ds="http://schemas.openxmlformats.org/officeDocument/2006/customXml" ds:itemID="{3065A588-1D2A-427C-AA32-A236D95C8F89}">
+  <ds:schemaRefs>
+    <ds:schemaRef ds:uri="http://schemas.microsoft.com/office/2006/metadata/properties"/>
+    <ds:schemaRef ds:uri="http://schemas.microsoft.com/office/infopath/2007/PartnerControls"/>
+    <ds:schemaRef ds:uri="http://schemas.microsoft.com/sharepoint/v3"/>
+    <ds:schemaRef ds:uri="71af3243-3dd4-4a8d-8c0d-dd76da1f02a5"/>
+    <ds:schemaRef ds:uri="230e9df3-be65-4c73-a93b-d1236ebd677e"/>
+  </ds:schemaRefs>
+</ds:datastoreItem>
+</file>
+
+<file path=customXml/itemProps2.xml><?xml version="1.0" encoding="utf-8"?>
 <ds:datastoreItem xmlns:ds="http://schemas.openxmlformats.org/officeDocument/2006/customXml" ds:itemID="{4FB0F111-FD6B-4279-A9B8-A9ADF2774655}">
   <ds:schemaRefs>
     <ds:schemaRef ds:uri="http://schemas.microsoft.com/office/2006/metadata/contentType"/>
@@ -24189,18 +24222,6 @@
 </ds:datastoreItem>
 </file>
 
-<file path=customXml/itemProps2.xml><?xml version="1.0" encoding="utf-8"?>
-<ds:datastoreItem xmlns:ds="http://schemas.openxmlformats.org/officeDocument/2006/customXml" ds:itemID="{3065A588-1D2A-427C-AA32-A236D95C8F89}">
-  <ds:schemaRefs>
-    <ds:schemaRef ds:uri="http://schemas.microsoft.com/office/2006/metadata/properties"/>
-    <ds:schemaRef ds:uri="http://schemas.microsoft.com/office/infopath/2007/PartnerControls"/>
-    <ds:schemaRef ds:uri="http://schemas.microsoft.com/sharepoint/v3"/>
-    <ds:schemaRef ds:uri="71af3243-3dd4-4a8d-8c0d-dd76da1f02a5"/>
-    <ds:schemaRef ds:uri="230e9df3-be65-4c73-a93b-d1236ebd677e"/>
-  </ds:schemaRefs>
-</ds:datastoreItem>
-</file>
-
 <file path=customXml/itemProps3.xml><?xml version="1.0" encoding="utf-8"?>
 <ds:datastoreItem xmlns:ds="http://schemas.openxmlformats.org/officeDocument/2006/customXml" ds:itemID="{83441F37-C10B-49C7-9131-D813AD6E9480}">
   <ds:schemaRefs>

</xml_diff>

<commit_message>
fix(pitch): :bug: Edit pitch
Co-Authored-By: Luca Facchini <45771235+lucafano04@users.noreply.github.com>
Co-Authored-By: Lukil33 <164167364+Lukil33@users.noreply.github.com>
</commit_message>
<xml_diff>
--- a/pitch.pptx
+++ b/pitch.pptx
@@ -258,7 +258,7 @@
             <a:pPr rtl="0"/>
             <a:fld id="{F89E88F4-14A3-4F0D-ACEB-E3513661AA41}" type="datetime1">
               <a:rPr lang="it-IT" smtClean="0"/>
-              <a:t>25/09/2024</a:t>
+              <a:t>01/10/2024</a:t>
             </a:fld>
             <a:endParaRPr lang="it-IT" dirty="0"/>
           </a:p>
@@ -338,7 +338,7 @@
             <a:pPr rtl="0"/>
             <a:fld id="{B3BF5047-6CED-44CC-A86C-D48A653D0A7A}" type="slidenum">
               <a:rPr lang="it-IT" smtClean="0"/>
-              <a:t>‹N›</a:t>
+              <a:t>‹#›</a:t>
             </a:fld>
             <a:endParaRPr lang="it-IT"/>
           </a:p>
@@ -440,7 +440,7 @@
             <a:fld id="{72556EB7-85BF-4576-875A-5B0CD80C40E6}" type="datetime1">
               <a:rPr lang="it-IT" smtClean="0"/>
               <a:pPr/>
-              <a:t>25/09/2024</a:t>
+              <a:t>01/10/2024</a:t>
             </a:fld>
             <a:endParaRPr lang="it-IT" dirty="0"/>
           </a:p>
@@ -609,7 +609,7 @@
             <a:pPr rtl="0"/>
             <a:fld id="{339D21CC-DD94-204E-93C8-E1AAF3084C8D}" type="slidenum">
               <a:rPr lang="it-IT" noProof="0" smtClean="0"/>
-              <a:t>‹N›</a:t>
+              <a:t>‹#›</a:t>
             </a:fld>
             <a:endParaRPr lang="it-IT" noProof="0"/>
           </a:p>
@@ -832,6 +832,183 @@
       </p:grpSpPr>
       <p:sp>
         <p:nvSpPr>
+          <p:cNvPr id="2" name="Slide Image Placeholder 1"/>
+          <p:cNvSpPr>
+            <a:spLocks noGrp="1" noRot="1" noChangeAspect="1"/>
+          </p:cNvSpPr>
+          <p:nvPr>
+            <p:ph type="sldImg"/>
+          </p:nvPr>
+        </p:nvSpPr>
+        <p:spPr/>
+      </p:sp>
+      <p:sp>
+        <p:nvSpPr>
+          <p:cNvPr id="3" name="Notes Placeholder 2"/>
+          <p:cNvSpPr>
+            <a:spLocks noGrp="1"/>
+          </p:cNvSpPr>
+          <p:nvPr>
+            <p:ph type="body" idx="1"/>
+          </p:nvPr>
+        </p:nvSpPr>
+        <p:spPr/>
+        <p:txBody>
+          <a:bodyPr/>
+          <a:lstStyle/>
+          <a:p>
+            <a:r>
+              <a:rPr lang="en-US" dirty="0" err="1"/>
+              <a:t>Bisogna</a:t>
+            </a:r>
+            <a:r>
+              <a:rPr lang="en-US" dirty="0"/>
+              <a:t> dire </a:t>
+            </a:r>
+          </a:p>
+        </p:txBody>
+      </p:sp>
+      <p:sp>
+        <p:nvSpPr>
+          <p:cNvPr id="4" name="Slide Number Placeholder 3"/>
+          <p:cNvSpPr>
+            <a:spLocks noGrp="1"/>
+          </p:cNvSpPr>
+          <p:nvPr>
+            <p:ph type="sldNum" sz="quarter" idx="5"/>
+          </p:nvPr>
+        </p:nvSpPr>
+        <p:spPr/>
+        <p:txBody>
+          <a:bodyPr/>
+          <a:lstStyle/>
+          <a:p>
+            <a:pPr rtl="0"/>
+            <a:fld id="{339D21CC-DD94-204E-93C8-E1AAF3084C8D}" type="slidenum">
+              <a:rPr lang="it-IT" noProof="0" smtClean="0"/>
+              <a:t>2</a:t>
+            </a:fld>
+            <a:endParaRPr lang="it-IT" noProof="0"/>
+          </a:p>
+        </p:txBody>
+      </p:sp>
+    </p:spTree>
+    <p:extLst>
+      <p:ext uri="{BB962C8B-B14F-4D97-AF65-F5344CB8AC3E}">
+        <p14:creationId xmlns:p14="http://schemas.microsoft.com/office/powerpoint/2010/main" val="2857624674"/>
+      </p:ext>
+    </p:extLst>
+  </p:cSld>
+  <p:clrMapOvr>
+    <a:masterClrMapping/>
+  </p:clrMapOvr>
+</p:notes>
+</file>
+
+<file path=ppt/notesSlides/notesSlide3.xml><?xml version="1.0" encoding="utf-8"?>
+<p:notes xmlns:a="http://schemas.openxmlformats.org/drawingml/2006/main" xmlns:r="http://schemas.openxmlformats.org/officeDocument/2006/relationships" xmlns:p="http://schemas.openxmlformats.org/presentationml/2006/main">
+  <p:cSld>
+    <p:spTree>
+      <p:nvGrpSpPr>
+        <p:cNvPr id="1" name=""/>
+        <p:cNvGrpSpPr/>
+        <p:nvPr/>
+      </p:nvGrpSpPr>
+      <p:grpSpPr>
+        <a:xfrm>
+          <a:off x="0" y="0"/>
+          <a:ext cx="0" cy="0"/>
+          <a:chOff x="0" y="0"/>
+          <a:chExt cx="0" cy="0"/>
+        </a:xfrm>
+      </p:grpSpPr>
+      <p:sp>
+        <p:nvSpPr>
+          <p:cNvPr id="2" name="Slide Image Placeholder 1"/>
+          <p:cNvSpPr>
+            <a:spLocks noGrp="1" noRot="1" noChangeAspect="1"/>
+          </p:cNvSpPr>
+          <p:nvPr>
+            <p:ph type="sldImg"/>
+          </p:nvPr>
+        </p:nvSpPr>
+        <p:spPr/>
+      </p:sp>
+      <p:sp>
+        <p:nvSpPr>
+          <p:cNvPr id="3" name="Notes Placeholder 2"/>
+          <p:cNvSpPr>
+            <a:spLocks noGrp="1"/>
+          </p:cNvSpPr>
+          <p:nvPr>
+            <p:ph type="body" idx="1"/>
+          </p:nvPr>
+        </p:nvSpPr>
+        <p:spPr/>
+        <p:txBody>
+          <a:bodyPr/>
+          <a:lstStyle/>
+          <a:p>
+            <a:endParaRPr lang="en-US" dirty="0"/>
+          </a:p>
+        </p:txBody>
+      </p:sp>
+      <p:sp>
+        <p:nvSpPr>
+          <p:cNvPr id="4" name="Slide Number Placeholder 3"/>
+          <p:cNvSpPr>
+            <a:spLocks noGrp="1"/>
+          </p:cNvSpPr>
+          <p:nvPr>
+            <p:ph type="sldNum" sz="quarter" idx="5"/>
+          </p:nvPr>
+        </p:nvSpPr>
+        <p:spPr/>
+        <p:txBody>
+          <a:bodyPr/>
+          <a:lstStyle/>
+          <a:p>
+            <a:pPr rtl="0"/>
+            <a:fld id="{339D21CC-DD94-204E-93C8-E1AAF3084C8D}" type="slidenum">
+              <a:rPr lang="it-IT" noProof="0" smtClean="0"/>
+              <a:t>3</a:t>
+            </a:fld>
+            <a:endParaRPr lang="it-IT" noProof="0"/>
+          </a:p>
+        </p:txBody>
+      </p:sp>
+    </p:spTree>
+    <p:extLst>
+      <p:ext uri="{BB962C8B-B14F-4D97-AF65-F5344CB8AC3E}">
+        <p14:creationId xmlns:p14="http://schemas.microsoft.com/office/powerpoint/2010/main" val="25067813"/>
+      </p:ext>
+    </p:extLst>
+  </p:cSld>
+  <p:clrMapOvr>
+    <a:masterClrMapping/>
+  </p:clrMapOvr>
+</p:notes>
+</file>
+
+<file path=ppt/notesSlides/notesSlide4.xml><?xml version="1.0" encoding="utf-8"?>
+<p:notes xmlns:a="http://schemas.openxmlformats.org/drawingml/2006/main" xmlns:r="http://schemas.openxmlformats.org/officeDocument/2006/relationships" xmlns:p="http://schemas.openxmlformats.org/presentationml/2006/main">
+  <p:cSld>
+    <p:spTree>
+      <p:nvGrpSpPr>
+        <p:cNvPr id="1" name=""/>
+        <p:cNvGrpSpPr/>
+        <p:nvPr/>
+      </p:nvGrpSpPr>
+      <p:grpSpPr>
+        <a:xfrm>
+          <a:off x="0" y="0"/>
+          <a:ext cx="0" cy="0"/>
+          <a:chOff x="0" y="0"/>
+          <a:chExt cx="0" cy="0"/>
+        </a:xfrm>
+      </p:grpSpPr>
+      <p:sp>
+        <p:nvSpPr>
           <p:cNvPr id="2" name="Segnaposto immagine diapositiva 1"/>
           <p:cNvSpPr>
             <a:spLocks noGrp="1" noRot="1" noChangeAspect="1"/>
@@ -1935,7 +2112,7 @@
             <a:fld id="{CC43B8D3-9A08-F84C-9DD4-44948BA52D4B}" type="slidenum">
               <a:rPr lang="it-IT" noProof="0" smtClean="0"/>
               <a:pPr rtl="0"/>
-              <a:t>‹N›</a:t>
+              <a:t>‹#›</a:t>
             </a:fld>
             <a:endParaRPr lang="it-IT" noProof="0"/>
           </a:p>
@@ -2250,7 +2427,7 @@
             <a:pPr rtl="0"/>
             <a:fld id="{CC43B8D3-9A08-F84C-9DD4-44948BA52D4B}" type="slidenum">
               <a:rPr lang="it-IT" noProof="0" smtClean="0"/>
-              <a:t>‹N›</a:t>
+              <a:t>‹#›</a:t>
             </a:fld>
             <a:endParaRPr lang="it-IT" noProof="0"/>
           </a:p>
@@ -3388,7 +3565,7 @@
             <a:fld id="{CC43B8D3-9A08-F84C-9DD4-44948BA52D4B}" type="slidenum">
               <a:rPr lang="it-IT" noProof="0" smtClean="0"/>
               <a:pPr rtl="0"/>
-              <a:t>‹N›</a:t>
+              <a:t>‹#›</a:t>
             </a:fld>
             <a:endParaRPr lang="it-IT" noProof="0"/>
           </a:p>
@@ -4510,7 +4687,7 @@
             <a:fld id="{CC43B8D3-9A08-F84C-9DD4-44948BA52D4B}" type="slidenum">
               <a:rPr lang="it-IT" noProof="0" smtClean="0"/>
               <a:pPr rtl="0"/>
-              <a:t>‹N›</a:t>
+              <a:t>‹#›</a:t>
             </a:fld>
             <a:endParaRPr lang="it-IT" noProof="0"/>
           </a:p>
@@ -5187,7 +5364,7 @@
             <a:fld id="{CC43B8D3-9A08-F84C-9DD4-44948BA52D4B}" type="slidenum">
               <a:rPr lang="it-IT" noProof="0" smtClean="0"/>
               <a:pPr rtl="0"/>
-              <a:t>‹N›</a:t>
+              <a:t>‹#›</a:t>
             </a:fld>
             <a:endParaRPr lang="it-IT" noProof="0"/>
           </a:p>
@@ -6592,7 +6769,7 @@
             <a:fld id="{CC43B8D3-9A08-F84C-9DD4-44948BA52D4B}" type="slidenum">
               <a:rPr lang="it-IT" noProof="0" smtClean="0"/>
               <a:pPr rtl="0"/>
-              <a:t>‹N›</a:t>
+              <a:t>‹#›</a:t>
             </a:fld>
             <a:endParaRPr lang="it-IT" noProof="0"/>
           </a:p>
@@ -7578,7 +7755,7 @@
             <a:fld id="{CC43B8D3-9A08-F84C-9DD4-44948BA52D4B}" type="slidenum">
               <a:rPr lang="it-IT" noProof="0" smtClean="0"/>
               <a:pPr rtl="0"/>
-              <a:t>‹N›</a:t>
+              <a:t>‹#›</a:t>
             </a:fld>
             <a:endParaRPr lang="it-IT" noProof="0"/>
           </a:p>
@@ -7728,7 +7905,7 @@
             <a:fld id="{CC43B8D3-9A08-F84C-9DD4-44948BA52D4B}" type="slidenum">
               <a:rPr lang="it-IT" noProof="0" smtClean="0"/>
               <a:pPr rtl="0"/>
-              <a:t>‹N›</a:t>
+              <a:t>‹#›</a:t>
             </a:fld>
             <a:endParaRPr lang="it-IT" noProof="0"/>
           </a:p>
@@ -8072,7 +8249,7 @@
             <a:fld id="{CC43B8D3-9A08-F84C-9DD4-44948BA52D4B}" type="slidenum">
               <a:rPr lang="it-IT" noProof="0" smtClean="0"/>
               <a:pPr rtl="0"/>
-              <a:t>‹N›</a:t>
+              <a:t>‹#›</a:t>
             </a:fld>
             <a:endParaRPr lang="it-IT" noProof="0"/>
           </a:p>
@@ -8741,7 +8918,7 @@
             <a:fld id="{CC43B8D3-9A08-F84C-9DD4-44948BA52D4B}" type="slidenum">
               <a:rPr lang="it-IT" noProof="0" smtClean="0"/>
               <a:pPr rtl="0"/>
-              <a:t>‹N›</a:t>
+              <a:t>‹#›</a:t>
             </a:fld>
             <a:endParaRPr lang="it-IT" noProof="0"/>
           </a:p>
@@ -9033,7 +9210,7 @@
             <a:fld id="{CC43B8D3-9A08-F84C-9DD4-44948BA52D4B}" type="slidenum">
               <a:rPr lang="it-IT" noProof="0" smtClean="0"/>
               <a:pPr rtl="0"/>
-              <a:t>‹N›</a:t>
+              <a:t>‹#›</a:t>
             </a:fld>
             <a:endParaRPr lang="it-IT" noProof="0"/>
           </a:p>
@@ -10818,7 +10995,7 @@
             <a:fld id="{CC43B8D3-9A08-F84C-9DD4-44948BA52D4B}" type="slidenum">
               <a:rPr lang="it-IT" noProof="0" smtClean="0"/>
               <a:pPr rtl="0"/>
-              <a:t>‹N›</a:t>
+              <a:t>‹#›</a:t>
             </a:fld>
             <a:endParaRPr lang="it-IT" noProof="0"/>
           </a:p>
@@ -11324,7 +11501,7 @@
             <a:fld id="{CC43B8D3-9A08-F84C-9DD4-44948BA52D4B}" type="slidenum">
               <a:rPr lang="it-IT" noProof="0" smtClean="0"/>
               <a:pPr rtl="0"/>
-              <a:t>‹N›</a:t>
+              <a:t>‹#›</a:t>
             </a:fld>
             <a:endParaRPr lang="it-IT" noProof="0"/>
           </a:p>
@@ -15036,7 +15213,7 @@
             <a:fld id="{CC43B8D3-9A08-F84C-9DD4-44948BA52D4B}" type="slidenum">
               <a:rPr lang="it-IT" noProof="0" smtClean="0"/>
               <a:pPr rtl="0"/>
-              <a:t>‹N›</a:t>
+              <a:t>‹#›</a:t>
             </a:fld>
             <a:endParaRPr lang="it-IT" noProof="0"/>
           </a:p>
@@ -17081,7 +17258,7 @@
             <a:fld id="{CC43B8D3-9A08-F84C-9DD4-44948BA52D4B}" type="slidenum">
               <a:rPr lang="it-IT" noProof="0" smtClean="0"/>
               <a:pPr rtl="0"/>
-              <a:t>‹N›</a:t>
+              <a:t>‹#›</a:t>
             </a:fld>
             <a:endParaRPr lang="it-IT" noProof="0"/>
           </a:p>
@@ -17281,7 +17458,7 @@
             <a:fld id="{CC43B8D3-9A08-F84C-9DD4-44948BA52D4B}" type="slidenum">
               <a:rPr lang="it-IT" noProof="0" smtClean="0"/>
               <a:pPr rtl="0"/>
-              <a:t>‹N›</a:t>
+              <a:t>‹#›</a:t>
             </a:fld>
             <a:endParaRPr lang="it-IT" noProof="0"/>
           </a:p>
@@ -18003,7 +18180,7 @@
         </p:blipFill>
         <p:spPr>
           <a:xfrm>
-            <a:off x="4272549" y="46309"/>
+            <a:off x="4262039" y="46309"/>
             <a:ext cx="3217238" cy="1382220"/>
           </a:xfrm>
           <a:prstGeom prst="rect">
@@ -18033,9 +18210,9 @@
           <a:prstGeom prst="line">
             <a:avLst/>
           </a:prstGeom>
-          <a:ln>
+          <a:ln w="6350">
             <a:solidFill>
-              <a:srgbClr val="B6B3A2"/>
+              <a:schemeClr val="tx1"/>
             </a:solidFill>
           </a:ln>
         </p:spPr>
@@ -18128,7 +18305,11 @@
             <p:ph type="body" sz="quarter" idx="13"/>
           </p:nvPr>
         </p:nvSpPr>
-        <p:spPr/>
+        <p:spPr>
+          <a:solidFill>
+            <a:schemeClr val="tx1"/>
+          </a:solidFill>
+        </p:spPr>
         <p:txBody>
           <a:bodyPr/>
           <a:lstStyle/>
@@ -18187,7 +18368,7 @@
         </p:nvSpPr>
         <p:spPr>
           <a:xfrm>
-            <a:off x="2726976" y="3857532"/>
+            <a:off x="1590523" y="4670355"/>
             <a:ext cx="3077611" cy="432000"/>
           </a:xfrm>
         </p:spPr>
@@ -18226,7 +18407,7 @@
         </p:nvSpPr>
         <p:spPr>
           <a:xfrm>
-            <a:off x="2726976" y="1821792"/>
+            <a:off x="1600683" y="1773715"/>
             <a:ext cx="3219450" cy="432000"/>
           </a:xfrm>
           <a:prstGeom prst="rect">
@@ -18433,7 +18614,7 @@
         </p:nvSpPr>
         <p:spPr>
           <a:xfrm>
-            <a:off x="2844418" y="2253792"/>
+            <a:off x="1718125" y="2205715"/>
             <a:ext cx="5626832" cy="923330"/>
           </a:xfrm>
           <a:prstGeom prst="rect">
@@ -18449,7 +18630,7 @@
           <a:p>
             <a:pPr marL="285750" indent="-285750">
               <a:buBlip>
-                <a:blip r:embed="rId2"/>
+                <a:blip r:embed="rId3"/>
               </a:buBlip>
             </a:pPr>
             <a:r>
@@ -18460,7 +18641,7 @@
           <a:p>
             <a:pPr marL="285750" indent="-285750">
               <a:buBlip>
-                <a:blip r:embed="rId2"/>
+                <a:blip r:embed="rId3"/>
               </a:buBlip>
             </a:pPr>
             <a:r>
@@ -18471,7 +18652,7 @@
           <a:p>
             <a:pPr marL="285750" indent="-285750">
               <a:buBlip>
-                <a:blip r:embed="rId2"/>
+                <a:blip r:embed="rId3"/>
               </a:buBlip>
             </a:pPr>
             <a:r>
@@ -18495,7 +18676,7 @@
         </p:nvSpPr>
         <p:spPr>
           <a:xfrm>
-            <a:off x="2838742" y="4298462"/>
+            <a:off x="1702289" y="5111285"/>
             <a:ext cx="5115555" cy="646331"/>
           </a:xfrm>
           <a:prstGeom prst="rect">
@@ -18511,7 +18692,7 @@
           <a:p>
             <a:pPr marL="285750" indent="-285750">
               <a:buBlip>
-                <a:blip r:embed="rId2"/>
+                <a:blip r:embed="rId3"/>
               </a:buBlip>
             </a:pPr>
             <a:r>
@@ -18521,12 +18702,482 @@
           </a:p>
         </p:txBody>
       </p:sp>
-      <p:sp>
-        <p:nvSpPr>
-          <p:cNvPr id="11" name="Connettore 10">
-            <a:extLst>
-              <a:ext uri="{FF2B5EF4-FFF2-40B4-BE49-F238E27FC236}">
-                <a16:creationId xmlns:a16="http://schemas.microsoft.com/office/drawing/2014/main" id="{B67C0F3A-E4CD-5F37-64D6-05031A332ED6}"/>
+      <p:grpSp>
+        <p:nvGrpSpPr>
+          <p:cNvPr id="13" name="Group 12">
+            <a:extLst>
+              <a:ext uri="{FF2B5EF4-FFF2-40B4-BE49-F238E27FC236}">
+                <a16:creationId xmlns:a16="http://schemas.microsoft.com/office/drawing/2014/main" id="{DCFF9230-67B4-3086-20A8-8BAAA2329192}"/>
+              </a:ext>
+            </a:extLst>
+          </p:cNvPr>
+          <p:cNvGrpSpPr/>
+          <p:nvPr/>
+        </p:nvGrpSpPr>
+        <p:grpSpPr>
+          <a:xfrm>
+            <a:off x="-8132" y="4695704"/>
+            <a:ext cx="1608815" cy="1116720"/>
+            <a:chOff x="0" y="3812835"/>
+            <a:chExt cx="2437598" cy="1692000"/>
+          </a:xfrm>
+        </p:grpSpPr>
+        <p:sp>
+          <p:nvSpPr>
+            <p:cNvPr id="32" name="Rettangolo 31">
+              <a:extLst>
+                <a:ext uri="{FF2B5EF4-FFF2-40B4-BE49-F238E27FC236}">
+                  <a16:creationId xmlns:a16="http://schemas.microsoft.com/office/drawing/2014/main" id="{32742B76-F70D-AEAB-188A-7993FE8F157D}"/>
+                </a:ext>
+              </a:extLst>
+            </p:cNvPr>
+            <p:cNvSpPr/>
+            <p:nvPr/>
+          </p:nvSpPr>
+          <p:spPr>
+            <a:xfrm>
+              <a:off x="0" y="4356148"/>
+              <a:ext cx="864000" cy="576000"/>
+            </a:xfrm>
+            <a:prstGeom prst="rect">
+              <a:avLst/>
+            </a:prstGeom>
+            <a:solidFill>
+              <a:srgbClr val="29B76F"/>
+            </a:solidFill>
+            <a:ln>
+              <a:noFill/>
+            </a:ln>
+          </p:spPr>
+          <p:style>
+            <a:lnRef idx="2">
+              <a:schemeClr val="accent1">
+                <a:shade val="15000"/>
+              </a:schemeClr>
+            </a:lnRef>
+            <a:fillRef idx="1">
+              <a:schemeClr val="accent1"/>
+            </a:fillRef>
+            <a:effectRef idx="0">
+              <a:schemeClr val="accent1"/>
+            </a:effectRef>
+            <a:fontRef idx="minor">
+              <a:schemeClr val="lt1"/>
+            </a:fontRef>
+          </p:style>
+          <p:txBody>
+            <a:bodyPr rtlCol="0" anchor="ctr"/>
+            <a:lstStyle/>
+            <a:p>
+              <a:pPr algn="ctr"/>
+              <a:endParaRPr lang="it-IT" dirty="0"/>
+            </a:p>
+          </p:txBody>
+        </p:sp>
+        <p:grpSp>
+          <p:nvGrpSpPr>
+            <p:cNvPr id="9" name="Group 8">
+              <a:extLst>
+                <a:ext uri="{FF2B5EF4-FFF2-40B4-BE49-F238E27FC236}">
+                  <a16:creationId xmlns:a16="http://schemas.microsoft.com/office/drawing/2014/main" id="{6EB90414-D4B2-B38F-AE16-423D85344B0C}"/>
+                </a:ext>
+              </a:extLst>
+            </p:cNvPr>
+            <p:cNvGrpSpPr/>
+            <p:nvPr/>
+          </p:nvGrpSpPr>
+          <p:grpSpPr>
+            <a:xfrm>
+              <a:off x="745598" y="3812835"/>
+              <a:ext cx="1692000" cy="1692000"/>
+              <a:chOff x="745598" y="3812835"/>
+              <a:chExt cx="1692000" cy="1692000"/>
+            </a:xfrm>
+          </p:grpSpPr>
+          <p:sp>
+            <p:nvSpPr>
+              <p:cNvPr id="33" name="Connettore 32">
+                <a:extLst>
+                  <a:ext uri="{FF2B5EF4-FFF2-40B4-BE49-F238E27FC236}">
+                    <a16:creationId xmlns:a16="http://schemas.microsoft.com/office/drawing/2014/main" id="{68D08AD9-62E1-831C-2789-0EB540DB7928}"/>
+                  </a:ext>
+                </a:extLst>
+              </p:cNvPr>
+              <p:cNvSpPr/>
+              <p:nvPr/>
+            </p:nvSpPr>
+            <p:spPr>
+              <a:xfrm>
+                <a:off x="745598" y="3812835"/>
+                <a:ext cx="1692000" cy="1692000"/>
+              </a:xfrm>
+              <a:prstGeom prst="flowChartConnector">
+                <a:avLst/>
+              </a:prstGeom>
+              <a:solidFill>
+                <a:srgbClr val="29B76F"/>
+              </a:solidFill>
+              <a:ln>
+                <a:solidFill>
+                  <a:srgbClr val="00AA59"/>
+                </a:solidFill>
+              </a:ln>
+            </p:spPr>
+            <p:style>
+              <a:lnRef idx="2">
+                <a:schemeClr val="accent1">
+                  <a:shade val="15000"/>
+                </a:schemeClr>
+              </a:lnRef>
+              <a:fillRef idx="1">
+                <a:schemeClr val="accent1"/>
+              </a:fillRef>
+              <a:effectRef idx="0">
+                <a:schemeClr val="accent1"/>
+              </a:effectRef>
+              <a:fontRef idx="minor">
+                <a:schemeClr val="lt1"/>
+              </a:fontRef>
+            </p:style>
+            <p:txBody>
+              <a:bodyPr rtlCol="0" anchor="ctr"/>
+              <a:lstStyle/>
+              <a:p>
+                <a:pPr algn="ctr"/>
+                <a:endParaRPr lang="it-IT" dirty="0">
+                  <a:solidFill>
+                    <a:schemeClr val="accent3"/>
+                  </a:solidFill>
+                </a:endParaRPr>
+              </a:p>
+            </p:txBody>
+          </p:sp>
+          <p:grpSp>
+            <p:nvGrpSpPr>
+              <p:cNvPr id="7" name="Group 6">
+                <a:extLst>
+                  <a:ext uri="{FF2B5EF4-FFF2-40B4-BE49-F238E27FC236}">
+                    <a16:creationId xmlns:a16="http://schemas.microsoft.com/office/drawing/2014/main" id="{3B39933D-4F55-0E40-0FAA-EF9EB6D1B157}"/>
+                  </a:ext>
+                </a:extLst>
+              </p:cNvPr>
+              <p:cNvGrpSpPr/>
+              <p:nvPr/>
+            </p:nvGrpSpPr>
+            <p:grpSpPr>
+              <a:xfrm>
+                <a:off x="979598" y="4046835"/>
+                <a:ext cx="1224000" cy="1224000"/>
+                <a:chOff x="979598" y="4046835"/>
+                <a:chExt cx="1224000" cy="1224000"/>
+              </a:xfrm>
+            </p:grpSpPr>
+            <p:sp>
+              <p:nvSpPr>
+                <p:cNvPr id="34" name="Connettore 33">
+                  <a:extLst>
+                    <a:ext uri="{FF2B5EF4-FFF2-40B4-BE49-F238E27FC236}">
+                      <a16:creationId xmlns:a16="http://schemas.microsoft.com/office/drawing/2014/main" id="{E9F3CEF6-B728-12DB-4D52-46FA36DDB086}"/>
+                    </a:ext>
+                  </a:extLst>
+                </p:cNvPr>
+                <p:cNvSpPr/>
+                <p:nvPr/>
+              </p:nvSpPr>
+              <p:spPr>
+                <a:xfrm>
+                  <a:off x="979598" y="4046835"/>
+                  <a:ext cx="1224000" cy="1224000"/>
+                </a:xfrm>
+                <a:prstGeom prst="flowChartConnector">
+                  <a:avLst/>
+                </a:prstGeom>
+                <a:solidFill>
+                  <a:srgbClr val="E5FFF2"/>
+                </a:solidFill>
+                <a:ln>
+                  <a:solidFill>
+                    <a:srgbClr val="E5FFF2"/>
+                  </a:solidFill>
+                </a:ln>
+              </p:spPr>
+              <p:style>
+                <a:lnRef idx="2">
+                  <a:schemeClr val="accent1">
+                    <a:shade val="15000"/>
+                  </a:schemeClr>
+                </a:lnRef>
+                <a:fillRef idx="1">
+                  <a:schemeClr val="accent1"/>
+                </a:fillRef>
+                <a:effectRef idx="0">
+                  <a:schemeClr val="accent1"/>
+                </a:effectRef>
+                <a:fontRef idx="minor">
+                  <a:schemeClr val="lt1"/>
+                </a:fontRef>
+              </p:style>
+              <p:txBody>
+                <a:bodyPr rtlCol="0" anchor="ctr"/>
+                <a:lstStyle/>
+                <a:p>
+                  <a:pPr algn="ctr"/>
+                  <a:endParaRPr lang="it-IT" dirty="0"/>
+                </a:p>
+              </p:txBody>
+            </p:sp>
+            <p:pic>
+              <p:nvPicPr>
+                <p:cNvPr id="10" name="Immagine 9">
+                  <a:extLst>
+                    <a:ext uri="{FF2B5EF4-FFF2-40B4-BE49-F238E27FC236}">
+                      <a16:creationId xmlns:a16="http://schemas.microsoft.com/office/drawing/2014/main" id="{56E4F37F-152E-134D-ADEF-5A1609046051}"/>
+                    </a:ext>
+                  </a:extLst>
+                </p:cNvPr>
+                <p:cNvPicPr>
+                  <a:picLocks noChangeAspect="1"/>
+                </p:cNvPicPr>
+                <p:nvPr/>
+              </p:nvPicPr>
+              <p:blipFill>
+                <a:blip r:embed="rId4"/>
+                <a:srcRect/>
+                <a:stretch/>
+              </p:blipFill>
+              <p:spPr>
+                <a:xfrm>
+                  <a:off x="1111140" y="4141171"/>
+                  <a:ext cx="960915" cy="960915"/>
+                </a:xfrm>
+                <a:prstGeom prst="rect">
+                  <a:avLst/>
+                </a:prstGeom>
+              </p:spPr>
+            </p:pic>
+          </p:grpSp>
+        </p:grpSp>
+      </p:grpSp>
+      <p:grpSp>
+        <p:nvGrpSpPr>
+          <p:cNvPr id="14" name="Group 13">
+            <a:extLst>
+              <a:ext uri="{FF2B5EF4-FFF2-40B4-BE49-F238E27FC236}">
+                <a16:creationId xmlns:a16="http://schemas.microsoft.com/office/drawing/2014/main" id="{CD3F7FED-6C9A-BDC3-C714-DF533548900A}"/>
+              </a:ext>
+            </a:extLst>
+          </p:cNvPr>
+          <p:cNvGrpSpPr/>
+          <p:nvPr/>
+        </p:nvGrpSpPr>
+        <p:grpSpPr>
+          <a:xfrm>
+            <a:off x="-8131" y="1886835"/>
+            <a:ext cx="1608815" cy="1116720"/>
+            <a:chOff x="-8132" y="1886835"/>
+            <a:chExt cx="2445730" cy="1692000"/>
+          </a:xfrm>
+        </p:grpSpPr>
+        <p:sp>
+          <p:nvSpPr>
+            <p:cNvPr id="11" name="Connettore 10">
+              <a:extLst>
+                <a:ext uri="{FF2B5EF4-FFF2-40B4-BE49-F238E27FC236}">
+                  <a16:creationId xmlns:a16="http://schemas.microsoft.com/office/drawing/2014/main" id="{B67C0F3A-E4CD-5F37-64D6-05031A332ED6}"/>
+                </a:ext>
+              </a:extLst>
+            </p:cNvPr>
+            <p:cNvSpPr/>
+            <p:nvPr/>
+          </p:nvSpPr>
+          <p:spPr>
+            <a:xfrm>
+              <a:off x="745598" y="1886835"/>
+              <a:ext cx="1692000" cy="1692000"/>
+            </a:xfrm>
+            <a:prstGeom prst="flowChartConnector">
+              <a:avLst/>
+            </a:prstGeom>
+            <a:solidFill>
+              <a:srgbClr val="FEA919"/>
+            </a:solidFill>
+            <a:ln>
+              <a:solidFill>
+                <a:srgbClr val="FEA919"/>
+              </a:solidFill>
+            </a:ln>
+          </p:spPr>
+          <p:style>
+            <a:lnRef idx="2">
+              <a:schemeClr val="accent1">
+                <a:shade val="15000"/>
+              </a:schemeClr>
+            </a:lnRef>
+            <a:fillRef idx="1">
+              <a:schemeClr val="accent1"/>
+            </a:fillRef>
+            <a:effectRef idx="0">
+              <a:schemeClr val="accent1"/>
+            </a:effectRef>
+            <a:fontRef idx="minor">
+              <a:schemeClr val="lt1"/>
+            </a:fontRef>
+          </p:style>
+          <p:txBody>
+            <a:bodyPr rtlCol="0" anchor="ctr"/>
+            <a:lstStyle/>
+            <a:p>
+              <a:pPr algn="ctr"/>
+              <a:endParaRPr lang="it-IT" dirty="0">
+                <a:solidFill>
+                  <a:schemeClr val="accent3"/>
+                </a:solidFill>
+              </a:endParaRPr>
+            </a:p>
+          </p:txBody>
+        </p:sp>
+        <p:sp>
+          <p:nvSpPr>
+            <p:cNvPr id="12" name="Connettore 11">
+              <a:extLst>
+                <a:ext uri="{FF2B5EF4-FFF2-40B4-BE49-F238E27FC236}">
+                  <a16:creationId xmlns:a16="http://schemas.microsoft.com/office/drawing/2014/main" id="{B19D2251-5362-D23A-8E56-0AA53D698658}"/>
+                </a:ext>
+              </a:extLst>
+            </p:cNvPr>
+            <p:cNvSpPr/>
+            <p:nvPr/>
+          </p:nvSpPr>
+          <p:spPr>
+            <a:xfrm>
+              <a:off x="979598" y="2120835"/>
+              <a:ext cx="1224000" cy="1224000"/>
+            </a:xfrm>
+            <a:prstGeom prst="flowChartConnector">
+              <a:avLst/>
+            </a:prstGeom>
+            <a:solidFill>
+              <a:srgbClr val="FFECCC"/>
+            </a:solidFill>
+            <a:ln>
+              <a:solidFill>
+                <a:srgbClr val="FEA919"/>
+              </a:solidFill>
+            </a:ln>
+          </p:spPr>
+          <p:style>
+            <a:lnRef idx="2">
+              <a:schemeClr val="accent1">
+                <a:shade val="15000"/>
+              </a:schemeClr>
+            </a:lnRef>
+            <a:fillRef idx="1">
+              <a:schemeClr val="accent1"/>
+            </a:fillRef>
+            <a:effectRef idx="0">
+              <a:schemeClr val="accent1"/>
+            </a:effectRef>
+            <a:fontRef idx="minor">
+              <a:schemeClr val="lt1"/>
+            </a:fontRef>
+          </p:style>
+          <p:txBody>
+            <a:bodyPr rtlCol="0" anchor="ctr"/>
+            <a:lstStyle/>
+            <a:p>
+              <a:pPr algn="ctr"/>
+              <a:endParaRPr lang="it-IT" dirty="0"/>
+            </a:p>
+          </p:txBody>
+        </p:sp>
+        <p:sp>
+          <p:nvSpPr>
+            <p:cNvPr id="21" name="Rettangolo 20">
+              <a:extLst>
+                <a:ext uri="{FF2B5EF4-FFF2-40B4-BE49-F238E27FC236}">
+                  <a16:creationId xmlns:a16="http://schemas.microsoft.com/office/drawing/2014/main" id="{8F1D2816-0892-3A84-2C9E-BEB7D3E77516}"/>
+                </a:ext>
+              </a:extLst>
+            </p:cNvPr>
+            <p:cNvSpPr/>
+            <p:nvPr/>
+          </p:nvSpPr>
+          <p:spPr>
+            <a:xfrm>
+              <a:off x="-8132" y="2427457"/>
+              <a:ext cx="864000" cy="576000"/>
+            </a:xfrm>
+            <a:prstGeom prst="rect">
+              <a:avLst/>
+            </a:prstGeom>
+            <a:solidFill>
+              <a:srgbClr val="FEA919"/>
+            </a:solidFill>
+            <a:ln>
+              <a:noFill/>
+            </a:ln>
+          </p:spPr>
+          <p:style>
+            <a:lnRef idx="2">
+              <a:schemeClr val="accent1">
+                <a:shade val="15000"/>
+              </a:schemeClr>
+            </a:lnRef>
+            <a:fillRef idx="1">
+              <a:schemeClr val="accent1"/>
+            </a:fillRef>
+            <a:effectRef idx="0">
+              <a:schemeClr val="accent1"/>
+            </a:effectRef>
+            <a:fontRef idx="minor">
+              <a:schemeClr val="lt1"/>
+            </a:fontRef>
+          </p:style>
+          <p:txBody>
+            <a:bodyPr rtlCol="0" anchor="ctr"/>
+            <a:lstStyle/>
+            <a:p>
+              <a:pPr algn="ctr"/>
+              <a:endParaRPr lang="it-IT"/>
+            </a:p>
+          </p:txBody>
+        </p:sp>
+        <p:pic>
+          <p:nvPicPr>
+            <p:cNvPr id="8" name="Immagine 7">
+              <a:extLst>
+                <a:ext uri="{FF2B5EF4-FFF2-40B4-BE49-F238E27FC236}">
+                  <a16:creationId xmlns:a16="http://schemas.microsoft.com/office/drawing/2014/main" id="{2AC12FC1-964D-5192-7678-E8D084397140}"/>
+                </a:ext>
+              </a:extLst>
+            </p:cNvPr>
+            <p:cNvPicPr>
+              <a:picLocks noChangeAspect="1"/>
+            </p:cNvPicPr>
+            <p:nvPr/>
+          </p:nvPicPr>
+          <p:blipFill>
+            <a:blip r:embed="rId5"/>
+            <a:srcRect/>
+            <a:stretch/>
+          </p:blipFill>
+          <p:spPr>
+            <a:xfrm>
+              <a:off x="1117664" y="2237681"/>
+              <a:ext cx="960914" cy="960914"/>
+            </a:xfrm>
+            <a:prstGeom prst="rect">
+              <a:avLst/>
+            </a:prstGeom>
+          </p:spPr>
+        </p:pic>
+      </p:grpSp>
+      <p:sp>
+        <p:nvSpPr>
+          <p:cNvPr id="16" name="Rettangolo 31">
+            <a:extLst>
+              <a:ext uri="{FF2B5EF4-FFF2-40B4-BE49-F238E27FC236}">
+                <a16:creationId xmlns:a16="http://schemas.microsoft.com/office/drawing/2014/main" id="{09E8D35F-AB85-4592-CC13-D37166CA3128}"/>
               </a:ext>
             </a:extLst>
           </p:cNvPr>
@@ -18535,19 +19186,17 @@
         </p:nvSpPr>
         <p:spPr>
           <a:xfrm>
-            <a:off x="745598" y="1886835"/>
-            <a:ext cx="1692000" cy="1692000"/>
-          </a:xfrm>
-          <a:prstGeom prst="flowChartConnector">
+            <a:off x="-8132" y="3637182"/>
+            <a:ext cx="570240" cy="380160"/>
+          </a:xfrm>
+          <a:prstGeom prst="rect">
             <a:avLst/>
           </a:prstGeom>
           <a:solidFill>
-            <a:srgbClr val="FEA919"/>
+            <a:srgbClr val="FC2834"/>
           </a:solidFill>
           <a:ln>
-            <a:solidFill>
-              <a:srgbClr val="FEA919"/>
-            </a:solidFill>
+            <a:noFill/>
           </a:ln>
         </p:spPr>
         <p:style>
@@ -18571,20 +19220,16 @@
           <a:lstStyle/>
           <a:p>
             <a:pPr algn="ctr"/>
-            <a:endParaRPr lang="it-IT" dirty="0">
-              <a:solidFill>
-                <a:schemeClr val="accent3"/>
-              </a:solidFill>
-            </a:endParaRPr>
-          </a:p>
-        </p:txBody>
-      </p:sp>
-      <p:sp>
-        <p:nvSpPr>
-          <p:cNvPr id="12" name="Connettore 11">
-            <a:extLst>
-              <a:ext uri="{FF2B5EF4-FFF2-40B4-BE49-F238E27FC236}">
-                <a16:creationId xmlns:a16="http://schemas.microsoft.com/office/drawing/2014/main" id="{B19D2251-5362-D23A-8E56-0AA53D698658}"/>
+            <a:endParaRPr lang="it-IT" dirty="0"/>
+          </a:p>
+        </p:txBody>
+      </p:sp>
+      <p:sp>
+        <p:nvSpPr>
+          <p:cNvPr id="18" name="Connettore 32">
+            <a:extLst>
+              <a:ext uri="{FF2B5EF4-FFF2-40B4-BE49-F238E27FC236}">
+                <a16:creationId xmlns:a16="http://schemas.microsoft.com/office/drawing/2014/main" id="{491136E0-57C0-B8E7-F6C7-3FC38FC16953}"/>
               </a:ext>
             </a:extLst>
           </p:cNvPr>
@@ -18593,18 +19238,18 @@
         </p:nvSpPr>
         <p:spPr>
           <a:xfrm>
-            <a:off x="979598" y="2120835"/>
-            <a:ext cx="1224000" cy="1224000"/>
+            <a:off x="483963" y="3278595"/>
+            <a:ext cx="1116720" cy="1116720"/>
           </a:xfrm>
           <a:prstGeom prst="flowChartConnector">
             <a:avLst/>
           </a:prstGeom>
           <a:solidFill>
-            <a:srgbClr val="FFECCC"/>
+            <a:srgbClr val="FC2834"/>
           </a:solidFill>
           <a:ln>
             <a:solidFill>
-              <a:srgbClr val="FEA919"/>
+              <a:srgbClr val="FC2834"/>
             </a:solidFill>
           </a:ln>
         </p:spPr>
@@ -18629,16 +19274,20 @@
           <a:lstStyle/>
           <a:p>
             <a:pPr algn="ctr"/>
-            <a:endParaRPr lang="it-IT" dirty="0"/>
-          </a:p>
-        </p:txBody>
-      </p:sp>
-      <p:sp>
-        <p:nvSpPr>
-          <p:cNvPr id="21" name="Rettangolo 20">
-            <a:extLst>
-              <a:ext uri="{FF2B5EF4-FFF2-40B4-BE49-F238E27FC236}">
-                <a16:creationId xmlns:a16="http://schemas.microsoft.com/office/drawing/2014/main" id="{8F1D2816-0892-3A84-2C9E-BEB7D3E77516}"/>
+            <a:endParaRPr lang="it-IT" dirty="0">
+              <a:solidFill>
+                <a:schemeClr val="accent3"/>
+              </a:solidFill>
+            </a:endParaRPr>
+          </a:p>
+        </p:txBody>
+      </p:sp>
+      <p:sp>
+        <p:nvSpPr>
+          <p:cNvPr id="20" name="Connettore 33">
+            <a:extLst>
+              <a:ext uri="{FF2B5EF4-FFF2-40B4-BE49-F238E27FC236}">
+                <a16:creationId xmlns:a16="http://schemas.microsoft.com/office/drawing/2014/main" id="{5BA1EF16-7301-CE51-893F-46BD1F61486B}"/>
               </a:ext>
             </a:extLst>
           </p:cNvPr>
@@ -18647,17 +19296,19 @@
         </p:nvSpPr>
         <p:spPr>
           <a:xfrm>
-            <a:off x="-8132" y="2427457"/>
-            <a:ext cx="864000" cy="576000"/>
-          </a:xfrm>
-          <a:prstGeom prst="rect">
+            <a:off x="638403" y="3433035"/>
+            <a:ext cx="807840" cy="807840"/>
+          </a:xfrm>
+          <a:prstGeom prst="flowChartConnector">
             <a:avLst/>
           </a:prstGeom>
           <a:solidFill>
-            <a:srgbClr val="FEA919"/>
+            <a:srgbClr val="FED4D6"/>
           </a:solidFill>
           <a:ln>
-            <a:noFill/>
+            <a:solidFill>
+              <a:srgbClr val="FED4D6"/>
+            </a:solidFill>
           </a:ln>
         </p:spPr>
         <p:style>
@@ -18681,180 +19332,16 @@
           <a:lstStyle/>
           <a:p>
             <a:pPr algn="ctr"/>
-            <a:endParaRPr lang="it-IT"/>
-          </a:p>
-        </p:txBody>
-      </p:sp>
-      <p:sp>
-        <p:nvSpPr>
-          <p:cNvPr id="33" name="Connettore 32">
-            <a:extLst>
-              <a:ext uri="{FF2B5EF4-FFF2-40B4-BE49-F238E27FC236}">
-                <a16:creationId xmlns:a16="http://schemas.microsoft.com/office/drawing/2014/main" id="{68D08AD9-62E1-831C-2789-0EB540DB7928}"/>
-              </a:ext>
-            </a:extLst>
-          </p:cNvPr>
-          <p:cNvSpPr/>
-          <p:nvPr/>
-        </p:nvSpPr>
-        <p:spPr>
-          <a:xfrm>
-            <a:off x="745598" y="3812835"/>
-            <a:ext cx="1692000" cy="1692000"/>
-          </a:xfrm>
-          <a:prstGeom prst="flowChartConnector">
-            <a:avLst/>
-          </a:prstGeom>
-          <a:solidFill>
-            <a:srgbClr val="29B76F"/>
-          </a:solidFill>
-          <a:ln>
-            <a:solidFill>
-              <a:srgbClr val="00AA59"/>
-            </a:solidFill>
-          </a:ln>
-        </p:spPr>
-        <p:style>
-          <a:lnRef idx="2">
-            <a:schemeClr val="accent1">
-              <a:shade val="15000"/>
-            </a:schemeClr>
-          </a:lnRef>
-          <a:fillRef idx="1">
-            <a:schemeClr val="accent1"/>
-          </a:fillRef>
-          <a:effectRef idx="0">
-            <a:schemeClr val="accent1"/>
-          </a:effectRef>
-          <a:fontRef idx="minor">
-            <a:schemeClr val="lt1"/>
-          </a:fontRef>
-        </p:style>
-        <p:txBody>
-          <a:bodyPr rtlCol="0" anchor="ctr"/>
-          <a:lstStyle/>
-          <a:p>
-            <a:pPr algn="ctr"/>
-            <a:endParaRPr lang="it-IT" dirty="0">
-              <a:solidFill>
-                <a:schemeClr val="accent3"/>
-              </a:solidFill>
-            </a:endParaRPr>
-          </a:p>
-        </p:txBody>
-      </p:sp>
-      <p:sp>
-        <p:nvSpPr>
-          <p:cNvPr id="34" name="Connettore 33">
-            <a:extLst>
-              <a:ext uri="{FF2B5EF4-FFF2-40B4-BE49-F238E27FC236}">
-                <a16:creationId xmlns:a16="http://schemas.microsoft.com/office/drawing/2014/main" id="{E9F3CEF6-B728-12DB-4D52-46FA36DDB086}"/>
-              </a:ext>
-            </a:extLst>
-          </p:cNvPr>
-          <p:cNvSpPr/>
-          <p:nvPr/>
-        </p:nvSpPr>
-        <p:spPr>
-          <a:xfrm>
-            <a:off x="979598" y="4046835"/>
-            <a:ext cx="1224000" cy="1224000"/>
-          </a:xfrm>
-          <a:prstGeom prst="flowChartConnector">
-            <a:avLst/>
-          </a:prstGeom>
-          <a:solidFill>
-            <a:srgbClr val="E5FFF2"/>
-          </a:solidFill>
-          <a:ln>
-            <a:solidFill>
-              <a:srgbClr val="00AA59"/>
-            </a:solidFill>
-          </a:ln>
-        </p:spPr>
-        <p:style>
-          <a:lnRef idx="2">
-            <a:schemeClr val="accent1">
-              <a:shade val="15000"/>
-            </a:schemeClr>
-          </a:lnRef>
-          <a:fillRef idx="1">
-            <a:schemeClr val="accent1"/>
-          </a:fillRef>
-          <a:effectRef idx="0">
-            <a:schemeClr val="accent1"/>
-          </a:effectRef>
-          <a:fontRef idx="minor">
-            <a:schemeClr val="lt1"/>
-          </a:fontRef>
-        </p:style>
-        <p:txBody>
-          <a:bodyPr rtlCol="0" anchor="ctr"/>
-          <a:lstStyle/>
-          <a:p>
-            <a:pPr algn="ctr"/>
-            <a:endParaRPr lang="it-IT" dirty="0"/>
-          </a:p>
-        </p:txBody>
-      </p:sp>
-      <p:sp>
-        <p:nvSpPr>
-          <p:cNvPr id="32" name="Rettangolo 31">
-            <a:extLst>
-              <a:ext uri="{FF2B5EF4-FFF2-40B4-BE49-F238E27FC236}">
-                <a16:creationId xmlns:a16="http://schemas.microsoft.com/office/drawing/2014/main" id="{32742B76-F70D-AEAB-188A-7993FE8F157D}"/>
-              </a:ext>
-            </a:extLst>
-          </p:cNvPr>
-          <p:cNvSpPr/>
-          <p:nvPr/>
-        </p:nvSpPr>
-        <p:spPr>
-          <a:xfrm>
-            <a:off x="0" y="4356148"/>
-            <a:ext cx="864000" cy="576000"/>
-          </a:xfrm>
-          <a:prstGeom prst="rect">
-            <a:avLst/>
-          </a:prstGeom>
-          <a:solidFill>
-            <a:srgbClr val="29B76F"/>
-          </a:solidFill>
-          <a:ln>
-            <a:noFill/>
-          </a:ln>
-        </p:spPr>
-        <p:style>
-          <a:lnRef idx="2">
-            <a:schemeClr val="accent1">
-              <a:shade val="15000"/>
-            </a:schemeClr>
-          </a:lnRef>
-          <a:fillRef idx="1">
-            <a:schemeClr val="accent1"/>
-          </a:fillRef>
-          <a:effectRef idx="0">
-            <a:schemeClr val="accent1"/>
-          </a:effectRef>
-          <a:fontRef idx="minor">
-            <a:schemeClr val="lt1"/>
-          </a:fontRef>
-        </p:style>
-        <p:txBody>
-          <a:bodyPr rtlCol="0" anchor="ctr"/>
-          <a:lstStyle/>
-          <a:p>
-            <a:pPr algn="ctr"/>
             <a:endParaRPr lang="it-IT" dirty="0"/>
           </a:p>
         </p:txBody>
       </p:sp>
       <p:pic>
         <p:nvPicPr>
-          <p:cNvPr id="10" name="Immagine 9">
-            <a:extLst>
-              <a:ext uri="{FF2B5EF4-FFF2-40B4-BE49-F238E27FC236}">
-                <a16:creationId xmlns:a16="http://schemas.microsoft.com/office/drawing/2014/main" id="{56E4F37F-152E-134D-ADEF-5A1609046051}"/>
+          <p:cNvPr id="22" name="Immagine 9">
+            <a:extLst>
+              <a:ext uri="{FF2B5EF4-FFF2-40B4-BE49-F238E27FC236}">
+                <a16:creationId xmlns:a16="http://schemas.microsoft.com/office/drawing/2014/main" id="{332B963E-F46A-AE22-63C9-A7372BDC3279}"/>
               </a:ext>
             </a:extLst>
           </p:cNvPr>
@@ -18864,49 +19351,270 @@
           <p:nvPr/>
         </p:nvPicPr>
         <p:blipFill>
-          <a:blip r:embed="rId3"/>
+          <a:blip r:embed="rId6"/>
           <a:srcRect/>
           <a:stretch/>
         </p:blipFill>
         <p:spPr>
           <a:xfrm>
-            <a:off x="1111140" y="4141171"/>
-            <a:ext cx="960915" cy="960915"/>
+            <a:off x="756972" y="3519993"/>
+            <a:ext cx="594461" cy="594461"/>
           </a:xfrm>
           <a:prstGeom prst="rect">
             <a:avLst/>
           </a:prstGeom>
         </p:spPr>
       </p:pic>
-      <p:pic>
-        <p:nvPicPr>
-          <p:cNvPr id="8" name="Immagine 7">
-            <a:extLst>
-              <a:ext uri="{FF2B5EF4-FFF2-40B4-BE49-F238E27FC236}">
-                <a16:creationId xmlns:a16="http://schemas.microsoft.com/office/drawing/2014/main" id="{2AC12FC1-964D-5192-7678-E8D084397140}"/>
-              </a:ext>
-            </a:extLst>
-          </p:cNvPr>
-          <p:cNvPicPr>
-            <a:picLocks noChangeAspect="1"/>
-          </p:cNvPicPr>
+      <p:sp>
+        <p:nvSpPr>
+          <p:cNvPr id="24" name="Segnaposto testo 27">
+            <a:extLst>
+              <a:ext uri="{FF2B5EF4-FFF2-40B4-BE49-F238E27FC236}">
+                <a16:creationId xmlns:a16="http://schemas.microsoft.com/office/drawing/2014/main" id="{D95FEB36-25DC-5C3D-1F77-24BA9470E370}"/>
+              </a:ext>
+            </a:extLst>
+          </p:cNvPr>
+          <p:cNvSpPr txBox="1">
+            <a:spLocks/>
+          </p:cNvSpPr>
           <p:nvPr/>
-        </p:nvPicPr>
-        <p:blipFill>
-          <a:blip r:embed="rId4"/>
-          <a:srcRect/>
-          <a:stretch/>
-        </p:blipFill>
+        </p:nvSpPr>
         <p:spPr>
           <a:xfrm>
-            <a:off x="1117664" y="2237681"/>
-            <a:ext cx="960914" cy="960914"/>
+            <a:off x="1651903" y="3222035"/>
+            <a:ext cx="3077611" cy="432000"/>
           </a:xfrm>
           <a:prstGeom prst="rect">
             <a:avLst/>
           </a:prstGeom>
         </p:spPr>
-      </p:pic>
+        <p:txBody>
+          <a:bodyPr vert="horz" lIns="91440" tIns="45720" rIns="91440" bIns="45720" rtlCol="0" anchor="ctr">
+            <a:noAutofit/>
+          </a:bodyPr>
+          <a:lstStyle>
+            <a:defPPr>
+              <a:defRPr lang="it-IT"/>
+            </a:defPPr>
+            <a:lvl1pPr marL="283464" indent="-283464" algn="l" defTabSz="914400" rtl="0" eaLnBrk="1" latinLnBrk="0" hangingPunct="1">
+              <a:lnSpc>
+                <a:spcPct val="100000"/>
+              </a:lnSpc>
+              <a:spcBef>
+                <a:spcPts val="0"/>
+              </a:spcBef>
+              <a:buFont typeface="Arial" panose="020B0604020202020204" pitchFamily="34" charset="0"/>
+              <a:buChar char="•"/>
+              <a:defRPr lang="it-IT" sz="2800" kern="1200">
+                <a:solidFill>
+                  <a:schemeClr val="tx1"/>
+                </a:solidFill>
+                <a:latin typeface="+mn-lt"/>
+                <a:ea typeface="+mn-ea"/>
+                <a:cs typeface="+mn-cs"/>
+              </a:defRPr>
+            </a:lvl1pPr>
+            <a:lvl2pPr marL="566928" indent="-283464" algn="l" defTabSz="914400" rtl="0" eaLnBrk="1" latinLnBrk="0" hangingPunct="1">
+              <a:lnSpc>
+                <a:spcPct val="90000"/>
+              </a:lnSpc>
+              <a:spcBef>
+                <a:spcPts val="500"/>
+              </a:spcBef>
+              <a:buFont typeface="Arial" panose="020B0604020202020204" pitchFamily="34" charset="0"/>
+              <a:buChar char="•"/>
+              <a:defRPr lang="it-IT" sz="2400" kern="1200">
+                <a:solidFill>
+                  <a:schemeClr val="tx1"/>
+                </a:solidFill>
+                <a:latin typeface="+mn-lt"/>
+                <a:ea typeface="+mn-ea"/>
+                <a:cs typeface="+mn-cs"/>
+              </a:defRPr>
+            </a:lvl2pPr>
+            <a:lvl3pPr marL="1143000" indent="-283464" algn="l" defTabSz="914400" rtl="0" eaLnBrk="1" latinLnBrk="0" hangingPunct="1">
+              <a:lnSpc>
+                <a:spcPct val="90000"/>
+              </a:lnSpc>
+              <a:spcBef>
+                <a:spcPts val="500"/>
+              </a:spcBef>
+              <a:buFont typeface="Arial" panose="020B0604020202020204" pitchFamily="34" charset="0"/>
+              <a:buChar char="•"/>
+              <a:defRPr lang="it-IT" sz="2000" kern="1200">
+                <a:solidFill>
+                  <a:schemeClr val="tx1"/>
+                </a:solidFill>
+                <a:latin typeface="+mn-lt"/>
+                <a:ea typeface="+mn-ea"/>
+                <a:cs typeface="+mn-cs"/>
+              </a:defRPr>
+            </a:lvl3pPr>
+            <a:lvl4pPr marL="1600200" indent="-283464" algn="l" defTabSz="914400" rtl="0" eaLnBrk="1" latinLnBrk="0" hangingPunct="1">
+              <a:lnSpc>
+                <a:spcPct val="90000"/>
+              </a:lnSpc>
+              <a:spcBef>
+                <a:spcPts val="500"/>
+              </a:spcBef>
+              <a:buFont typeface="Arial" panose="020B0604020202020204" pitchFamily="34" charset="0"/>
+              <a:buChar char="•"/>
+              <a:defRPr lang="it-IT" sz="1800" kern="1200">
+                <a:solidFill>
+                  <a:schemeClr val="tx1"/>
+                </a:solidFill>
+                <a:latin typeface="+mn-lt"/>
+                <a:ea typeface="+mn-ea"/>
+                <a:cs typeface="+mn-cs"/>
+              </a:defRPr>
+            </a:lvl4pPr>
+            <a:lvl5pPr marL="2057400" indent="-283464" algn="l" defTabSz="914400" rtl="0" eaLnBrk="1" latinLnBrk="0" hangingPunct="1">
+              <a:lnSpc>
+                <a:spcPct val="90000"/>
+              </a:lnSpc>
+              <a:spcBef>
+                <a:spcPts val="500"/>
+              </a:spcBef>
+              <a:buFont typeface="Arial" panose="020B0604020202020204" pitchFamily="34" charset="0"/>
+              <a:buChar char="•"/>
+              <a:defRPr lang="it-IT" sz="1800" kern="1200">
+                <a:solidFill>
+                  <a:schemeClr val="tx1"/>
+                </a:solidFill>
+                <a:latin typeface="+mn-lt"/>
+                <a:ea typeface="+mn-ea"/>
+                <a:cs typeface="+mn-cs"/>
+              </a:defRPr>
+            </a:lvl5pPr>
+            <a:lvl6pPr marL="2514600" indent="-228600" algn="l" defTabSz="914400" rtl="0" eaLnBrk="1" latinLnBrk="0" hangingPunct="1">
+              <a:lnSpc>
+                <a:spcPct val="90000"/>
+              </a:lnSpc>
+              <a:spcBef>
+                <a:spcPts val="500"/>
+              </a:spcBef>
+              <a:buFont typeface="Arial" panose="020B0604020202020204" pitchFamily="34" charset="0"/>
+              <a:buChar char="•"/>
+              <a:defRPr lang="it-IT" sz="1800" kern="1200">
+                <a:solidFill>
+                  <a:schemeClr val="tx1"/>
+                </a:solidFill>
+                <a:latin typeface="+mn-lt"/>
+                <a:ea typeface="+mn-ea"/>
+                <a:cs typeface="+mn-cs"/>
+              </a:defRPr>
+            </a:lvl6pPr>
+            <a:lvl7pPr marL="2971800" indent="-228600" algn="l" defTabSz="914400" rtl="0" eaLnBrk="1" latinLnBrk="0" hangingPunct="1">
+              <a:lnSpc>
+                <a:spcPct val="90000"/>
+              </a:lnSpc>
+              <a:spcBef>
+                <a:spcPts val="500"/>
+              </a:spcBef>
+              <a:buFont typeface="Arial" panose="020B0604020202020204" pitchFamily="34" charset="0"/>
+              <a:buChar char="•"/>
+              <a:defRPr lang="it-IT" sz="1800" kern="1200">
+                <a:solidFill>
+                  <a:schemeClr val="tx1"/>
+                </a:solidFill>
+                <a:latin typeface="+mn-lt"/>
+                <a:ea typeface="+mn-ea"/>
+                <a:cs typeface="+mn-cs"/>
+              </a:defRPr>
+            </a:lvl7pPr>
+            <a:lvl8pPr marL="3429000" indent="-228600" algn="l" defTabSz="914400" rtl="0" eaLnBrk="1" latinLnBrk="0" hangingPunct="1">
+              <a:lnSpc>
+                <a:spcPct val="90000"/>
+              </a:lnSpc>
+              <a:spcBef>
+                <a:spcPts val="500"/>
+              </a:spcBef>
+              <a:buFont typeface="Arial" panose="020B0604020202020204" pitchFamily="34" charset="0"/>
+              <a:buChar char="•"/>
+              <a:defRPr lang="it-IT" sz="1800" kern="1200">
+                <a:solidFill>
+                  <a:schemeClr val="tx1"/>
+                </a:solidFill>
+                <a:latin typeface="+mn-lt"/>
+                <a:ea typeface="+mn-ea"/>
+                <a:cs typeface="+mn-cs"/>
+              </a:defRPr>
+            </a:lvl8pPr>
+            <a:lvl9pPr marL="3886200" indent="-228600" algn="l" defTabSz="914400" rtl="0" eaLnBrk="1" latinLnBrk="0" hangingPunct="1">
+              <a:lnSpc>
+                <a:spcPct val="90000"/>
+              </a:lnSpc>
+              <a:spcBef>
+                <a:spcPts val="500"/>
+              </a:spcBef>
+              <a:buFont typeface="Arial" panose="020B0604020202020204" pitchFamily="34" charset="0"/>
+              <a:buChar char="•"/>
+              <a:defRPr lang="it-IT" sz="1800" kern="1200">
+                <a:solidFill>
+                  <a:schemeClr val="tx1"/>
+                </a:solidFill>
+                <a:latin typeface="+mn-lt"/>
+                <a:ea typeface="+mn-ea"/>
+                <a:cs typeface="+mn-cs"/>
+              </a:defRPr>
+            </a:lvl9pPr>
+          </a:lstStyle>
+          <a:p>
+            <a:pPr marL="0" indent="0">
+              <a:lnSpc>
+                <a:spcPct val="120000"/>
+              </a:lnSpc>
+              <a:buFont typeface="Arial" panose="020B0604020202020204" pitchFamily="34" charset="0"/>
+              <a:buNone/>
+            </a:pPr>
+            <a:r>
+              <a:rPr lang="en-US" sz="2000" dirty="0"/>
+              <a:t>CIRCOSCRIZIONI</a:t>
+            </a:r>
+          </a:p>
+        </p:txBody>
+      </p:sp>
+      <p:sp>
+        <p:nvSpPr>
+          <p:cNvPr id="25" name="CasellaDiTesto 54">
+            <a:extLst>
+              <a:ext uri="{FF2B5EF4-FFF2-40B4-BE49-F238E27FC236}">
+                <a16:creationId xmlns:a16="http://schemas.microsoft.com/office/drawing/2014/main" id="{910AFDE6-AC48-CC12-253B-BF2CFE2AEC26}"/>
+              </a:ext>
+            </a:extLst>
+          </p:cNvPr>
+          <p:cNvSpPr txBox="1"/>
+          <p:nvPr/>
+        </p:nvSpPr>
+        <p:spPr>
+          <a:xfrm>
+            <a:off x="1718125" y="3676559"/>
+            <a:ext cx="5315135" cy="369332"/>
+          </a:xfrm>
+          <a:prstGeom prst="rect">
+            <a:avLst/>
+          </a:prstGeom>
+          <a:noFill/>
+        </p:spPr>
+        <p:txBody>
+          <a:bodyPr wrap="square" rtlCol="0" anchor="ctr">
+            <a:spAutoFit/>
+          </a:bodyPr>
+          <a:lstStyle/>
+          <a:p>
+            <a:pPr marL="285750" indent="-285750">
+              <a:buSzPct val="100000"/>
+              <a:buBlip>
+                <a:blip r:embed="rId3"/>
+              </a:buBlip>
+            </a:pPr>
+            <a:r>
+              <a:rPr lang="it-IT" dirty="0"/>
+              <a:t>Difficile comunicazione con il comune</a:t>
+            </a:r>
+          </a:p>
+        </p:txBody>
+      </p:sp>
     </p:spTree>
     <p:extLst>
       <p:ext uri="{BB962C8B-B14F-4D97-AF65-F5344CB8AC3E}">
@@ -18939,10 +19647,10 @@
       </p:grpSpPr>
       <p:sp>
         <p:nvSpPr>
-          <p:cNvPr id="38" name="Parallelogramma 37">
-            <a:extLst>
-              <a:ext uri="{FF2B5EF4-FFF2-40B4-BE49-F238E27FC236}">
-                <a16:creationId xmlns:a16="http://schemas.microsoft.com/office/drawing/2014/main" id="{30B0C977-06B4-3346-27B3-D7FC4BE03371}"/>
+          <p:cNvPr id="20" name="Rettangolo 19">
+            <a:extLst>
+              <a:ext uri="{FF2B5EF4-FFF2-40B4-BE49-F238E27FC236}">
+                <a16:creationId xmlns:a16="http://schemas.microsoft.com/office/drawing/2014/main" id="{866E4E3A-A119-DB4C-9154-1FACCC46103C}"/>
               </a:ext>
             </a:extLst>
           </p:cNvPr>
@@ -18950,15 +19658,16 @@
           <p:nvPr/>
         </p:nvSpPr>
         <p:spPr>
-          <a:xfrm rot="10800000" flipH="1" flipV="1">
-            <a:off x="8209146" y="1518285"/>
-            <a:ext cx="1982838" cy="563487"/>
-          </a:xfrm>
-          <a:prstGeom prst="parallelogram">
-            <a:avLst>
-              <a:gd name="adj" fmla="val 172833"/>
-            </a:avLst>
+          <a:xfrm rot="3589587">
+            <a:off x="4824673" y="-673050"/>
+            <a:ext cx="504000" cy="9746275"/>
+          </a:xfrm>
+          <a:prstGeom prst="rect">
+            <a:avLst/>
           </a:prstGeom>
+          <a:solidFill>
+            <a:srgbClr val="FEAF26"/>
+          </a:solidFill>
           <a:ln>
             <a:noFill/>
           </a:ln>
@@ -18984,16 +19693,16 @@
           <a:lstStyle/>
           <a:p>
             <a:pPr algn="ctr"/>
-            <a:endParaRPr lang="it-IT"/>
-          </a:p>
-        </p:txBody>
-      </p:sp>
-      <p:sp>
-        <p:nvSpPr>
-          <p:cNvPr id="20" name="Rettangolo 19">
-            <a:extLst>
-              <a:ext uri="{FF2B5EF4-FFF2-40B4-BE49-F238E27FC236}">
-                <a16:creationId xmlns:a16="http://schemas.microsoft.com/office/drawing/2014/main" id="{866E4E3A-A119-DB4C-9154-1FACCC46103C}"/>
+            <a:endParaRPr lang="it-IT" dirty="0"/>
+          </a:p>
+        </p:txBody>
+      </p:sp>
+      <p:sp>
+        <p:nvSpPr>
+          <p:cNvPr id="38" name="Parallelogramma 37">
+            <a:extLst>
+              <a:ext uri="{FF2B5EF4-FFF2-40B4-BE49-F238E27FC236}">
+                <a16:creationId xmlns:a16="http://schemas.microsoft.com/office/drawing/2014/main" id="{30B0C977-06B4-3346-27B3-D7FC4BE03371}"/>
               </a:ext>
             </a:extLst>
           </p:cNvPr>
@@ -19001,15 +19710,17 @@
           <p:nvPr/>
         </p:nvSpPr>
         <p:spPr>
-          <a:xfrm rot="3589587">
-            <a:off x="4824673" y="-673050"/>
-            <a:ext cx="504000" cy="9746275"/>
-          </a:xfrm>
-          <a:prstGeom prst="rect">
-            <a:avLst/>
+          <a:xfrm rot="10800000" flipH="1" flipV="1">
+            <a:off x="8209146" y="1518285"/>
+            <a:ext cx="1982838" cy="563487"/>
+          </a:xfrm>
+          <a:prstGeom prst="parallelogram">
+            <a:avLst>
+              <a:gd name="adj" fmla="val 172833"/>
+            </a:avLst>
           </a:prstGeom>
           <a:solidFill>
-            <a:srgbClr val="FC2834"/>
+            <a:srgbClr val="FEAF26"/>
           </a:solidFill>
           <a:ln>
             <a:noFill/>
@@ -19036,7 +19747,7 @@
           <a:lstStyle/>
           <a:p>
             <a:pPr algn="ctr"/>
-            <a:endParaRPr lang="it-IT" dirty="0"/>
+            <a:endParaRPr lang="it-IT"/>
           </a:p>
         </p:txBody>
       </p:sp>
@@ -19092,7 +19803,7 @@
         </p:nvSpPr>
         <p:spPr>
           <a:solidFill>
-            <a:srgbClr val="FC2834"/>
+            <a:schemeClr val="tx1"/>
           </a:solidFill>
         </p:spPr>
         <p:txBody>
@@ -19168,7 +19879,7 @@
             <p:nvPr/>
           </p:nvPicPr>
           <p:blipFill>
-            <a:blip r:embed="rId2"/>
+            <a:blip r:embed="rId3"/>
             <a:stretch>
               <a:fillRect/>
             </a:stretch>
@@ -19280,7 +19991,7 @@
             </p:nvSpPr>
             <p:spPr>
               <a:xfrm flipH="1">
-                <a:off x="3100419" y="1793774"/>
+                <a:off x="3108039" y="1793774"/>
                 <a:ext cx="126000" cy="126000"/>
               </a:xfrm>
               <a:prstGeom prst="flowChartConnector">
@@ -19540,7 +20251,7 @@
             </p:nvSpPr>
             <p:spPr>
               <a:xfrm flipH="1">
-                <a:off x="3101251" y="1784774"/>
+                <a:off x="3108871" y="1784774"/>
                 <a:ext cx="126000" cy="126000"/>
               </a:xfrm>
               <a:prstGeom prst="flowChartConnector">
@@ -19670,7 +20381,7 @@
             </p:nvSpPr>
             <p:spPr>
               <a:xfrm flipH="1">
-                <a:off x="3101251" y="1784774"/>
+                <a:off x="3112046" y="1784774"/>
                 <a:ext cx="126000" cy="126000"/>
               </a:xfrm>
               <a:prstGeom prst="flowChartConnector">
@@ -20343,6 +21054,9 @@
             <a:chOff x="5016000" y="3300184"/>
             <a:chExt cx="1080000" cy="1080000"/>
           </a:xfrm>
+          <a:solidFill>
+            <a:srgbClr val="4071AA"/>
+          </a:solidFill>
         </p:grpSpPr>
         <p:grpSp>
           <p:nvGrpSpPr>
@@ -20363,6 +21077,7 @@
               <a:chOff x="6491320" y="1570513"/>
               <a:chExt cx="1692000" cy="1692000"/>
             </a:xfrm>
+            <a:grpFill/>
           </p:grpSpPr>
           <p:sp>
             <p:nvSpPr>
@@ -20384,9 +21099,7 @@
               <a:prstGeom prst="flowChartConnector">
                 <a:avLst/>
               </a:prstGeom>
-              <a:solidFill>
-                <a:srgbClr val="FC2834"/>
-              </a:solidFill>
+              <a:grpFill/>
               <a:ln>
                 <a:noFill/>
               </a:ln>
@@ -20441,7 +21154,7 @@
                 <a:avLst/>
               </a:prstGeom>
               <a:solidFill>
-                <a:srgbClr val="FED4D6"/>
+                <a:srgbClr val="D9EEF4"/>
               </a:solidFill>
               <a:ln>
                 <a:noFill/>
@@ -20488,7 +21201,7 @@
             <p:nvPr/>
           </p:nvPicPr>
           <p:blipFill>
-            <a:blip r:embed="rId3"/>
+            <a:blip r:embed="rId4"/>
             <a:srcRect/>
             <a:stretch/>
           </p:blipFill>
@@ -20500,6 +21213,7 @@
             <a:prstGeom prst="rect">
               <a:avLst/>
             </a:prstGeom>
+            <a:noFill/>
           </p:spPr>
         </p:pic>
       </p:grpSp>
@@ -20525,6 +21239,9 @@
               <a:gd name="adj" fmla="val 75773"/>
             </a:avLst>
           </a:prstGeom>
+          <a:solidFill>
+            <a:srgbClr val="FEAF26"/>
+          </a:solidFill>
           <a:ln>
             <a:noFill/>
           </a:ln>
@@ -20574,6 +21291,9 @@
           <a:prstGeom prst="rect">
             <a:avLst/>
           </a:prstGeom>
+          <a:solidFill>
+            <a:srgbClr val="FEAF26"/>
+          </a:solidFill>
           <a:ln>
             <a:noFill/>
           </a:ln>
@@ -20625,6 +21345,9 @@
               <a:gd name="adj" fmla="val 100000"/>
             </a:avLst>
           </a:prstGeom>
+          <a:solidFill>
+            <a:srgbClr val="FEAF26"/>
+          </a:solidFill>
           <a:ln>
             <a:noFill/>
           </a:ln>
@@ -20676,6 +21399,9 @@
               <a:gd name="adj" fmla="val 100000"/>
             </a:avLst>
           </a:prstGeom>
+          <a:solidFill>
+            <a:srgbClr val="FEAF26"/>
+          </a:solidFill>
           <a:ln>
             <a:noFill/>
           </a:ln>
@@ -20724,6 +21450,9 @@
             <a:chOff x="2122819" y="4968756"/>
             <a:chExt cx="1080000" cy="1080000"/>
           </a:xfrm>
+          <a:solidFill>
+            <a:srgbClr val="4071AA"/>
+          </a:solidFill>
         </p:grpSpPr>
         <p:grpSp>
           <p:nvGrpSpPr>
@@ -20744,6 +21473,7 @@
               <a:chOff x="6491320" y="1570513"/>
               <a:chExt cx="1692000" cy="1692000"/>
             </a:xfrm>
+            <a:grpFill/>
           </p:grpSpPr>
           <p:sp>
             <p:nvSpPr>
@@ -20765,9 +21495,7 @@
               <a:prstGeom prst="flowChartConnector">
                 <a:avLst/>
               </a:prstGeom>
-              <a:solidFill>
-                <a:srgbClr val="FC2834"/>
-              </a:solidFill>
+              <a:grpFill/>
               <a:ln>
                 <a:noFill/>
               </a:ln>
@@ -20822,7 +21550,7 @@
                 <a:avLst/>
               </a:prstGeom>
               <a:solidFill>
-                <a:srgbClr val="FED4D6"/>
+                <a:srgbClr val="D9EEF4"/>
               </a:solidFill>
               <a:ln>
                 <a:noFill/>
@@ -20869,7 +21597,7 @@
             <p:nvPr/>
           </p:nvPicPr>
           <p:blipFill>
-            <a:blip r:embed="rId4"/>
+            <a:blip r:embed="rId5"/>
             <a:srcRect/>
             <a:stretch/>
           </p:blipFill>
@@ -20881,185 +21609,7 @@
             <a:prstGeom prst="rect">
               <a:avLst/>
             </a:prstGeom>
-          </p:spPr>
-        </p:pic>
-      </p:grpSp>
-      <p:grpSp>
-        <p:nvGrpSpPr>
-          <p:cNvPr id="24" name="Gruppo 23">
-            <a:extLst>
-              <a:ext uri="{FF2B5EF4-FFF2-40B4-BE49-F238E27FC236}">
-                <a16:creationId xmlns:a16="http://schemas.microsoft.com/office/drawing/2014/main" id="{9D13D269-FA46-5A93-0B7F-D1AF7C5C4D04}"/>
-              </a:ext>
-            </a:extLst>
-          </p:cNvPr>
-          <p:cNvGrpSpPr/>
-          <p:nvPr/>
-        </p:nvGrpSpPr>
-        <p:grpSpPr>
-          <a:xfrm>
-            <a:off x="2120855" y="4968756"/>
-            <a:ext cx="1080000" cy="1080000"/>
-            <a:chOff x="7652769" y="1804095"/>
-            <a:chExt cx="1080000" cy="1080000"/>
-          </a:xfrm>
-        </p:grpSpPr>
-        <p:grpSp>
-          <p:nvGrpSpPr>
-            <p:cNvPr id="25" name="Gruppo 24">
-              <a:extLst>
-                <a:ext uri="{FF2B5EF4-FFF2-40B4-BE49-F238E27FC236}">
-                  <a16:creationId xmlns:a16="http://schemas.microsoft.com/office/drawing/2014/main" id="{EB52154E-3971-ED47-82F8-64032E1CBF28}"/>
-                </a:ext>
-              </a:extLst>
-            </p:cNvPr>
-            <p:cNvGrpSpPr/>
-            <p:nvPr/>
-          </p:nvGrpSpPr>
-          <p:grpSpPr>
-            <a:xfrm>
-              <a:off x="7652769" y="1804095"/>
-              <a:ext cx="1080000" cy="1080000"/>
-              <a:chOff x="6491320" y="1570513"/>
-              <a:chExt cx="1692000" cy="1692000"/>
-            </a:xfrm>
-          </p:grpSpPr>
-          <p:sp>
-            <p:nvSpPr>
-              <p:cNvPr id="28" name="Connettore 27">
-                <a:extLst>
-                  <a:ext uri="{FF2B5EF4-FFF2-40B4-BE49-F238E27FC236}">
-                    <a16:creationId xmlns:a16="http://schemas.microsoft.com/office/drawing/2014/main" id="{D801C728-5596-4F6B-4CEB-72EF37DCCED7}"/>
-                  </a:ext>
-                </a:extLst>
-              </p:cNvPr>
-              <p:cNvSpPr/>
-              <p:nvPr/>
-            </p:nvSpPr>
-            <p:spPr>
-              <a:xfrm>
-                <a:off x="6491320" y="1570513"/>
-                <a:ext cx="1692000" cy="1692000"/>
-              </a:xfrm>
-              <a:prstGeom prst="flowChartConnector">
-                <a:avLst/>
-              </a:prstGeom>
-              <a:solidFill>
-                <a:srgbClr val="FC2834"/>
-              </a:solidFill>
-              <a:ln>
-                <a:noFill/>
-              </a:ln>
-            </p:spPr>
-            <p:style>
-              <a:lnRef idx="2">
-                <a:schemeClr val="accent1">
-                  <a:shade val="15000"/>
-                </a:schemeClr>
-              </a:lnRef>
-              <a:fillRef idx="1">
-                <a:schemeClr val="accent1"/>
-              </a:fillRef>
-              <a:effectRef idx="0">
-                <a:schemeClr val="accent1"/>
-              </a:effectRef>
-              <a:fontRef idx="minor">
-                <a:schemeClr val="lt1"/>
-              </a:fontRef>
-            </p:style>
-            <p:txBody>
-              <a:bodyPr rtlCol="0" anchor="ctr"/>
-              <a:lstStyle/>
-              <a:p>
-                <a:pPr algn="ctr"/>
-                <a:endParaRPr lang="it-IT" dirty="0">
-                  <a:solidFill>
-                    <a:schemeClr val="accent3"/>
-                  </a:solidFill>
-                </a:endParaRPr>
-              </a:p>
-            </p:txBody>
-          </p:sp>
-          <p:sp>
-            <p:nvSpPr>
-              <p:cNvPr id="29" name="Connettore 28">
-                <a:extLst>
-                  <a:ext uri="{FF2B5EF4-FFF2-40B4-BE49-F238E27FC236}">
-                    <a16:creationId xmlns:a16="http://schemas.microsoft.com/office/drawing/2014/main" id="{1489E4F5-18F8-D431-7F6E-6280736E65A5}"/>
-                  </a:ext>
-                </a:extLst>
-              </p:cNvPr>
-              <p:cNvSpPr/>
-              <p:nvPr/>
-            </p:nvSpPr>
-            <p:spPr>
-              <a:xfrm>
-                <a:off x="6709461" y="1804513"/>
-                <a:ext cx="1224000" cy="1224000"/>
-              </a:xfrm>
-              <a:prstGeom prst="flowChartConnector">
-                <a:avLst/>
-              </a:prstGeom>
-              <a:solidFill>
-                <a:srgbClr val="FED4D6"/>
-              </a:solidFill>
-              <a:ln>
-                <a:noFill/>
-              </a:ln>
-            </p:spPr>
-            <p:style>
-              <a:lnRef idx="2">
-                <a:schemeClr val="accent1">
-                  <a:shade val="15000"/>
-                </a:schemeClr>
-              </a:lnRef>
-              <a:fillRef idx="1">
-                <a:schemeClr val="accent1"/>
-              </a:fillRef>
-              <a:effectRef idx="0">
-                <a:schemeClr val="accent1"/>
-              </a:effectRef>
-              <a:fontRef idx="minor">
-                <a:schemeClr val="lt1"/>
-              </a:fontRef>
-            </p:style>
-            <p:txBody>
-              <a:bodyPr rtlCol="0" anchor="ctr"/>
-              <a:lstStyle/>
-              <a:p>
-                <a:pPr algn="ctr"/>
-                <a:endParaRPr lang="it-IT" dirty="0"/>
-              </a:p>
-            </p:txBody>
-          </p:sp>
-        </p:grpSp>
-        <p:pic>
-          <p:nvPicPr>
-            <p:cNvPr id="26" name="Immagine 25">
-              <a:extLst>
-                <a:ext uri="{FF2B5EF4-FFF2-40B4-BE49-F238E27FC236}">
-                  <a16:creationId xmlns:a16="http://schemas.microsoft.com/office/drawing/2014/main" id="{0DAF0B84-35F0-D701-8B36-552C418D09E3}"/>
-                </a:ext>
-              </a:extLst>
-            </p:cNvPr>
-            <p:cNvPicPr>
-              <a:picLocks noChangeAspect="1"/>
-            </p:cNvPicPr>
-            <p:nvPr/>
-          </p:nvPicPr>
-          <p:blipFill>
-            <a:blip r:embed="rId5"/>
-            <a:srcRect/>
-            <a:stretch/>
-          </p:blipFill>
-          <p:spPr>
-            <a:xfrm>
-              <a:off x="7890258" y="2028039"/>
-              <a:ext cx="613349" cy="613349"/>
-            </a:xfrm>
-            <a:prstGeom prst="rect">
-              <a:avLst/>
-            </a:prstGeom>
+            <a:noFill/>
           </p:spPr>
         </p:pic>
       </p:grpSp>
@@ -21330,6 +21880,9 @@
                   </a:path>
                 </a:pathLst>
               </a:custGeom>
+              <a:solidFill>
+                <a:srgbClr val="FEB636"/>
+              </a:solidFill>
               <a:ln>
                 <a:noFill/>
               </a:ln>
@@ -21355,7 +21908,7 @@
               <a:lstStyle/>
               <a:p>
                 <a:pPr algn="ctr"/>
-                <a:endParaRPr lang="it-IT"/>
+                <a:endParaRPr lang="it-IT" dirty="0"/>
               </a:p>
             </p:txBody>
           </p:sp>
@@ -21618,7 +22171,7 @@
               <a:avLst/>
             </a:prstGeom>
             <a:solidFill>
-              <a:srgbClr val="FEAF26">
+              <a:srgbClr val="4071AA">
                 <a:alpha val="94000"/>
               </a:srgbClr>
             </a:solidFill>
@@ -21647,7 +22200,7 @@
             <a:lstStyle/>
             <a:p>
               <a:pPr algn="ctr"/>
-              <a:endParaRPr lang="it-IT"/>
+              <a:endParaRPr lang="it-IT" dirty="0"/>
             </a:p>
           </p:txBody>
         </p:sp>
@@ -21706,6 +22259,9 @@
             <a:chOff x="-4466" y="-10160"/>
             <a:chExt cx="935186" cy="2520713"/>
           </a:xfrm>
+          <a:solidFill>
+            <a:srgbClr val="FEAF26"/>
+          </a:solidFill>
         </p:grpSpPr>
         <p:sp>
           <p:nvSpPr>
@@ -21727,6 +22283,7 @@
             <a:prstGeom prst="rect">
               <a:avLst/>
             </a:prstGeom>
+            <a:grpFill/>
             <a:ln>
               <a:noFill/>
             </a:ln>
@@ -21776,6 +22333,7 @@
             <a:prstGeom prst="rect">
               <a:avLst/>
             </a:prstGeom>
+            <a:grpFill/>
             <a:ln>
               <a:noFill/>
             </a:ln>
@@ -22052,6 +22610,7 @@
                 </a:path>
               </a:pathLst>
             </a:custGeom>
+            <a:grpFill/>
             <a:ln>
               <a:noFill/>
             </a:ln>
@@ -22086,6 +22645,187 @@
           </p:txBody>
         </p:sp>
       </p:grpSp>
+      <p:grpSp>
+        <p:nvGrpSpPr>
+          <p:cNvPr id="47" name="Group 46">
+            <a:extLst>
+              <a:ext uri="{FF2B5EF4-FFF2-40B4-BE49-F238E27FC236}">
+                <a16:creationId xmlns:a16="http://schemas.microsoft.com/office/drawing/2014/main" id="{2E1DBE3C-39F2-3684-57A5-F954BED81839}"/>
+              </a:ext>
+            </a:extLst>
+          </p:cNvPr>
+          <p:cNvGrpSpPr/>
+          <p:nvPr/>
+        </p:nvGrpSpPr>
+        <p:grpSpPr>
+          <a:xfrm>
+            <a:off x="2138964" y="4989854"/>
+            <a:ext cx="1080000" cy="1080000"/>
+            <a:chOff x="2138964" y="4989854"/>
+            <a:chExt cx="1080000" cy="1080000"/>
+          </a:xfrm>
+        </p:grpSpPr>
+        <p:grpSp>
+          <p:nvGrpSpPr>
+            <p:cNvPr id="23" name="Gruppo 42">
+              <a:extLst>
+                <a:ext uri="{FF2B5EF4-FFF2-40B4-BE49-F238E27FC236}">
+                  <a16:creationId xmlns:a16="http://schemas.microsoft.com/office/drawing/2014/main" id="{9D865E3D-919D-E855-5F5D-BB8FB361B7B1}"/>
+                </a:ext>
+              </a:extLst>
+            </p:cNvPr>
+            <p:cNvGrpSpPr/>
+            <p:nvPr/>
+          </p:nvGrpSpPr>
+          <p:grpSpPr>
+            <a:xfrm>
+              <a:off x="2138964" y="4989854"/>
+              <a:ext cx="1080000" cy="1080000"/>
+              <a:chOff x="6491320" y="1570513"/>
+              <a:chExt cx="1692000" cy="1692000"/>
+            </a:xfrm>
+            <a:solidFill>
+              <a:srgbClr val="4071AA"/>
+            </a:solidFill>
+          </p:grpSpPr>
+          <p:sp>
+            <p:nvSpPr>
+              <p:cNvPr id="36" name="Connettore 44">
+                <a:extLst>
+                  <a:ext uri="{FF2B5EF4-FFF2-40B4-BE49-F238E27FC236}">
+                    <a16:creationId xmlns:a16="http://schemas.microsoft.com/office/drawing/2014/main" id="{3BF16B8B-FF58-4D6B-C29D-1795869C03E6}"/>
+                  </a:ext>
+                </a:extLst>
+              </p:cNvPr>
+              <p:cNvSpPr/>
+              <p:nvPr/>
+            </p:nvSpPr>
+            <p:spPr>
+              <a:xfrm>
+                <a:off x="6491320" y="1570513"/>
+                <a:ext cx="1692000" cy="1692000"/>
+              </a:xfrm>
+              <a:prstGeom prst="flowChartConnector">
+                <a:avLst/>
+              </a:prstGeom>
+              <a:grpFill/>
+              <a:ln>
+                <a:noFill/>
+              </a:ln>
+            </p:spPr>
+            <p:style>
+              <a:lnRef idx="2">
+                <a:schemeClr val="accent1">
+                  <a:shade val="15000"/>
+                </a:schemeClr>
+              </a:lnRef>
+              <a:fillRef idx="1">
+                <a:schemeClr val="accent1"/>
+              </a:fillRef>
+              <a:effectRef idx="0">
+                <a:schemeClr val="accent1"/>
+              </a:effectRef>
+              <a:fontRef idx="minor">
+                <a:schemeClr val="lt1"/>
+              </a:fontRef>
+            </p:style>
+            <p:txBody>
+              <a:bodyPr rtlCol="0" anchor="ctr"/>
+              <a:lstStyle/>
+              <a:p>
+                <a:pPr algn="ctr"/>
+                <a:endParaRPr lang="it-IT" dirty="0">
+                  <a:solidFill>
+                    <a:schemeClr val="accent3"/>
+                  </a:solidFill>
+                </a:endParaRPr>
+              </a:p>
+            </p:txBody>
+          </p:sp>
+          <p:sp>
+            <p:nvSpPr>
+              <p:cNvPr id="42" name="Connettore 45">
+                <a:extLst>
+                  <a:ext uri="{FF2B5EF4-FFF2-40B4-BE49-F238E27FC236}">
+                    <a16:creationId xmlns:a16="http://schemas.microsoft.com/office/drawing/2014/main" id="{69862C0D-8559-5508-89EA-3E2B9069C3B7}"/>
+                  </a:ext>
+                </a:extLst>
+              </p:cNvPr>
+              <p:cNvSpPr/>
+              <p:nvPr/>
+            </p:nvSpPr>
+            <p:spPr>
+              <a:xfrm>
+                <a:off x="6709461" y="1804513"/>
+                <a:ext cx="1224000" cy="1224000"/>
+              </a:xfrm>
+              <a:prstGeom prst="flowChartConnector">
+                <a:avLst/>
+              </a:prstGeom>
+              <a:solidFill>
+                <a:srgbClr val="D9EEF4"/>
+              </a:solidFill>
+              <a:ln>
+                <a:noFill/>
+              </a:ln>
+            </p:spPr>
+            <p:style>
+              <a:lnRef idx="2">
+                <a:schemeClr val="accent1">
+                  <a:shade val="15000"/>
+                </a:schemeClr>
+              </a:lnRef>
+              <a:fillRef idx="1">
+                <a:schemeClr val="accent1"/>
+              </a:fillRef>
+              <a:effectRef idx="0">
+                <a:schemeClr val="accent1"/>
+              </a:effectRef>
+              <a:fontRef idx="minor">
+                <a:schemeClr val="lt1"/>
+              </a:fontRef>
+            </p:style>
+            <p:txBody>
+              <a:bodyPr rtlCol="0" anchor="ctr"/>
+              <a:lstStyle/>
+              <a:p>
+                <a:pPr algn="ctr"/>
+                <a:endParaRPr lang="it-IT" dirty="0"/>
+              </a:p>
+            </p:txBody>
+          </p:sp>
+        </p:grpSp>
+        <p:pic>
+          <p:nvPicPr>
+            <p:cNvPr id="26" name="Immagine 25">
+              <a:extLst>
+                <a:ext uri="{FF2B5EF4-FFF2-40B4-BE49-F238E27FC236}">
+                  <a16:creationId xmlns:a16="http://schemas.microsoft.com/office/drawing/2014/main" id="{0DAF0B84-35F0-D701-8B36-552C418D09E3}"/>
+                </a:ext>
+              </a:extLst>
+            </p:cNvPr>
+            <p:cNvPicPr>
+              <a:picLocks noChangeAspect="1"/>
+            </p:cNvPicPr>
+            <p:nvPr/>
+          </p:nvPicPr>
+          <p:blipFill>
+            <a:blip r:embed="rId6"/>
+            <a:srcRect/>
+            <a:stretch/>
+          </p:blipFill>
+          <p:spPr>
+            <a:xfrm>
+              <a:off x="2376986" y="5223179"/>
+              <a:ext cx="613349" cy="613349"/>
+            </a:xfrm>
+            <a:prstGeom prst="rect">
+              <a:avLst/>
+            </a:prstGeom>
+            <a:noFill/>
+          </p:spPr>
+        </p:pic>
+      </p:grpSp>
     </p:spTree>
     <p:extLst>
       <p:ext uri="{BB962C8B-B14F-4D97-AF65-F5344CB8AC3E}">
@@ -22304,6 +23044,9 @@
             <a:off x="1056640" y="2727273"/>
             <a:ext cx="2899435" cy="365760"/>
           </a:xfrm>
+          <a:ln>
+            <a:noFill/>
+          </a:ln>
         </p:spPr>
         <p:txBody>
           <a:bodyPr>
@@ -22388,9 +23131,7 @@
             <a:ext cx="2816352" cy="452026"/>
           </a:xfrm>
           <a:ln>
-            <a:solidFill>
-              <a:srgbClr val="43AAC7"/>
-            </a:solidFill>
+            <a:noFill/>
           </a:ln>
         </p:spPr>
         <p:txBody>
@@ -22489,6 +23230,11 @@
           <a:solidFill>
             <a:srgbClr val="FED4D6"/>
           </a:solidFill>
+          <a:ln>
+            <a:solidFill>
+              <a:srgbClr val="FED4D6"/>
+            </a:solidFill>
+          </a:ln>
         </p:spPr>
       </p:pic>
       <p:sp>
@@ -22551,6 +23297,9 @@
             <a:off x="1148454" y="5277565"/>
             <a:ext cx="2816352" cy="452026"/>
           </a:xfrm>
+          <a:solidFill>
+            <a:srgbClr val="FC2834"/>
+          </a:solidFill>
         </p:spPr>
         <p:txBody>
           <a:bodyPr>
@@ -22647,7 +23396,14 @@
           <a:srcRect/>
           <a:stretch/>
         </p:blipFill>
-        <p:spPr/>
+        <p:spPr>
+          <a:solidFill>
+            <a:srgbClr val="D9EEF4"/>
+          </a:solidFill>
+          <a:ln>
+            <a:noFill/>
+          </a:ln>
+        </p:spPr>
       </p:pic>
     </p:spTree>
     <p:extLst>
@@ -23907,26 +24663,6 @@
 </file>
 
 <file path=customXml/item2.xml><?xml version="1.0" encoding="utf-8"?>
-<p:properties xmlns:p="http://schemas.microsoft.com/office/2006/metadata/properties" xmlns:xsi="http://www.w3.org/2001/XMLSchema-instance" xmlns:pc="http://schemas.microsoft.com/office/infopath/2007/PartnerControls">
-  <documentManagement>
-    <_ip_UnifiedCompliancePolicyUIAction xmlns="http://schemas.microsoft.com/sharepoint/v3" xsi:nil="true"/>
-    <Image xmlns="71af3243-3dd4-4a8d-8c0d-dd76da1f02a5">
-      <Url xsi:nil="true"/>
-      <Description xsi:nil="true"/>
-    </Image>
-    <Status xmlns="71af3243-3dd4-4a8d-8c0d-dd76da1f02a5">Not started</Status>
-    <Background xmlns="71af3243-3dd4-4a8d-8c0d-dd76da1f02a5">false</Background>
-    <_ip_UnifiedCompliancePolicyProperties xmlns="http://schemas.microsoft.com/sharepoint/v3" xsi:nil="true"/>
-    <ImageTagsTaxHTField xmlns="71af3243-3dd4-4a8d-8c0d-dd76da1f02a5">
-      <Terms xmlns="http://schemas.microsoft.com/office/infopath/2007/PartnerControls"/>
-    </ImageTagsTaxHTField>
-    <TaxCatchAll xmlns="230e9df3-be65-4c73-a93b-d1236ebd677e" xsi:nil="true"/>
-    <MediaServiceKeyPoints xmlns="71af3243-3dd4-4a8d-8c0d-dd76da1f02a5" xsi:nil="true"/>
-  </documentManagement>
-</p:properties>
-</file>
-
-<file path=customXml/item3.xml><?xml version="1.0" encoding="utf-8"?>
 <ct:contentTypeSchema xmlns:ct="http://schemas.microsoft.com/office/2006/metadata/contentType" xmlns:ma="http://schemas.microsoft.com/office/2006/metadata/properties/metaAttributes" ct:_="" ma:_="" ma:contentTypeName="Document" ma:contentTypeID="0x01010079F111ED35F8CC479449609E8A0923A6" ma:contentTypeVersion="25" ma:contentTypeDescription="Create a new document." ma:contentTypeScope="" ma:versionID="e02306daf00165b375dc6a58966960be">
   <xsd:schema xmlns:xsd="http://www.w3.org/2001/XMLSchema" xmlns:xs="http://www.w3.org/2001/XMLSchema" xmlns:p="http://schemas.microsoft.com/office/2006/metadata/properties" xmlns:ns1="http://schemas.microsoft.com/sharepoint/v3" xmlns:ns2="71af3243-3dd4-4a8d-8c0d-dd76da1f02a5" xmlns:ns3="16c05727-aa75-4e4a-9b5f-8a80a1165891" xmlns:ns4="230e9df3-be65-4c73-a93b-d1236ebd677e" targetNamespace="http://schemas.microsoft.com/office/2006/metadata/properties" ma:root="true" ma:fieldsID="df88fb76bf5f555224557953949c1ec9" ns1:_="" ns2:_="" ns3:_="" ns4:_="">
     <xsd:import namespace="http://schemas.microsoft.com/sharepoint/v3"/>
@@ -24220,6 +24956,26 @@
 </ct:contentTypeSchema>
 </file>
 
+<file path=customXml/item3.xml><?xml version="1.0" encoding="utf-8"?>
+<p:properties xmlns:p="http://schemas.microsoft.com/office/2006/metadata/properties" xmlns:xsi="http://www.w3.org/2001/XMLSchema-instance" xmlns:pc="http://schemas.microsoft.com/office/infopath/2007/PartnerControls">
+  <documentManagement>
+    <_ip_UnifiedCompliancePolicyUIAction xmlns="http://schemas.microsoft.com/sharepoint/v3" xsi:nil="true"/>
+    <Image xmlns="71af3243-3dd4-4a8d-8c0d-dd76da1f02a5">
+      <Url xsi:nil="true"/>
+      <Description xsi:nil="true"/>
+    </Image>
+    <Status xmlns="71af3243-3dd4-4a8d-8c0d-dd76da1f02a5">Not started</Status>
+    <Background xmlns="71af3243-3dd4-4a8d-8c0d-dd76da1f02a5">false</Background>
+    <_ip_UnifiedCompliancePolicyProperties xmlns="http://schemas.microsoft.com/sharepoint/v3" xsi:nil="true"/>
+    <ImageTagsTaxHTField xmlns="71af3243-3dd4-4a8d-8c0d-dd76da1f02a5">
+      <Terms xmlns="http://schemas.microsoft.com/office/infopath/2007/PartnerControls"/>
+    </ImageTagsTaxHTField>
+    <TaxCatchAll xmlns="230e9df3-be65-4c73-a93b-d1236ebd677e" xsi:nil="true"/>
+    <MediaServiceKeyPoints xmlns="71af3243-3dd4-4a8d-8c0d-dd76da1f02a5" xsi:nil="true"/>
+  </documentManagement>
+</p:properties>
+</file>
+
 <file path=customXml/itemProps1.xml><?xml version="1.0" encoding="utf-8"?>
 <ds:datastoreItem xmlns:ds="http://schemas.openxmlformats.org/officeDocument/2006/customXml" ds:itemID="{83441F37-C10B-49C7-9131-D813AD6E9480}">
   <ds:schemaRefs>
@@ -24229,18 +24985,6 @@
 </file>
 
 <file path=customXml/itemProps2.xml><?xml version="1.0" encoding="utf-8"?>
-<ds:datastoreItem xmlns:ds="http://schemas.openxmlformats.org/officeDocument/2006/customXml" ds:itemID="{3065A588-1D2A-427C-AA32-A236D95C8F89}">
-  <ds:schemaRefs>
-    <ds:schemaRef ds:uri="http://schemas.microsoft.com/office/2006/metadata/properties"/>
-    <ds:schemaRef ds:uri="http://schemas.microsoft.com/office/infopath/2007/PartnerControls"/>
-    <ds:schemaRef ds:uri="http://schemas.microsoft.com/sharepoint/v3"/>
-    <ds:schemaRef ds:uri="71af3243-3dd4-4a8d-8c0d-dd76da1f02a5"/>
-    <ds:schemaRef ds:uri="230e9df3-be65-4c73-a93b-d1236ebd677e"/>
-  </ds:schemaRefs>
-</ds:datastoreItem>
-</file>
-
-<file path=customXml/itemProps3.xml><?xml version="1.0" encoding="utf-8"?>
 <ds:datastoreItem xmlns:ds="http://schemas.openxmlformats.org/officeDocument/2006/customXml" ds:itemID="{4FB0F111-FD6B-4279-A9B8-A9ADF2774655}">
   <ds:schemaRefs>
     <ds:schemaRef ds:uri="http://schemas.microsoft.com/office/2006/metadata/contentType"/>
@@ -24261,6 +25005,18 @@
 </ds:datastoreItem>
 </file>
 
+<file path=customXml/itemProps3.xml><?xml version="1.0" encoding="utf-8"?>
+<ds:datastoreItem xmlns:ds="http://schemas.openxmlformats.org/officeDocument/2006/customXml" ds:itemID="{3065A588-1D2A-427C-AA32-A236D95C8F89}">
+  <ds:schemaRefs>
+    <ds:schemaRef ds:uri="http://schemas.microsoft.com/office/2006/metadata/properties"/>
+    <ds:schemaRef ds:uri="http://schemas.microsoft.com/office/infopath/2007/PartnerControls"/>
+    <ds:schemaRef ds:uri="http://schemas.microsoft.com/sharepoint/v3"/>
+    <ds:schemaRef ds:uri="71af3243-3dd4-4a8d-8c0d-dd76da1f02a5"/>
+    <ds:schemaRef ds:uri="230e9df3-be65-4c73-a93b-d1236ebd677e"/>
+  </ds:schemaRefs>
+</ds:datastoreItem>
+</file>
+
 <file path=docMetadata/LabelInfo.xml><?xml version="1.0" encoding="utf-8"?>
 <clbl:labelList xmlns:clbl="http://schemas.microsoft.com/office/2020/mipLabelMetadata"/>
 </file>
</xml_diff>

<commit_message>
edited pitch slide 2
</commit_message>
<xml_diff>
--- a/pitch.pptx
+++ b/pitch.pptx
@@ -18743,7 +18743,7 @@
               <a:avLst/>
             </a:prstGeom>
             <a:solidFill>
-              <a:srgbClr val="29B76F"/>
+              <a:srgbClr val="4071AA"/>
             </a:solidFill>
             <a:ln>
               <a:noFill/>
@@ -18815,12 +18815,10 @@
                 <a:avLst/>
               </a:prstGeom>
               <a:solidFill>
-                <a:srgbClr val="29B76F"/>
+                <a:srgbClr val="4071AA"/>
               </a:solidFill>
               <a:ln>
-                <a:solidFill>
-                  <a:srgbClr val="00AA59"/>
-                </a:solidFill>
+                <a:noFill/>
               </a:ln>
             </p:spPr>
             <p:style>
@@ -18893,7 +18891,7 @@
                   <a:avLst/>
                 </a:prstGeom>
                 <a:solidFill>
-                  <a:srgbClr val="E5FFF2"/>
+                  <a:srgbClr val="D9EEF4"/>
                 </a:solidFill>
                 <a:ln>
                   <a:solidFill>
@@ -19172,199 +19170,216 @@
           </p:spPr>
         </p:pic>
       </p:grpSp>
-      <p:sp>
-        <p:nvSpPr>
-          <p:cNvPr id="16" name="Rettangolo 31">
-            <a:extLst>
-              <a:ext uri="{FF2B5EF4-FFF2-40B4-BE49-F238E27FC236}">
-                <a16:creationId xmlns:a16="http://schemas.microsoft.com/office/drawing/2014/main" id="{09E8D35F-AB85-4592-CC13-D37166CA3128}"/>
-              </a:ext>
-            </a:extLst>
-          </p:cNvPr>
-          <p:cNvSpPr/>
+      <p:grpSp>
+        <p:nvGrpSpPr>
+          <p:cNvPr id="3" name="Group 2">
+            <a:extLst>
+              <a:ext uri="{FF2B5EF4-FFF2-40B4-BE49-F238E27FC236}">
+                <a16:creationId xmlns:a16="http://schemas.microsoft.com/office/drawing/2014/main" id="{6C533C38-E0B0-67D8-B303-9F0C7D1DB43B}"/>
+              </a:ext>
+            </a:extLst>
+          </p:cNvPr>
+          <p:cNvGrpSpPr/>
           <p:nvPr/>
-        </p:nvSpPr>
-        <p:spPr>
+        </p:nvGrpSpPr>
+        <p:grpSpPr>
           <a:xfrm>
-            <a:off x="-8132" y="3637182"/>
-            <a:ext cx="570240" cy="380160"/>
-          </a:xfrm>
-          <a:prstGeom prst="rect">
-            <a:avLst/>
-          </a:prstGeom>
-          <a:solidFill>
-            <a:srgbClr val="FC2834"/>
-          </a:solidFill>
-          <a:ln>
-            <a:noFill/>
-          </a:ln>
-        </p:spPr>
-        <p:style>
-          <a:lnRef idx="2">
-            <a:schemeClr val="accent1">
-              <a:shade val="15000"/>
-            </a:schemeClr>
-          </a:lnRef>
-          <a:fillRef idx="1">
-            <a:schemeClr val="accent1"/>
-          </a:fillRef>
-          <a:effectRef idx="0">
-            <a:schemeClr val="accent1"/>
-          </a:effectRef>
-          <a:fontRef idx="minor">
-            <a:schemeClr val="lt1"/>
-          </a:fontRef>
-        </p:style>
-        <p:txBody>
-          <a:bodyPr rtlCol="0" anchor="ctr"/>
-          <a:lstStyle/>
-          <a:p>
-            <a:pPr algn="ctr"/>
-            <a:endParaRPr lang="it-IT" dirty="0"/>
-          </a:p>
-        </p:txBody>
-      </p:sp>
-      <p:sp>
-        <p:nvSpPr>
-          <p:cNvPr id="18" name="Connettore 32">
-            <a:extLst>
-              <a:ext uri="{FF2B5EF4-FFF2-40B4-BE49-F238E27FC236}">
-                <a16:creationId xmlns:a16="http://schemas.microsoft.com/office/drawing/2014/main" id="{491136E0-57C0-B8E7-F6C7-3FC38FC16953}"/>
-              </a:ext>
-            </a:extLst>
-          </p:cNvPr>
-          <p:cNvSpPr/>
-          <p:nvPr/>
-        </p:nvSpPr>
-        <p:spPr>
-          <a:xfrm>
-            <a:off x="483963" y="3278595"/>
-            <a:ext cx="1116720" cy="1116720"/>
-          </a:xfrm>
-          <a:prstGeom prst="flowChartConnector">
-            <a:avLst/>
-          </a:prstGeom>
-          <a:solidFill>
-            <a:srgbClr val="FC2834"/>
-          </a:solidFill>
-          <a:ln>
+            <a:off x="-8132" y="3278595"/>
+            <a:ext cx="1608815" cy="1116720"/>
+            <a:chOff x="-8132" y="3278595"/>
+            <a:chExt cx="1608815" cy="1116720"/>
+          </a:xfrm>
+        </p:grpSpPr>
+        <p:sp>
+          <p:nvSpPr>
+            <p:cNvPr id="16" name="Rettangolo 31">
+              <a:extLst>
+                <a:ext uri="{FF2B5EF4-FFF2-40B4-BE49-F238E27FC236}">
+                  <a16:creationId xmlns:a16="http://schemas.microsoft.com/office/drawing/2014/main" id="{09E8D35F-AB85-4592-CC13-D37166CA3128}"/>
+                </a:ext>
+              </a:extLst>
+            </p:cNvPr>
+            <p:cNvSpPr/>
+            <p:nvPr/>
+          </p:nvSpPr>
+          <p:spPr>
+            <a:xfrm>
+              <a:off x="-8132" y="3637182"/>
+              <a:ext cx="570240" cy="380160"/>
+            </a:xfrm>
+            <a:prstGeom prst="rect">
+              <a:avLst/>
+            </a:prstGeom>
             <a:solidFill>
-              <a:srgbClr val="FC2834"/>
+              <a:srgbClr val="29B76F"/>
             </a:solidFill>
-          </a:ln>
-        </p:spPr>
-        <p:style>
-          <a:lnRef idx="2">
-            <a:schemeClr val="accent1">
-              <a:shade val="15000"/>
-            </a:schemeClr>
-          </a:lnRef>
-          <a:fillRef idx="1">
-            <a:schemeClr val="accent1"/>
-          </a:fillRef>
-          <a:effectRef idx="0">
-            <a:schemeClr val="accent1"/>
-          </a:effectRef>
-          <a:fontRef idx="minor">
-            <a:schemeClr val="lt1"/>
-          </a:fontRef>
-        </p:style>
-        <p:txBody>
-          <a:bodyPr rtlCol="0" anchor="ctr"/>
-          <a:lstStyle/>
-          <a:p>
-            <a:pPr algn="ctr"/>
-            <a:endParaRPr lang="it-IT" dirty="0">
-              <a:solidFill>
-                <a:schemeClr val="accent3"/>
-              </a:solidFill>
-            </a:endParaRPr>
-          </a:p>
-        </p:txBody>
-      </p:sp>
-      <p:sp>
-        <p:nvSpPr>
-          <p:cNvPr id="20" name="Connettore 33">
-            <a:extLst>
-              <a:ext uri="{FF2B5EF4-FFF2-40B4-BE49-F238E27FC236}">
-                <a16:creationId xmlns:a16="http://schemas.microsoft.com/office/drawing/2014/main" id="{5BA1EF16-7301-CE51-893F-46BD1F61486B}"/>
-              </a:ext>
-            </a:extLst>
-          </p:cNvPr>
-          <p:cNvSpPr/>
-          <p:nvPr/>
-        </p:nvSpPr>
-        <p:spPr>
-          <a:xfrm>
-            <a:off x="638403" y="3433035"/>
-            <a:ext cx="807840" cy="807840"/>
-          </a:xfrm>
-          <a:prstGeom prst="flowChartConnector">
-            <a:avLst/>
-          </a:prstGeom>
-          <a:solidFill>
-            <a:srgbClr val="FED4D6"/>
-          </a:solidFill>
-          <a:ln>
+            <a:ln>
+              <a:noFill/>
+            </a:ln>
+          </p:spPr>
+          <p:style>
+            <a:lnRef idx="2">
+              <a:schemeClr val="accent1">
+                <a:shade val="15000"/>
+              </a:schemeClr>
+            </a:lnRef>
+            <a:fillRef idx="1">
+              <a:schemeClr val="accent1"/>
+            </a:fillRef>
+            <a:effectRef idx="0">
+              <a:schemeClr val="accent1"/>
+            </a:effectRef>
+            <a:fontRef idx="minor">
+              <a:schemeClr val="lt1"/>
+            </a:fontRef>
+          </p:style>
+          <p:txBody>
+            <a:bodyPr rtlCol="0" anchor="ctr"/>
+            <a:lstStyle/>
+            <a:p>
+              <a:pPr algn="ctr"/>
+              <a:endParaRPr lang="it-IT" dirty="0"/>
+            </a:p>
+          </p:txBody>
+        </p:sp>
+        <p:sp>
+          <p:nvSpPr>
+            <p:cNvPr id="18" name="Connettore 32">
+              <a:extLst>
+                <a:ext uri="{FF2B5EF4-FFF2-40B4-BE49-F238E27FC236}">
+                  <a16:creationId xmlns:a16="http://schemas.microsoft.com/office/drawing/2014/main" id="{491136E0-57C0-B8E7-F6C7-3FC38FC16953}"/>
+                </a:ext>
+              </a:extLst>
+            </p:cNvPr>
+            <p:cNvSpPr/>
+            <p:nvPr/>
+          </p:nvSpPr>
+          <p:spPr>
+            <a:xfrm>
+              <a:off x="483963" y="3278595"/>
+              <a:ext cx="1116720" cy="1116720"/>
+            </a:xfrm>
+            <a:prstGeom prst="flowChartConnector">
+              <a:avLst/>
+            </a:prstGeom>
             <a:solidFill>
-              <a:srgbClr val="FED4D6"/>
+              <a:srgbClr val="29B76F"/>
             </a:solidFill>
-          </a:ln>
-        </p:spPr>
-        <p:style>
-          <a:lnRef idx="2">
-            <a:schemeClr val="accent1">
-              <a:shade val="15000"/>
-            </a:schemeClr>
-          </a:lnRef>
-          <a:fillRef idx="1">
-            <a:schemeClr val="accent1"/>
-          </a:fillRef>
-          <a:effectRef idx="0">
-            <a:schemeClr val="accent1"/>
-          </a:effectRef>
-          <a:fontRef idx="minor">
-            <a:schemeClr val="lt1"/>
-          </a:fontRef>
-        </p:style>
-        <p:txBody>
-          <a:bodyPr rtlCol="0" anchor="ctr"/>
-          <a:lstStyle/>
-          <a:p>
-            <a:pPr algn="ctr"/>
-            <a:endParaRPr lang="it-IT" dirty="0"/>
-          </a:p>
-        </p:txBody>
-      </p:sp>
-      <p:pic>
-        <p:nvPicPr>
-          <p:cNvPr id="22" name="Immagine 9">
-            <a:extLst>
-              <a:ext uri="{FF2B5EF4-FFF2-40B4-BE49-F238E27FC236}">
-                <a16:creationId xmlns:a16="http://schemas.microsoft.com/office/drawing/2014/main" id="{332B963E-F46A-AE22-63C9-A7372BDC3279}"/>
-              </a:ext>
-            </a:extLst>
-          </p:cNvPr>
-          <p:cNvPicPr>
-            <a:picLocks noChangeAspect="1"/>
-          </p:cNvPicPr>
-          <p:nvPr/>
-        </p:nvPicPr>
-        <p:blipFill>
-          <a:blip r:embed="rId6"/>
-          <a:srcRect/>
-          <a:stretch/>
-        </p:blipFill>
-        <p:spPr>
-          <a:xfrm>
-            <a:off x="756972" y="3519993"/>
-            <a:ext cx="594461" cy="594461"/>
-          </a:xfrm>
-          <a:prstGeom prst="rect">
-            <a:avLst/>
-          </a:prstGeom>
-        </p:spPr>
-      </p:pic>
+            <a:ln>
+              <a:noFill/>
+            </a:ln>
+          </p:spPr>
+          <p:style>
+            <a:lnRef idx="2">
+              <a:schemeClr val="accent1">
+                <a:shade val="15000"/>
+              </a:schemeClr>
+            </a:lnRef>
+            <a:fillRef idx="1">
+              <a:schemeClr val="accent1"/>
+            </a:fillRef>
+            <a:effectRef idx="0">
+              <a:schemeClr val="accent1"/>
+            </a:effectRef>
+            <a:fontRef idx="minor">
+              <a:schemeClr val="lt1"/>
+            </a:fontRef>
+          </p:style>
+          <p:txBody>
+            <a:bodyPr rtlCol="0" anchor="ctr"/>
+            <a:lstStyle/>
+            <a:p>
+              <a:pPr algn="ctr"/>
+              <a:endParaRPr lang="it-IT" dirty="0">
+                <a:solidFill>
+                  <a:schemeClr val="accent3"/>
+                </a:solidFill>
+              </a:endParaRPr>
+            </a:p>
+          </p:txBody>
+        </p:sp>
+        <p:sp>
+          <p:nvSpPr>
+            <p:cNvPr id="20" name="Connettore 33">
+              <a:extLst>
+                <a:ext uri="{FF2B5EF4-FFF2-40B4-BE49-F238E27FC236}">
+                  <a16:creationId xmlns:a16="http://schemas.microsoft.com/office/drawing/2014/main" id="{5BA1EF16-7301-CE51-893F-46BD1F61486B}"/>
+                </a:ext>
+              </a:extLst>
+            </p:cNvPr>
+            <p:cNvSpPr/>
+            <p:nvPr/>
+          </p:nvSpPr>
+          <p:spPr>
+            <a:xfrm>
+              <a:off x="638403" y="3433035"/>
+              <a:ext cx="807840" cy="807840"/>
+            </a:xfrm>
+            <a:prstGeom prst="flowChartConnector">
+              <a:avLst/>
+            </a:prstGeom>
+            <a:solidFill>
+              <a:srgbClr val="E5FFF2"/>
+            </a:solidFill>
+            <a:ln>
+              <a:noFill/>
+            </a:ln>
+          </p:spPr>
+          <p:style>
+            <a:lnRef idx="2">
+              <a:schemeClr val="accent1">
+                <a:shade val="15000"/>
+              </a:schemeClr>
+            </a:lnRef>
+            <a:fillRef idx="1">
+              <a:schemeClr val="accent1"/>
+            </a:fillRef>
+            <a:effectRef idx="0">
+              <a:schemeClr val="accent1"/>
+            </a:effectRef>
+            <a:fontRef idx="minor">
+              <a:schemeClr val="lt1"/>
+            </a:fontRef>
+          </p:style>
+          <p:txBody>
+            <a:bodyPr rtlCol="0" anchor="ctr"/>
+            <a:lstStyle/>
+            <a:p>
+              <a:pPr algn="ctr"/>
+              <a:endParaRPr lang="it-IT" dirty="0"/>
+            </a:p>
+          </p:txBody>
+        </p:sp>
+        <p:pic>
+          <p:nvPicPr>
+            <p:cNvPr id="22" name="Immagine 9">
+              <a:extLst>
+                <a:ext uri="{FF2B5EF4-FFF2-40B4-BE49-F238E27FC236}">
+                  <a16:creationId xmlns:a16="http://schemas.microsoft.com/office/drawing/2014/main" id="{332B963E-F46A-AE22-63C9-A7372BDC3279}"/>
+                </a:ext>
+              </a:extLst>
+            </p:cNvPr>
+            <p:cNvPicPr>
+              <a:picLocks noChangeAspect="1"/>
+            </p:cNvPicPr>
+            <p:nvPr/>
+          </p:nvPicPr>
+          <p:blipFill>
+            <a:blip r:embed="rId6"/>
+            <a:srcRect/>
+            <a:stretch/>
+          </p:blipFill>
+          <p:spPr>
+            <a:xfrm>
+              <a:off x="756972" y="3519993"/>
+              <a:ext cx="594461" cy="594461"/>
+            </a:xfrm>
+            <a:prstGeom prst="rect">
+              <a:avLst/>
+            </a:prstGeom>
+          </p:spPr>
+        </p:pic>
+      </p:grpSp>
       <p:sp>
         <p:nvSpPr>
           <p:cNvPr id="24" name="Segnaposto testo 27">
@@ -24663,6 +24678,26 @@
 </file>
 
 <file path=customXml/item2.xml><?xml version="1.0" encoding="utf-8"?>
+<p:properties xmlns:p="http://schemas.microsoft.com/office/2006/metadata/properties" xmlns:xsi="http://www.w3.org/2001/XMLSchema-instance" xmlns:pc="http://schemas.microsoft.com/office/infopath/2007/PartnerControls">
+  <documentManagement>
+    <_ip_UnifiedCompliancePolicyUIAction xmlns="http://schemas.microsoft.com/sharepoint/v3" xsi:nil="true"/>
+    <Image xmlns="71af3243-3dd4-4a8d-8c0d-dd76da1f02a5">
+      <Url xsi:nil="true"/>
+      <Description xsi:nil="true"/>
+    </Image>
+    <Status xmlns="71af3243-3dd4-4a8d-8c0d-dd76da1f02a5">Not started</Status>
+    <Background xmlns="71af3243-3dd4-4a8d-8c0d-dd76da1f02a5">false</Background>
+    <_ip_UnifiedCompliancePolicyProperties xmlns="http://schemas.microsoft.com/sharepoint/v3" xsi:nil="true"/>
+    <ImageTagsTaxHTField xmlns="71af3243-3dd4-4a8d-8c0d-dd76da1f02a5">
+      <Terms xmlns="http://schemas.microsoft.com/office/infopath/2007/PartnerControls"/>
+    </ImageTagsTaxHTField>
+    <TaxCatchAll xmlns="230e9df3-be65-4c73-a93b-d1236ebd677e" xsi:nil="true"/>
+    <MediaServiceKeyPoints xmlns="71af3243-3dd4-4a8d-8c0d-dd76da1f02a5" xsi:nil="true"/>
+  </documentManagement>
+</p:properties>
+</file>
+
+<file path=customXml/item3.xml><?xml version="1.0" encoding="utf-8"?>
 <ct:contentTypeSchema xmlns:ct="http://schemas.microsoft.com/office/2006/metadata/contentType" xmlns:ma="http://schemas.microsoft.com/office/2006/metadata/properties/metaAttributes" ct:_="" ma:_="" ma:contentTypeName="Document" ma:contentTypeID="0x01010079F111ED35F8CC479449609E8A0923A6" ma:contentTypeVersion="25" ma:contentTypeDescription="Create a new document." ma:contentTypeScope="" ma:versionID="e02306daf00165b375dc6a58966960be">
   <xsd:schema xmlns:xsd="http://www.w3.org/2001/XMLSchema" xmlns:xs="http://www.w3.org/2001/XMLSchema" xmlns:p="http://schemas.microsoft.com/office/2006/metadata/properties" xmlns:ns1="http://schemas.microsoft.com/sharepoint/v3" xmlns:ns2="71af3243-3dd4-4a8d-8c0d-dd76da1f02a5" xmlns:ns3="16c05727-aa75-4e4a-9b5f-8a80a1165891" xmlns:ns4="230e9df3-be65-4c73-a93b-d1236ebd677e" targetNamespace="http://schemas.microsoft.com/office/2006/metadata/properties" ma:root="true" ma:fieldsID="df88fb76bf5f555224557953949c1ec9" ns1:_="" ns2:_="" ns3:_="" ns4:_="">
     <xsd:import namespace="http://schemas.microsoft.com/sharepoint/v3"/>
@@ -24956,26 +24991,6 @@
 </ct:contentTypeSchema>
 </file>
 
-<file path=customXml/item3.xml><?xml version="1.0" encoding="utf-8"?>
-<p:properties xmlns:p="http://schemas.microsoft.com/office/2006/metadata/properties" xmlns:xsi="http://www.w3.org/2001/XMLSchema-instance" xmlns:pc="http://schemas.microsoft.com/office/infopath/2007/PartnerControls">
-  <documentManagement>
-    <_ip_UnifiedCompliancePolicyUIAction xmlns="http://schemas.microsoft.com/sharepoint/v3" xsi:nil="true"/>
-    <Image xmlns="71af3243-3dd4-4a8d-8c0d-dd76da1f02a5">
-      <Url xsi:nil="true"/>
-      <Description xsi:nil="true"/>
-    </Image>
-    <Status xmlns="71af3243-3dd4-4a8d-8c0d-dd76da1f02a5">Not started</Status>
-    <Background xmlns="71af3243-3dd4-4a8d-8c0d-dd76da1f02a5">false</Background>
-    <_ip_UnifiedCompliancePolicyProperties xmlns="http://schemas.microsoft.com/sharepoint/v3" xsi:nil="true"/>
-    <ImageTagsTaxHTField xmlns="71af3243-3dd4-4a8d-8c0d-dd76da1f02a5">
-      <Terms xmlns="http://schemas.microsoft.com/office/infopath/2007/PartnerControls"/>
-    </ImageTagsTaxHTField>
-    <TaxCatchAll xmlns="230e9df3-be65-4c73-a93b-d1236ebd677e" xsi:nil="true"/>
-    <MediaServiceKeyPoints xmlns="71af3243-3dd4-4a8d-8c0d-dd76da1f02a5" xsi:nil="true"/>
-  </documentManagement>
-</p:properties>
-</file>
-
 <file path=customXml/itemProps1.xml><?xml version="1.0" encoding="utf-8"?>
 <ds:datastoreItem xmlns:ds="http://schemas.openxmlformats.org/officeDocument/2006/customXml" ds:itemID="{83441F37-C10B-49C7-9131-D813AD6E9480}">
   <ds:schemaRefs>
@@ -24985,6 +25000,18 @@
 </file>
 
 <file path=customXml/itemProps2.xml><?xml version="1.0" encoding="utf-8"?>
+<ds:datastoreItem xmlns:ds="http://schemas.openxmlformats.org/officeDocument/2006/customXml" ds:itemID="{3065A588-1D2A-427C-AA32-A236D95C8F89}">
+  <ds:schemaRefs>
+    <ds:schemaRef ds:uri="http://schemas.microsoft.com/office/2006/metadata/properties"/>
+    <ds:schemaRef ds:uri="http://schemas.microsoft.com/office/infopath/2007/PartnerControls"/>
+    <ds:schemaRef ds:uri="http://schemas.microsoft.com/sharepoint/v3"/>
+    <ds:schemaRef ds:uri="71af3243-3dd4-4a8d-8c0d-dd76da1f02a5"/>
+    <ds:schemaRef ds:uri="230e9df3-be65-4c73-a93b-d1236ebd677e"/>
+  </ds:schemaRefs>
+</ds:datastoreItem>
+</file>
+
+<file path=customXml/itemProps3.xml><?xml version="1.0" encoding="utf-8"?>
 <ds:datastoreItem xmlns:ds="http://schemas.openxmlformats.org/officeDocument/2006/customXml" ds:itemID="{4FB0F111-FD6B-4279-A9B8-A9ADF2774655}">
   <ds:schemaRefs>
     <ds:schemaRef ds:uri="http://schemas.microsoft.com/office/2006/metadata/contentType"/>
@@ -25005,18 +25032,6 @@
 </ds:datastoreItem>
 </file>
 
-<file path=customXml/itemProps3.xml><?xml version="1.0" encoding="utf-8"?>
-<ds:datastoreItem xmlns:ds="http://schemas.openxmlformats.org/officeDocument/2006/customXml" ds:itemID="{3065A588-1D2A-427C-AA32-A236D95C8F89}">
-  <ds:schemaRefs>
-    <ds:schemaRef ds:uri="http://schemas.microsoft.com/office/2006/metadata/properties"/>
-    <ds:schemaRef ds:uri="http://schemas.microsoft.com/office/infopath/2007/PartnerControls"/>
-    <ds:schemaRef ds:uri="http://schemas.microsoft.com/sharepoint/v3"/>
-    <ds:schemaRef ds:uri="71af3243-3dd4-4a8d-8c0d-dd76da1f02a5"/>
-    <ds:schemaRef ds:uri="230e9df3-be65-4c73-a93b-d1236ebd677e"/>
-  </ds:schemaRefs>
-</ds:datastoreItem>
-</file>
-
 <file path=docMetadata/LabelInfo.xml><?xml version="1.0" encoding="utf-8"?>
 <clbl:labelList xmlns:clbl="http://schemas.microsoft.com/office/2020/mipLabelMetadata"/>
 </file>
</xml_diff>